<commit_message>
Updates to Sections 3 & 4.
</commit_message>
<xml_diff>
--- a/figs_src/diagrams-wide.pptx
+++ b/figs_src/diagrams-wide.pptx
@@ -192,7 +192,7 @@
           <a:p>
             <a:fld id="{843567C3-09B7-4EC5-8695-9659B6A4537F}" type="datetimeFigureOut">
               <a:rPr lang="en-US" smtClean="0"/>
-              <a:t>5/22/2014</a:t>
+              <a:t>5/23/2014</a:t>
             </a:fld>
             <a:endParaRPr lang="en-US"/>
           </a:p>
@@ -642,7 +642,7 @@
             <a:fld id="{1D8BD707-D9CF-40AE-B4C6-C98DA3205C09}" type="datetimeFigureOut">
               <a:rPr lang="en-US" smtClean="0"/>
               <a:pPr/>
-              <a:t>5/22/2014</a:t>
+              <a:t>5/23/2014</a:t>
             </a:fld>
             <a:endParaRPr lang="en-US"/>
           </a:p>
@@ -809,7 +809,7 @@
             <a:fld id="{1D8BD707-D9CF-40AE-B4C6-C98DA3205C09}" type="datetimeFigureOut">
               <a:rPr lang="en-US" smtClean="0"/>
               <a:pPr/>
-              <a:t>5/22/2014</a:t>
+              <a:t>5/23/2014</a:t>
             </a:fld>
             <a:endParaRPr lang="en-US"/>
           </a:p>
@@ -986,7 +986,7 @@
             <a:fld id="{1D8BD707-D9CF-40AE-B4C6-C98DA3205C09}" type="datetimeFigureOut">
               <a:rPr lang="en-US" smtClean="0"/>
               <a:pPr/>
-              <a:t>5/22/2014</a:t>
+              <a:t>5/23/2014</a:t>
             </a:fld>
             <a:endParaRPr lang="en-US"/>
           </a:p>
@@ -1153,7 +1153,7 @@
             <a:fld id="{1D8BD707-D9CF-40AE-B4C6-C98DA3205C09}" type="datetimeFigureOut">
               <a:rPr lang="en-US" smtClean="0"/>
               <a:pPr/>
-              <a:t>5/22/2014</a:t>
+              <a:t>5/23/2014</a:t>
             </a:fld>
             <a:endParaRPr lang="en-US"/>
           </a:p>
@@ -1396,7 +1396,7 @@
             <a:fld id="{1D8BD707-D9CF-40AE-B4C6-C98DA3205C09}" type="datetimeFigureOut">
               <a:rPr lang="en-US" smtClean="0"/>
               <a:pPr/>
-              <a:t>5/22/2014</a:t>
+              <a:t>5/23/2014</a:t>
             </a:fld>
             <a:endParaRPr lang="en-US"/>
           </a:p>
@@ -1681,7 +1681,7 @@
             <a:fld id="{1D8BD707-D9CF-40AE-B4C6-C98DA3205C09}" type="datetimeFigureOut">
               <a:rPr lang="en-US" smtClean="0"/>
               <a:pPr/>
-              <a:t>5/22/2014</a:t>
+              <a:t>5/23/2014</a:t>
             </a:fld>
             <a:endParaRPr lang="en-US"/>
           </a:p>
@@ -2100,7 +2100,7 @@
             <a:fld id="{1D8BD707-D9CF-40AE-B4C6-C98DA3205C09}" type="datetimeFigureOut">
               <a:rPr lang="en-US" smtClean="0"/>
               <a:pPr/>
-              <a:t>5/22/2014</a:t>
+              <a:t>5/23/2014</a:t>
             </a:fld>
             <a:endParaRPr lang="en-US"/>
           </a:p>
@@ -2215,7 +2215,7 @@
             <a:fld id="{1D8BD707-D9CF-40AE-B4C6-C98DA3205C09}" type="datetimeFigureOut">
               <a:rPr lang="en-US" smtClean="0"/>
               <a:pPr/>
-              <a:t>5/22/2014</a:t>
+              <a:t>5/23/2014</a:t>
             </a:fld>
             <a:endParaRPr lang="en-US"/>
           </a:p>
@@ -2307,7 +2307,7 @@
             <a:fld id="{1D8BD707-D9CF-40AE-B4C6-C98DA3205C09}" type="datetimeFigureOut">
               <a:rPr lang="en-US" smtClean="0"/>
               <a:pPr/>
-              <a:t>5/22/2014</a:t>
+              <a:t>5/23/2014</a:t>
             </a:fld>
             <a:endParaRPr lang="en-US"/>
           </a:p>
@@ -2581,7 +2581,7 @@
             <a:fld id="{1D8BD707-D9CF-40AE-B4C6-C98DA3205C09}" type="datetimeFigureOut">
               <a:rPr lang="en-US" smtClean="0"/>
               <a:pPr/>
-              <a:t>5/22/2014</a:t>
+              <a:t>5/23/2014</a:t>
             </a:fld>
             <a:endParaRPr lang="en-US"/>
           </a:p>
@@ -2831,7 +2831,7 @@
             <a:fld id="{1D8BD707-D9CF-40AE-B4C6-C98DA3205C09}" type="datetimeFigureOut">
               <a:rPr lang="en-US" smtClean="0"/>
               <a:pPr/>
-              <a:t>5/22/2014</a:t>
+              <a:t>5/23/2014</a:t>
             </a:fld>
             <a:endParaRPr lang="en-US"/>
           </a:p>
@@ -3041,7 +3041,7 @@
             <a:fld id="{1D8BD707-D9CF-40AE-B4C6-C98DA3205C09}" type="datetimeFigureOut">
               <a:rPr lang="en-US" smtClean="0"/>
               <a:pPr/>
-              <a:t>5/22/2014</a:t>
+              <a:t>5/23/2014</a:t>
             </a:fld>
             <a:endParaRPr lang="en-US"/>
           </a:p>
@@ -5203,7 +5203,7 @@
                 <a:latin typeface="Times New Roman" pitchFamily="18" charset="0"/>
                 <a:cs typeface="Times New Roman" pitchFamily="18" charset="0"/>
               </a:rPr>
-              <a:t>Initialization Flags</a:t>
+              <a:t>Clean Flags</a:t>
             </a:r>
             <a:endParaRPr lang="en-US" sz="900" dirty="0">
               <a:latin typeface="Times New Roman" pitchFamily="18" charset="0"/>
@@ -5264,7 +5264,17 @@
                 <a:latin typeface="Times New Roman" pitchFamily="18" charset="0"/>
                 <a:cs typeface="Times New Roman" pitchFamily="18" charset="0"/>
               </a:rPr>
-              <a:t>Initialization Flag Register File</a:t>
+              <a:t>Clean </a:t>
+            </a:r>
+            <a:r>
+              <a:rPr lang="en-US" sz="900" dirty="0" smtClean="0">
+                <a:solidFill>
+                  <a:schemeClr val="tx1"/>
+                </a:solidFill>
+                <a:latin typeface="Times New Roman" pitchFamily="18" charset="0"/>
+                <a:cs typeface="Times New Roman" pitchFamily="18" charset="0"/>
+              </a:rPr>
+              <a:t>Flag Register File</a:t>
             </a:r>
           </a:p>
         </p:txBody>
@@ -5321,8 +5331,28 @@
                 <a:latin typeface="Times New Roman" pitchFamily="18" charset="0"/>
                 <a:cs typeface="Times New Roman" pitchFamily="18" charset="0"/>
               </a:rPr>
-              <a:t>Initialization Flag Cache</a:t>
-            </a:r>
+              <a:t>Clean Flag</a:t>
+            </a:r>
+          </a:p>
+          <a:p>
+            <a:pPr algn="ctr"/>
+            <a:r>
+              <a:rPr lang="en-US" sz="900" dirty="0" smtClean="0">
+                <a:solidFill>
+                  <a:schemeClr val="tx1"/>
+                </a:solidFill>
+                <a:latin typeface="Times New Roman" pitchFamily="18" charset="0"/>
+                <a:cs typeface="Times New Roman" pitchFamily="18" charset="0"/>
+              </a:rPr>
+              <a:t>Cache</a:t>
+            </a:r>
+            <a:endParaRPr lang="en-US" sz="900" dirty="0" smtClean="0">
+              <a:solidFill>
+                <a:schemeClr val="tx1"/>
+              </a:solidFill>
+              <a:latin typeface="Times New Roman" pitchFamily="18" charset="0"/>
+              <a:cs typeface="Times New Roman" pitchFamily="18" charset="0"/>
+            </a:endParaRPr>
           </a:p>
         </p:txBody>
       </p:sp>
@@ -5720,8 +5750,8 @@
         </p:nvSpPr>
         <p:spPr>
           <a:xfrm>
-            <a:off x="5373373" y="1630393"/>
-            <a:ext cx="749514" cy="230832"/>
+            <a:off x="5654614" y="1651468"/>
+            <a:ext cx="464566" cy="230832"/>
           </a:xfrm>
           <a:prstGeom prst="rect">
             <a:avLst/>
@@ -5736,11 +5766,11 @@
           <a:p>
             <a:pPr algn="ctr"/>
             <a:r>
-              <a:rPr lang="en-US" sz="900" dirty="0" err="1" smtClean="0">
+              <a:rPr lang="en-US" sz="900" dirty="0" smtClean="0">
                 <a:latin typeface="Times New Roman" pitchFamily="18" charset="0"/>
                 <a:cs typeface="Times New Roman" pitchFamily="18" charset="0"/>
               </a:rPr>
-              <a:t>uninitialize</a:t>
+              <a:t>clean</a:t>
             </a:r>
             <a:endParaRPr lang="en-US" sz="900" dirty="0" smtClean="0">
               <a:latin typeface="Times New Roman" pitchFamily="18" charset="0"/>

</xml_diff>

<commit_message>
Edits to filtering section.
</commit_message>
<xml_diff>
--- a/figs_src/diagrams-wide.pptx
+++ b/figs_src/diagrams-wide.pptx
@@ -152,7 +152,7 @@
           </a:prstGeom>
         </p:spPr>
         <p:txBody>
-          <a:bodyPr vert="horz" lIns="71613" tIns="35809" rIns="71613" bIns="35809" rtlCol="0"/>
+          <a:bodyPr vert="horz" lIns="71602" tIns="35803" rIns="71602" bIns="35803" rtlCol="0"/>
           <a:lstStyle>
             <a:lvl1pPr algn="l">
               <a:defRPr sz="900"/>
@@ -183,7 +183,7 @@
           </a:prstGeom>
         </p:spPr>
         <p:txBody>
-          <a:bodyPr vert="horz" lIns="71613" tIns="35809" rIns="71613" bIns="35809" rtlCol="0"/>
+          <a:bodyPr vert="horz" lIns="71602" tIns="35803" rIns="71602" bIns="35803" rtlCol="0"/>
           <a:lstStyle>
             <a:lvl1pPr algn="r">
               <a:defRPr sz="900"/>
@@ -192,7 +192,7 @@
           <a:p>
             <a:fld id="{843567C3-09B7-4EC5-8695-9659B6A4537F}" type="datetimeFigureOut">
               <a:rPr lang="en-US" smtClean="0"/>
-              <a:t>5/23/2014</a:t>
+              <a:t>5/27/2014</a:t>
             </a:fld>
             <a:endParaRPr lang="en-US"/>
           </a:p>
@@ -210,8 +210,8 @@
         </p:nvSpPr>
         <p:spPr>
           <a:xfrm>
-            <a:off x="1844675" y="550863"/>
-            <a:ext cx="2260600" cy="2743200"/>
+            <a:off x="1846263" y="550863"/>
+            <a:ext cx="2259012" cy="2743200"/>
           </a:xfrm>
           <a:prstGeom prst="rect">
             <a:avLst/>
@@ -224,7 +224,7 @@
           </a:ln>
         </p:spPr>
         <p:txBody>
-          <a:bodyPr vert="horz" lIns="71613" tIns="35809" rIns="71613" bIns="35809" rtlCol="0" anchor="ctr"/>
+          <a:bodyPr vert="horz" lIns="71602" tIns="35803" rIns="71602" bIns="35803" rtlCol="0" anchor="ctr"/>
           <a:lstStyle/>
           <a:p>
             <a:endParaRPr lang="en-US"/>
@@ -251,7 +251,7 @@
           </a:prstGeom>
         </p:spPr>
         <p:txBody>
-          <a:bodyPr vert="horz" lIns="71613" tIns="35809" rIns="71613" bIns="35809" rtlCol="0"/>
+          <a:bodyPr vert="horz" lIns="71602" tIns="35803" rIns="71602" bIns="35803" rtlCol="0"/>
           <a:lstStyle/>
           <a:p>
             <a:pPr lvl="0"/>
@@ -311,7 +311,7 @@
           </a:prstGeom>
         </p:spPr>
         <p:txBody>
-          <a:bodyPr vert="horz" lIns="71613" tIns="35809" rIns="71613" bIns="35809" rtlCol="0" anchor="b"/>
+          <a:bodyPr vert="horz" lIns="71602" tIns="35803" rIns="71602" bIns="35803" rtlCol="0" anchor="b"/>
           <a:lstStyle>
             <a:lvl1pPr algn="l">
               <a:defRPr sz="900"/>
@@ -342,7 +342,7 @@
           </a:prstGeom>
         </p:spPr>
         <p:txBody>
-          <a:bodyPr vert="horz" lIns="71613" tIns="35809" rIns="71613" bIns="35809" rtlCol="0" anchor="b"/>
+          <a:bodyPr vert="horz" lIns="71602" tIns="35803" rIns="71602" bIns="35803" rtlCol="0" anchor="b"/>
           <a:lstStyle>
             <a:lvl1pPr algn="r">
               <a:defRPr sz="900"/>
@@ -642,7 +642,7 @@
             <a:fld id="{1D8BD707-D9CF-40AE-B4C6-C98DA3205C09}" type="datetimeFigureOut">
               <a:rPr lang="en-US" smtClean="0"/>
               <a:pPr/>
-              <a:t>5/23/2014</a:t>
+              <a:t>5/27/2014</a:t>
             </a:fld>
             <a:endParaRPr lang="en-US"/>
           </a:p>
@@ -809,7 +809,7 @@
             <a:fld id="{1D8BD707-D9CF-40AE-B4C6-C98DA3205C09}" type="datetimeFigureOut">
               <a:rPr lang="en-US" smtClean="0"/>
               <a:pPr/>
-              <a:t>5/23/2014</a:t>
+              <a:t>5/27/2014</a:t>
             </a:fld>
             <a:endParaRPr lang="en-US"/>
           </a:p>
@@ -986,7 +986,7 @@
             <a:fld id="{1D8BD707-D9CF-40AE-B4C6-C98DA3205C09}" type="datetimeFigureOut">
               <a:rPr lang="en-US" smtClean="0"/>
               <a:pPr/>
-              <a:t>5/23/2014</a:t>
+              <a:t>5/27/2014</a:t>
             </a:fld>
             <a:endParaRPr lang="en-US"/>
           </a:p>
@@ -1153,7 +1153,7 @@
             <a:fld id="{1D8BD707-D9CF-40AE-B4C6-C98DA3205C09}" type="datetimeFigureOut">
               <a:rPr lang="en-US" smtClean="0"/>
               <a:pPr/>
-              <a:t>5/23/2014</a:t>
+              <a:t>5/27/2014</a:t>
             </a:fld>
             <a:endParaRPr lang="en-US"/>
           </a:p>
@@ -1396,7 +1396,7 @@
             <a:fld id="{1D8BD707-D9CF-40AE-B4C6-C98DA3205C09}" type="datetimeFigureOut">
               <a:rPr lang="en-US" smtClean="0"/>
               <a:pPr/>
-              <a:t>5/23/2014</a:t>
+              <a:t>5/27/2014</a:t>
             </a:fld>
             <a:endParaRPr lang="en-US"/>
           </a:p>
@@ -1681,7 +1681,7 @@
             <a:fld id="{1D8BD707-D9CF-40AE-B4C6-C98DA3205C09}" type="datetimeFigureOut">
               <a:rPr lang="en-US" smtClean="0"/>
               <a:pPr/>
-              <a:t>5/23/2014</a:t>
+              <a:t>5/27/2014</a:t>
             </a:fld>
             <a:endParaRPr lang="en-US"/>
           </a:p>
@@ -2100,7 +2100,7 @@
             <a:fld id="{1D8BD707-D9CF-40AE-B4C6-C98DA3205C09}" type="datetimeFigureOut">
               <a:rPr lang="en-US" smtClean="0"/>
               <a:pPr/>
-              <a:t>5/23/2014</a:t>
+              <a:t>5/27/2014</a:t>
             </a:fld>
             <a:endParaRPr lang="en-US"/>
           </a:p>
@@ -2215,7 +2215,7 @@
             <a:fld id="{1D8BD707-D9CF-40AE-B4C6-C98DA3205C09}" type="datetimeFigureOut">
               <a:rPr lang="en-US" smtClean="0"/>
               <a:pPr/>
-              <a:t>5/23/2014</a:t>
+              <a:t>5/27/2014</a:t>
             </a:fld>
             <a:endParaRPr lang="en-US"/>
           </a:p>
@@ -2307,7 +2307,7 @@
             <a:fld id="{1D8BD707-D9CF-40AE-B4C6-C98DA3205C09}" type="datetimeFigureOut">
               <a:rPr lang="en-US" smtClean="0"/>
               <a:pPr/>
-              <a:t>5/23/2014</a:t>
+              <a:t>5/27/2014</a:t>
             </a:fld>
             <a:endParaRPr lang="en-US"/>
           </a:p>
@@ -2581,7 +2581,7 @@
             <a:fld id="{1D8BD707-D9CF-40AE-B4C6-C98DA3205C09}" type="datetimeFigureOut">
               <a:rPr lang="en-US" smtClean="0"/>
               <a:pPr/>
-              <a:t>5/23/2014</a:t>
+              <a:t>5/27/2014</a:t>
             </a:fld>
             <a:endParaRPr lang="en-US"/>
           </a:p>
@@ -2831,7 +2831,7 @@
             <a:fld id="{1D8BD707-D9CF-40AE-B4C6-C98DA3205C09}" type="datetimeFigureOut">
               <a:rPr lang="en-US" smtClean="0"/>
               <a:pPr/>
-              <a:t>5/23/2014</a:t>
+              <a:t>5/27/2014</a:t>
             </a:fld>
             <a:endParaRPr lang="en-US"/>
           </a:p>
@@ -3041,7 +3041,7 @@
             <a:fld id="{1D8BD707-D9CF-40AE-B4C6-C98DA3205C09}" type="datetimeFigureOut">
               <a:rPr lang="en-US" smtClean="0"/>
               <a:pPr/>
-              <a:t>5/23/2014</a:t>
+              <a:t>5/27/2014</a:t>
             </a:fld>
             <a:endParaRPr lang="en-US"/>
           </a:p>
@@ -3412,6 +3412,80 @@
           <a:chExt cx="0" cy="0"/>
         </a:xfrm>
       </p:grpSpPr>
+      <p:sp>
+        <p:nvSpPr>
+          <p:cNvPr id="68" name="TextBox 67"/>
+          <p:cNvSpPr txBox="1"/>
+          <p:nvPr/>
+        </p:nvSpPr>
+        <p:spPr>
+          <a:xfrm>
+            <a:off x="4111085" y="544965"/>
+            <a:ext cx="615854" cy="230832"/>
+          </a:xfrm>
+          <a:prstGeom prst="rect">
+            <a:avLst/>
+          </a:prstGeom>
+          <a:noFill/>
+        </p:spPr>
+        <p:txBody>
+          <a:bodyPr wrap="square" rtlCol="0">
+            <a:spAutoFit/>
+          </a:bodyPr>
+          <a:lstStyle/>
+          <a:p>
+            <a:pPr algn="ctr"/>
+            <a:r>
+              <a:rPr lang="en-US" sz="900" dirty="0" smtClean="0">
+                <a:latin typeface="Times New Roman" pitchFamily="18" charset="0"/>
+                <a:cs typeface="Times New Roman" pitchFamily="18" charset="0"/>
+              </a:rPr>
+              <a:t>flag 0</a:t>
+            </a:r>
+            <a:endParaRPr lang="en-US" sz="900" dirty="0">
+              <a:latin typeface="Times New Roman" pitchFamily="18" charset="0"/>
+              <a:cs typeface="Times New Roman" pitchFamily="18" charset="0"/>
+            </a:endParaRPr>
+          </a:p>
+        </p:txBody>
+      </p:sp>
+      <p:sp>
+        <p:nvSpPr>
+          <p:cNvPr id="87" name="TextBox 86"/>
+          <p:cNvSpPr txBox="1"/>
+          <p:nvPr/>
+        </p:nvSpPr>
+        <p:spPr>
+          <a:xfrm>
+            <a:off x="4111132" y="736588"/>
+            <a:ext cx="615854" cy="230832"/>
+          </a:xfrm>
+          <a:prstGeom prst="rect">
+            <a:avLst/>
+          </a:prstGeom>
+          <a:noFill/>
+        </p:spPr>
+        <p:txBody>
+          <a:bodyPr wrap="square" rtlCol="0">
+            <a:spAutoFit/>
+          </a:bodyPr>
+          <a:lstStyle/>
+          <a:p>
+            <a:pPr algn="ctr"/>
+            <a:r>
+              <a:rPr lang="en-US" sz="900" dirty="0" smtClean="0">
+                <a:latin typeface="Times New Roman" pitchFamily="18" charset="0"/>
+                <a:cs typeface="Times New Roman" pitchFamily="18" charset="0"/>
+              </a:rPr>
+              <a:t>flag 1</a:t>
+            </a:r>
+            <a:endParaRPr lang="en-US" sz="900" dirty="0">
+              <a:latin typeface="Times New Roman" pitchFamily="18" charset="0"/>
+              <a:cs typeface="Times New Roman" pitchFamily="18" charset="0"/>
+            </a:endParaRPr>
+          </a:p>
+        </p:txBody>
+      </p:sp>
       <p:sp>
         <p:nvSpPr>
           <p:cNvPr id="92" name="Rectangle 91"/>
@@ -5126,8 +5200,8 @@
         </p:nvSpPr>
         <p:spPr>
           <a:xfrm>
-            <a:off x="2931566" y="45701"/>
-            <a:ext cx="1179519" cy="1727822"/>
+            <a:off x="2931566" y="45700"/>
+            <a:ext cx="1179519" cy="1725727"/>
           </a:xfrm>
           <a:prstGeom prst="rect">
             <a:avLst/>
@@ -5183,7 +5257,7 @@
         </p:nvSpPr>
         <p:spPr>
           <a:xfrm>
-            <a:off x="2931565" y="1554419"/>
+            <a:off x="2931565" y="1525315"/>
             <a:ext cx="1179519" cy="230832"/>
           </a:xfrm>
           <a:prstGeom prst="rect">
@@ -5203,7 +5277,14 @@
                 <a:latin typeface="Times New Roman" pitchFamily="18" charset="0"/>
                 <a:cs typeface="Times New Roman" pitchFamily="18" charset="0"/>
               </a:rPr>
-              <a:t>Clean Flags</a:t>
+              <a:t>Dataflow </a:t>
+            </a:r>
+            <a:r>
+              <a:rPr lang="en-US" sz="900" dirty="0" smtClean="0">
+                <a:latin typeface="Times New Roman" pitchFamily="18" charset="0"/>
+                <a:cs typeface="Times New Roman" pitchFamily="18" charset="0"/>
+              </a:rPr>
+              <a:t>Flags</a:t>
             </a:r>
             <a:endParaRPr lang="en-US" sz="900" dirty="0">
               <a:latin typeface="Times New Roman" pitchFamily="18" charset="0"/>
@@ -5221,7 +5302,7 @@
         <p:spPr>
           <a:xfrm>
             <a:off x="3002860" y="139619"/>
-            <a:ext cx="1036934" cy="465217"/>
+            <a:ext cx="1036934" cy="461914"/>
           </a:xfrm>
           <a:prstGeom prst="rect">
             <a:avLst/>
@@ -5264,7 +5345,7 @@
                 <a:latin typeface="Times New Roman" pitchFamily="18" charset="0"/>
                 <a:cs typeface="Times New Roman" pitchFamily="18" charset="0"/>
               </a:rPr>
-              <a:t>Clean </a:t>
+              <a:t>Dataflow </a:t>
             </a:r>
             <a:r>
               <a:rPr lang="en-US" sz="900" dirty="0" smtClean="0">
@@ -5287,8 +5368,8 @@
         </p:nvSpPr>
         <p:spPr>
           <a:xfrm>
-            <a:off x="3002860" y="699271"/>
-            <a:ext cx="1036932" cy="854800"/>
+            <a:off x="3002862" y="698384"/>
+            <a:ext cx="1036932" cy="826931"/>
           </a:xfrm>
           <a:prstGeom prst="rect">
             <a:avLst/>
@@ -5331,7 +5412,17 @@
                 <a:latin typeface="Times New Roman" pitchFamily="18" charset="0"/>
                 <a:cs typeface="Times New Roman" pitchFamily="18" charset="0"/>
               </a:rPr>
-              <a:t>Clean Flag</a:t>
+              <a:t>Dataflow </a:t>
+            </a:r>
+            <a:r>
+              <a:rPr lang="en-US" sz="900" dirty="0" smtClean="0">
+                <a:solidFill>
+                  <a:schemeClr val="tx1"/>
+                </a:solidFill>
+                <a:latin typeface="Times New Roman" pitchFamily="18" charset="0"/>
+                <a:cs typeface="Times New Roman" pitchFamily="18" charset="0"/>
+              </a:rPr>
+              <a:t>Flag</a:t>
             </a:r>
           </a:p>
           <a:p>
@@ -5346,13 +5437,6 @@
               </a:rPr>
               <a:t>Cache</a:t>
             </a:r>
-            <a:endParaRPr lang="en-US" sz="900" dirty="0" smtClean="0">
-              <a:solidFill>
-                <a:schemeClr val="tx1"/>
-              </a:solidFill>
-              <a:latin typeface="Times New Roman" pitchFamily="18" charset="0"/>
-              <a:cs typeface="Times New Roman" pitchFamily="18" charset="0"/>
-            </a:endParaRPr>
           </a:p>
         </p:txBody>
       </p:sp>
@@ -5364,7 +5448,7 @@
         </p:nvCxnSpPr>
         <p:spPr>
           <a:xfrm>
-            <a:off x="4116113" y="827579"/>
+            <a:off x="4116113" y="751171"/>
             <a:ext cx="615854" cy="0"/>
           </a:xfrm>
           <a:prstGeom prst="straightConnector1">
@@ -5393,43 +5477,6 @@
           </a:fontRef>
         </p:style>
       </p:cxnSp>
-      <p:cxnSp>
-        <p:nvCxnSpPr>
-          <p:cNvPr id="83" name="Straight Arrow Connector 82"/>
-          <p:cNvCxnSpPr/>
-          <p:nvPr/>
-        </p:nvCxnSpPr>
-        <p:spPr>
-          <a:xfrm flipV="1">
-            <a:off x="4116113" y="978561"/>
-            <a:ext cx="605797" cy="628"/>
-          </a:xfrm>
-          <a:prstGeom prst="straightConnector1">
-            <a:avLst/>
-          </a:prstGeom>
-          <a:ln w="19050">
-            <a:solidFill>
-              <a:schemeClr val="tx1"/>
-            </a:solidFill>
-            <a:headEnd w="sm" len="sm"/>
-            <a:tailEnd type="arrow" w="sm" len="sm"/>
-          </a:ln>
-        </p:spPr>
-        <p:style>
-          <a:lnRef idx="1">
-            <a:schemeClr val="accent1"/>
-          </a:lnRef>
-          <a:fillRef idx="0">
-            <a:schemeClr val="accent1"/>
-          </a:fillRef>
-          <a:effectRef idx="0">
-            <a:schemeClr val="accent1"/>
-          </a:effectRef>
-          <a:fontRef idx="minor">
-            <a:schemeClr val="tx1"/>
-          </a:fontRef>
-        </p:style>
-      </p:cxnSp>
       <p:sp>
         <p:nvSpPr>
           <p:cNvPr id="84" name="Rectangle 83"/>
@@ -5438,8 +5485,8 @@
         </p:nvSpPr>
         <p:spPr>
           <a:xfrm>
-            <a:off x="4726986" y="597846"/>
-            <a:ext cx="1036932" cy="854800"/>
+            <a:off x="4726986" y="605236"/>
+            <a:ext cx="1036932" cy="784639"/>
           </a:xfrm>
           <a:prstGeom prst="rect">
             <a:avLst/>
@@ -5639,8 +5686,8 @@
         </p:nvCxnSpPr>
         <p:spPr>
           <a:xfrm>
-            <a:off x="5763918" y="1254116"/>
-            <a:ext cx="295913" cy="0"/>
+            <a:off x="5763918" y="1252045"/>
+            <a:ext cx="165003" cy="929"/>
           </a:xfrm>
           <a:prstGeom prst="straightConnector1">
             <a:avLst/>
@@ -5676,8 +5723,8 @@
         </p:nvCxnSpPr>
         <p:spPr>
           <a:xfrm>
-            <a:off x="6059831" y="1252974"/>
-            <a:ext cx="0" cy="416513"/>
+            <a:off x="5928921" y="1257032"/>
+            <a:ext cx="0" cy="324869"/>
           </a:xfrm>
           <a:prstGeom prst="straightConnector1">
             <a:avLst/>
@@ -5713,8 +5760,8 @@
         </p:nvCxnSpPr>
         <p:spPr>
           <a:xfrm flipH="1">
-            <a:off x="4116113" y="1669835"/>
-            <a:ext cx="1943718" cy="0"/>
+            <a:off x="4116115" y="1582267"/>
+            <a:ext cx="1812806" cy="0"/>
           </a:xfrm>
           <a:prstGeom prst="straightConnector1">
             <a:avLst/>
@@ -5750,8 +5797,8 @@
         </p:nvSpPr>
         <p:spPr>
           <a:xfrm>
-            <a:off x="5654614" y="1651468"/>
-            <a:ext cx="464566" cy="230832"/>
+            <a:off x="5312675" y="1554864"/>
+            <a:ext cx="691290" cy="230832"/>
           </a:xfrm>
           <a:prstGeom prst="rect">
             <a:avLst/>
@@ -5770,7 +5817,7 @@
                 <a:latin typeface="Times New Roman" pitchFamily="18" charset="0"/>
                 <a:cs typeface="Times New Roman" pitchFamily="18" charset="0"/>
               </a:rPr>
-              <a:t>clean</a:t>
+              <a:t>write flag</a:t>
             </a:r>
             <a:endParaRPr lang="en-US" sz="900" dirty="0" smtClean="0">
               <a:latin typeface="Times New Roman" pitchFamily="18" charset="0"/>
@@ -5983,6 +6030,43 @@
           </a:p>
         </p:txBody>
       </p:sp>
+      <p:cxnSp>
+        <p:nvCxnSpPr>
+          <p:cNvPr id="79" name="Straight Arrow Connector 78"/>
+          <p:cNvCxnSpPr/>
+          <p:nvPr/>
+        </p:nvCxnSpPr>
+        <p:spPr>
+          <a:xfrm>
+            <a:off x="4113598" y="951494"/>
+            <a:ext cx="615854" cy="0"/>
+          </a:xfrm>
+          <a:prstGeom prst="straightConnector1">
+            <a:avLst/>
+          </a:prstGeom>
+          <a:ln w="19050">
+            <a:solidFill>
+              <a:schemeClr val="tx1"/>
+            </a:solidFill>
+            <a:headEnd w="sm" len="sm"/>
+            <a:tailEnd type="arrow" w="sm" len="sm"/>
+          </a:ln>
+        </p:spPr>
+        <p:style>
+          <a:lnRef idx="1">
+            <a:schemeClr val="accent1"/>
+          </a:lnRef>
+          <a:fillRef idx="0">
+            <a:schemeClr val="accent1"/>
+          </a:fillRef>
+          <a:effectRef idx="0">
+            <a:schemeClr val="accent1"/>
+          </a:effectRef>
+          <a:fontRef idx="minor">
+            <a:schemeClr val="tx1"/>
+          </a:fontRef>
+        </p:style>
+      </p:cxnSp>
     </p:spTree>
     <p:extLst>
       <p:ext uri="{BB962C8B-B14F-4D97-AF65-F5344CB8AC3E}">

</xml_diff>

<commit_message>
Reorganized paper for HPCA 2015 submission.
</commit_message>
<xml_diff>
--- a/figs_src/diagrams-wide.pptx
+++ b/figs_src/diagrams-wide.pptx
@@ -5,12 +5,13 @@
     <p:sldMasterId id="2147483648" r:id="rId1"/>
   </p:sldMasterIdLst>
   <p:notesMasterIdLst>
-    <p:notesMasterId r:id="rId5"/>
+    <p:notesMasterId r:id="rId6"/>
   </p:notesMasterIdLst>
   <p:sldIdLst>
     <p:sldId id="258" r:id="rId2"/>
     <p:sldId id="260" r:id="rId3"/>
     <p:sldId id="259" r:id="rId4"/>
+    <p:sldId id="262" r:id="rId5"/>
   </p:sldIdLst>
   <p:sldSz cx="6400800" cy="7772400"/>
   <p:notesSz cx="5943600" cy="7315200"/>
@@ -194,7 +195,7 @@
           <a:p>
             <a:fld id="{843567C3-09B7-4EC5-8695-9659B6A4537F}" type="datetimeFigureOut">
               <a:rPr lang="en-US" smtClean="0"/>
-              <a:t>5/29/2014</a:t>
+              <a:t>9/5/2014</a:t>
             </a:fld>
             <a:endParaRPr lang="en-US"/>
           </a:p>
@@ -644,7 +645,7 @@
             <a:fld id="{1D8BD707-D9CF-40AE-B4C6-C98DA3205C09}" type="datetimeFigureOut">
               <a:rPr lang="en-US" smtClean="0"/>
               <a:pPr/>
-              <a:t>5/29/2014</a:t>
+              <a:t>9/5/2014</a:t>
             </a:fld>
             <a:endParaRPr lang="en-US"/>
           </a:p>
@@ -811,7 +812,7 @@
             <a:fld id="{1D8BD707-D9CF-40AE-B4C6-C98DA3205C09}" type="datetimeFigureOut">
               <a:rPr lang="en-US" smtClean="0"/>
               <a:pPr/>
-              <a:t>5/29/2014</a:t>
+              <a:t>9/5/2014</a:t>
             </a:fld>
             <a:endParaRPr lang="en-US"/>
           </a:p>
@@ -988,7 +989,7 @@
             <a:fld id="{1D8BD707-D9CF-40AE-B4C6-C98DA3205C09}" type="datetimeFigureOut">
               <a:rPr lang="en-US" smtClean="0"/>
               <a:pPr/>
-              <a:t>5/29/2014</a:t>
+              <a:t>9/5/2014</a:t>
             </a:fld>
             <a:endParaRPr lang="en-US"/>
           </a:p>
@@ -1155,7 +1156,7 @@
             <a:fld id="{1D8BD707-D9CF-40AE-B4C6-C98DA3205C09}" type="datetimeFigureOut">
               <a:rPr lang="en-US" smtClean="0"/>
               <a:pPr/>
-              <a:t>5/29/2014</a:t>
+              <a:t>9/5/2014</a:t>
             </a:fld>
             <a:endParaRPr lang="en-US"/>
           </a:p>
@@ -1398,7 +1399,7 @@
             <a:fld id="{1D8BD707-D9CF-40AE-B4C6-C98DA3205C09}" type="datetimeFigureOut">
               <a:rPr lang="en-US" smtClean="0"/>
               <a:pPr/>
-              <a:t>5/29/2014</a:t>
+              <a:t>9/5/2014</a:t>
             </a:fld>
             <a:endParaRPr lang="en-US"/>
           </a:p>
@@ -1683,7 +1684,7 @@
             <a:fld id="{1D8BD707-D9CF-40AE-B4C6-C98DA3205C09}" type="datetimeFigureOut">
               <a:rPr lang="en-US" smtClean="0"/>
               <a:pPr/>
-              <a:t>5/29/2014</a:t>
+              <a:t>9/5/2014</a:t>
             </a:fld>
             <a:endParaRPr lang="en-US"/>
           </a:p>
@@ -2102,7 +2103,7 @@
             <a:fld id="{1D8BD707-D9CF-40AE-B4C6-C98DA3205C09}" type="datetimeFigureOut">
               <a:rPr lang="en-US" smtClean="0"/>
               <a:pPr/>
-              <a:t>5/29/2014</a:t>
+              <a:t>9/5/2014</a:t>
             </a:fld>
             <a:endParaRPr lang="en-US"/>
           </a:p>
@@ -2217,7 +2218,7 @@
             <a:fld id="{1D8BD707-D9CF-40AE-B4C6-C98DA3205C09}" type="datetimeFigureOut">
               <a:rPr lang="en-US" smtClean="0"/>
               <a:pPr/>
-              <a:t>5/29/2014</a:t>
+              <a:t>9/5/2014</a:t>
             </a:fld>
             <a:endParaRPr lang="en-US"/>
           </a:p>
@@ -2309,7 +2310,7 @@
             <a:fld id="{1D8BD707-D9CF-40AE-B4C6-C98DA3205C09}" type="datetimeFigureOut">
               <a:rPr lang="en-US" smtClean="0"/>
               <a:pPr/>
-              <a:t>5/29/2014</a:t>
+              <a:t>9/5/2014</a:t>
             </a:fld>
             <a:endParaRPr lang="en-US"/>
           </a:p>
@@ -2583,7 +2584,7 @@
             <a:fld id="{1D8BD707-D9CF-40AE-B4C6-C98DA3205C09}" type="datetimeFigureOut">
               <a:rPr lang="en-US" smtClean="0"/>
               <a:pPr/>
-              <a:t>5/29/2014</a:t>
+              <a:t>9/5/2014</a:t>
             </a:fld>
             <a:endParaRPr lang="en-US"/>
           </a:p>
@@ -2833,7 +2834,7 @@
             <a:fld id="{1D8BD707-D9CF-40AE-B4C6-C98DA3205C09}" type="datetimeFigureOut">
               <a:rPr lang="en-US" smtClean="0"/>
               <a:pPr/>
-              <a:t>5/29/2014</a:t>
+              <a:t>9/5/2014</a:t>
             </a:fld>
             <a:endParaRPr lang="en-US"/>
           </a:p>
@@ -3043,7 +3044,7 @@
             <a:fld id="{1D8BD707-D9CF-40AE-B4C6-C98DA3205C09}" type="datetimeFigureOut">
               <a:rPr lang="en-US" smtClean="0"/>
               <a:pPr/>
-              <a:t>5/29/2014</a:t>
+              <a:t>9/5/2014</a:t>
             </a:fld>
             <a:endParaRPr lang="en-US"/>
           </a:p>
@@ -7992,19 +7993,8 @@
                 <a:latin typeface="Times New Roman" pitchFamily="18" charset="0"/>
                 <a:cs typeface="Times New Roman" pitchFamily="18" charset="0"/>
               </a:rPr>
-              <a:t>write </a:t>
-            </a:r>
-            <a:r>
-              <a:rPr lang="en-US" sz="900" dirty="0" smtClean="0">
-                <a:latin typeface="Times New Roman" pitchFamily="18" charset="0"/>
-                <a:cs typeface="Times New Roman" pitchFamily="18" charset="0"/>
-              </a:rPr>
-              <a:t>enable</a:t>
-            </a:r>
-            <a:endParaRPr lang="en-US" sz="900" dirty="0" smtClean="0">
-              <a:latin typeface="Times New Roman" pitchFamily="18" charset="0"/>
-              <a:cs typeface="Times New Roman" pitchFamily="18" charset="0"/>
-            </a:endParaRPr>
+              <a:t>write enable</a:t>
+            </a:r>
           </a:p>
         </p:txBody>
       </p:sp>
@@ -8279,10 +8269,6 @@
               </a:rPr>
               <a:t>Constant</a:t>
             </a:r>
-            <a:endParaRPr lang="en-US" sz="900" dirty="0" smtClean="0">
-              <a:latin typeface="Times New Roman" pitchFamily="18" charset="0"/>
-              <a:cs typeface="Times New Roman" pitchFamily="18" charset="0"/>
-            </a:endParaRPr>
           </a:p>
         </p:txBody>
       </p:sp>
@@ -8427,10 +8413,6 @@
               </a:rPr>
               <a:t>write value</a:t>
             </a:r>
-            <a:endParaRPr lang="en-US" sz="900" dirty="0" smtClean="0">
-              <a:latin typeface="Times New Roman" pitchFamily="18" charset="0"/>
-              <a:cs typeface="Times New Roman" pitchFamily="18" charset="0"/>
-            </a:endParaRPr>
           </a:p>
         </p:txBody>
       </p:sp>
@@ -8488,13 +8470,6 @@
               </a:rPr>
               <a:t>FIFO entry</a:t>
             </a:r>
-            <a:endParaRPr lang="en-US" sz="900" dirty="0" smtClean="0">
-              <a:solidFill>
-                <a:schemeClr val="tx1"/>
-              </a:solidFill>
-              <a:latin typeface="Times New Roman" pitchFamily="18" charset="0"/>
-              <a:cs typeface="Times New Roman" pitchFamily="18" charset="0"/>
-            </a:endParaRPr>
           </a:p>
         </p:txBody>
       </p:sp>
@@ -8562,13 +8537,6 @@
               </a:rPr>
               <a:t> Table</a:t>
             </a:r>
-            <a:endParaRPr lang="en-US" sz="900" dirty="0" smtClean="0">
-              <a:solidFill>
-                <a:schemeClr val="tx1"/>
-              </a:solidFill>
-              <a:latin typeface="Times New Roman" pitchFamily="18" charset="0"/>
-              <a:cs typeface="Times New Roman" pitchFamily="18" charset="0"/>
-            </a:endParaRPr>
           </a:p>
         </p:txBody>
       </p:sp>
@@ -11608,6 +11576,1105 @@
     <p:extLst>
       <p:ext uri="{BB962C8B-B14F-4D97-AF65-F5344CB8AC3E}">
         <p14:creationId xmlns:p14="http://schemas.microsoft.com/office/powerpoint/2010/main" val="2134624442"/>
+      </p:ext>
+    </p:extLst>
+  </p:cSld>
+  <p:clrMapOvr>
+    <a:masterClrMapping/>
+  </p:clrMapOvr>
+</p:sld>
+</file>
+
+<file path=ppt/slides/slide4.xml><?xml version="1.0" encoding="utf-8"?>
+<p:sld xmlns:a="http://schemas.openxmlformats.org/drawingml/2006/main" xmlns:r="http://schemas.openxmlformats.org/officeDocument/2006/relationships" xmlns:p="http://schemas.openxmlformats.org/presentationml/2006/main">
+  <p:cSld>
+    <p:spTree>
+      <p:nvGrpSpPr>
+        <p:cNvPr id="1" name=""/>
+        <p:cNvGrpSpPr/>
+        <p:nvPr/>
+      </p:nvGrpSpPr>
+      <p:grpSpPr>
+        <a:xfrm>
+          <a:off x="0" y="0"/>
+          <a:ext cx="0" cy="0"/>
+          <a:chOff x="0" y="0"/>
+          <a:chExt cx="0" cy="0"/>
+        </a:xfrm>
+      </p:grpSpPr>
+      <p:sp>
+        <p:nvSpPr>
+          <p:cNvPr id="5" name="Rectangle 4"/>
+          <p:cNvSpPr/>
+          <p:nvPr/>
+        </p:nvSpPr>
+        <p:spPr>
+          <a:xfrm>
+            <a:off x="25595" y="199723"/>
+            <a:ext cx="1459389" cy="1804632"/>
+          </a:xfrm>
+          <a:prstGeom prst="rect">
+            <a:avLst/>
+          </a:prstGeom>
+          <a:solidFill>
+            <a:srgbClr val="FFFFCC"/>
+          </a:solidFill>
+          <a:ln w="12700">
+            <a:solidFill>
+              <a:schemeClr val="tx1"/>
+            </a:solidFill>
+          </a:ln>
+        </p:spPr>
+        <p:style>
+          <a:lnRef idx="2">
+            <a:schemeClr val="accent1">
+              <a:shade val="50000"/>
+            </a:schemeClr>
+          </a:lnRef>
+          <a:fillRef idx="1">
+            <a:schemeClr val="accent1"/>
+          </a:fillRef>
+          <a:effectRef idx="0">
+            <a:schemeClr val="accent1"/>
+          </a:effectRef>
+          <a:fontRef idx="minor">
+            <a:schemeClr val="lt1"/>
+          </a:fontRef>
+        </p:style>
+        <p:txBody>
+          <a:bodyPr rtlCol="0" anchor="ctr"/>
+          <a:lstStyle/>
+          <a:p>
+            <a:r>
+              <a:rPr lang="en-US" sz="900" dirty="0">
+                <a:solidFill>
+                  <a:schemeClr val="tx1"/>
+                </a:solidFill>
+                <a:latin typeface="Consolas" pitchFamily="49" charset="0"/>
+                <a:cs typeface="Consolas" pitchFamily="49" charset="0"/>
+              </a:rPr>
+              <a:t>char </a:t>
+            </a:r>
+            <a:r>
+              <a:rPr lang="en-US" sz="900" dirty="0" smtClean="0">
+                <a:solidFill>
+                  <a:schemeClr val="tx1"/>
+                </a:solidFill>
+                <a:latin typeface="Consolas" pitchFamily="49" charset="0"/>
+                <a:cs typeface="Consolas" pitchFamily="49" charset="0"/>
+              </a:rPr>
+              <a:t>*x </a:t>
+            </a:r>
+            <a:r>
+              <a:rPr lang="en-US" sz="900" dirty="0">
+                <a:solidFill>
+                  <a:schemeClr val="tx1"/>
+                </a:solidFill>
+                <a:latin typeface="Consolas" pitchFamily="49" charset="0"/>
+                <a:cs typeface="Consolas" pitchFamily="49" charset="0"/>
+              </a:rPr>
+              <a:t>= </a:t>
+            </a:r>
+            <a:r>
+              <a:rPr lang="en-US" sz="900" dirty="0" err="1" smtClean="0">
+                <a:solidFill>
+                  <a:schemeClr val="tx1"/>
+                </a:solidFill>
+                <a:latin typeface="Consolas" pitchFamily="49" charset="0"/>
+                <a:cs typeface="Consolas" pitchFamily="49" charset="0"/>
+              </a:rPr>
+              <a:t>malloc</a:t>
+            </a:r>
+            <a:r>
+              <a:rPr lang="en-US" sz="900" dirty="0" smtClean="0">
+                <a:solidFill>
+                  <a:schemeClr val="tx1"/>
+                </a:solidFill>
+                <a:latin typeface="Consolas" pitchFamily="49" charset="0"/>
+                <a:cs typeface="Consolas" pitchFamily="49" charset="0"/>
+              </a:rPr>
+              <a:t>(8);</a:t>
+            </a:r>
+            <a:endParaRPr lang="en-US" sz="900" dirty="0">
+              <a:solidFill>
+                <a:schemeClr val="tx1"/>
+              </a:solidFill>
+              <a:latin typeface="Consolas" pitchFamily="49" charset="0"/>
+              <a:cs typeface="Consolas" pitchFamily="49" charset="0"/>
+            </a:endParaRPr>
+          </a:p>
+          <a:p>
+            <a:endParaRPr lang="en-US" sz="900" dirty="0">
+              <a:solidFill>
+                <a:schemeClr val="tx1"/>
+              </a:solidFill>
+              <a:latin typeface="Consolas" pitchFamily="49" charset="0"/>
+              <a:cs typeface="Consolas" pitchFamily="49" charset="0"/>
+            </a:endParaRPr>
+          </a:p>
+          <a:p>
+            <a:r>
+              <a:rPr lang="en-US" sz="900" dirty="0">
+                <a:solidFill>
+                  <a:schemeClr val="tx1"/>
+                </a:solidFill>
+                <a:latin typeface="Consolas" pitchFamily="49" charset="0"/>
+                <a:cs typeface="Consolas" pitchFamily="49" charset="0"/>
+              </a:rPr>
+              <a:t>char </a:t>
+            </a:r>
+            <a:r>
+              <a:rPr lang="en-US" sz="900" dirty="0" smtClean="0">
+                <a:solidFill>
+                  <a:schemeClr val="tx1"/>
+                </a:solidFill>
+                <a:latin typeface="Consolas" pitchFamily="49" charset="0"/>
+                <a:cs typeface="Consolas" pitchFamily="49" charset="0"/>
+              </a:rPr>
+              <a:t>*y </a:t>
+            </a:r>
+            <a:r>
+              <a:rPr lang="en-US" sz="900" dirty="0">
+                <a:solidFill>
+                  <a:schemeClr val="tx1"/>
+                </a:solidFill>
+                <a:latin typeface="Consolas" pitchFamily="49" charset="0"/>
+                <a:cs typeface="Consolas" pitchFamily="49" charset="0"/>
+              </a:rPr>
+              <a:t>= </a:t>
+            </a:r>
+            <a:r>
+              <a:rPr lang="en-US" sz="900" dirty="0" smtClean="0">
+                <a:solidFill>
+                  <a:schemeClr val="tx1"/>
+                </a:solidFill>
+                <a:latin typeface="Consolas" pitchFamily="49" charset="0"/>
+                <a:cs typeface="Consolas" pitchFamily="49" charset="0"/>
+              </a:rPr>
+              <a:t>x </a:t>
+            </a:r>
+            <a:r>
+              <a:rPr lang="en-US" sz="900" dirty="0">
+                <a:solidFill>
+                  <a:schemeClr val="tx1"/>
+                </a:solidFill>
+                <a:latin typeface="Consolas" pitchFamily="49" charset="0"/>
+                <a:cs typeface="Consolas" pitchFamily="49" charset="0"/>
+              </a:rPr>
+              <a:t>+ </a:t>
+            </a:r>
+            <a:r>
+              <a:rPr lang="en-US" sz="900" dirty="0" smtClean="0">
+                <a:solidFill>
+                  <a:schemeClr val="tx1"/>
+                </a:solidFill>
+                <a:latin typeface="Consolas" pitchFamily="49" charset="0"/>
+                <a:cs typeface="Consolas" pitchFamily="49" charset="0"/>
+              </a:rPr>
+              <a:t>4;</a:t>
+            </a:r>
+            <a:endParaRPr lang="en-US" sz="900" dirty="0">
+              <a:solidFill>
+                <a:schemeClr val="tx1"/>
+              </a:solidFill>
+              <a:latin typeface="Consolas" pitchFamily="49" charset="0"/>
+              <a:cs typeface="Consolas" pitchFamily="49" charset="0"/>
+            </a:endParaRPr>
+          </a:p>
+          <a:p>
+            <a:endParaRPr lang="en-US" sz="900" dirty="0">
+              <a:solidFill>
+                <a:schemeClr val="tx1"/>
+              </a:solidFill>
+              <a:latin typeface="Consolas" pitchFamily="49" charset="0"/>
+              <a:cs typeface="Consolas" pitchFamily="49" charset="0"/>
+            </a:endParaRPr>
+          </a:p>
+          <a:p>
+            <a:r>
+              <a:rPr lang="en-US" sz="900" dirty="0" smtClean="0">
+                <a:solidFill>
+                  <a:schemeClr val="tx1"/>
+                </a:solidFill>
+                <a:latin typeface="Consolas" pitchFamily="49" charset="0"/>
+                <a:cs typeface="Consolas" pitchFamily="49" charset="0"/>
+              </a:rPr>
+              <a:t>x[7] </a:t>
+            </a:r>
+            <a:r>
+              <a:rPr lang="en-US" sz="900" dirty="0">
+                <a:solidFill>
+                  <a:schemeClr val="tx1"/>
+                </a:solidFill>
+                <a:latin typeface="Consolas" pitchFamily="49" charset="0"/>
+                <a:cs typeface="Consolas" pitchFamily="49" charset="0"/>
+              </a:rPr>
+              <a:t>= 1;</a:t>
+            </a:r>
+          </a:p>
+          <a:p>
+            <a:endParaRPr lang="en-US" sz="900" dirty="0">
+              <a:solidFill>
+                <a:schemeClr val="tx1"/>
+              </a:solidFill>
+              <a:latin typeface="Consolas" pitchFamily="49" charset="0"/>
+              <a:cs typeface="Consolas" pitchFamily="49" charset="0"/>
+            </a:endParaRPr>
+          </a:p>
+          <a:p>
+            <a:r>
+              <a:rPr lang="en-US" sz="900" dirty="0" smtClean="0">
+                <a:solidFill>
+                  <a:schemeClr val="tx1"/>
+                </a:solidFill>
+                <a:latin typeface="Consolas" pitchFamily="49" charset="0"/>
+                <a:cs typeface="Consolas" pitchFamily="49" charset="0"/>
+              </a:rPr>
+              <a:t>y[7] </a:t>
+            </a:r>
+            <a:r>
+              <a:rPr lang="en-US" sz="900" dirty="0">
+                <a:solidFill>
+                  <a:schemeClr val="tx1"/>
+                </a:solidFill>
+                <a:latin typeface="Consolas" pitchFamily="49" charset="0"/>
+                <a:cs typeface="Consolas" pitchFamily="49" charset="0"/>
+              </a:rPr>
+              <a:t>= 1;</a:t>
+            </a:r>
+          </a:p>
+        </p:txBody>
+      </p:sp>
+      <p:sp>
+        <p:nvSpPr>
+          <p:cNvPr id="6" name="TextBox 5"/>
+          <p:cNvSpPr txBox="1"/>
+          <p:nvPr/>
+        </p:nvSpPr>
+        <p:spPr>
+          <a:xfrm>
+            <a:off x="334110" y="-31110"/>
+            <a:ext cx="768100" cy="230832"/>
+          </a:xfrm>
+          <a:prstGeom prst="rect">
+            <a:avLst/>
+          </a:prstGeom>
+          <a:noFill/>
+        </p:spPr>
+        <p:txBody>
+          <a:bodyPr wrap="square" rtlCol="0">
+            <a:spAutoFit/>
+          </a:bodyPr>
+          <a:lstStyle/>
+          <a:p>
+            <a:pPr algn="ctr"/>
+            <a:r>
+              <a:rPr lang="en-US" sz="900" dirty="0" smtClean="0">
+                <a:latin typeface="Times New Roman" pitchFamily="18" charset="0"/>
+                <a:cs typeface="Times New Roman" pitchFamily="18" charset="0"/>
+              </a:rPr>
+              <a:t>Main Core</a:t>
+            </a:r>
+            <a:endParaRPr lang="en-US" sz="900" dirty="0">
+              <a:latin typeface="Times New Roman" pitchFamily="18" charset="0"/>
+              <a:cs typeface="Times New Roman" pitchFamily="18" charset="0"/>
+            </a:endParaRPr>
+          </a:p>
+        </p:txBody>
+      </p:sp>
+      <p:sp>
+        <p:nvSpPr>
+          <p:cNvPr id="7" name="TextBox 6"/>
+          <p:cNvSpPr txBox="1"/>
+          <p:nvPr/>
+        </p:nvSpPr>
+        <p:spPr>
+          <a:xfrm>
+            <a:off x="1984249" y="-31110"/>
+            <a:ext cx="768100" cy="230832"/>
+          </a:xfrm>
+          <a:prstGeom prst="rect">
+            <a:avLst/>
+          </a:prstGeom>
+          <a:noFill/>
+        </p:spPr>
+        <p:txBody>
+          <a:bodyPr wrap="square" rtlCol="0">
+            <a:spAutoFit/>
+          </a:bodyPr>
+          <a:lstStyle/>
+          <a:p>
+            <a:pPr algn="ctr"/>
+            <a:r>
+              <a:rPr lang="en-US" sz="900" dirty="0" smtClean="0">
+                <a:latin typeface="Times New Roman" pitchFamily="18" charset="0"/>
+                <a:cs typeface="Times New Roman" pitchFamily="18" charset="0"/>
+              </a:rPr>
+              <a:t>Monitor</a:t>
+            </a:r>
+            <a:endParaRPr lang="en-US" sz="900" dirty="0">
+              <a:latin typeface="Times New Roman" pitchFamily="18" charset="0"/>
+              <a:cs typeface="Times New Roman" pitchFamily="18" charset="0"/>
+            </a:endParaRPr>
+          </a:p>
+        </p:txBody>
+      </p:sp>
+      <p:sp>
+        <p:nvSpPr>
+          <p:cNvPr id="8" name="Rectangle 7"/>
+          <p:cNvSpPr/>
+          <p:nvPr/>
+        </p:nvSpPr>
+        <p:spPr>
+          <a:xfrm>
+            <a:off x="1600200" y="194372"/>
+            <a:ext cx="1536199" cy="1809983"/>
+          </a:xfrm>
+          <a:prstGeom prst="rect">
+            <a:avLst/>
+          </a:prstGeom>
+          <a:solidFill>
+            <a:srgbClr val="FFFFCC"/>
+          </a:solidFill>
+          <a:ln w="12700">
+            <a:solidFill>
+              <a:schemeClr val="tx1"/>
+            </a:solidFill>
+            <a:prstDash val="solid"/>
+          </a:ln>
+        </p:spPr>
+        <p:style>
+          <a:lnRef idx="2">
+            <a:schemeClr val="accent1">
+              <a:shade val="50000"/>
+            </a:schemeClr>
+          </a:lnRef>
+          <a:fillRef idx="1">
+            <a:schemeClr val="accent1"/>
+          </a:fillRef>
+          <a:effectRef idx="0">
+            <a:schemeClr val="accent1"/>
+          </a:effectRef>
+          <a:fontRef idx="minor">
+            <a:schemeClr val="lt1"/>
+          </a:fontRef>
+        </p:style>
+        <p:txBody>
+          <a:bodyPr rtlCol="0" anchor="ctr"/>
+          <a:lstStyle/>
+          <a:p>
+            <a:r>
+              <a:rPr lang="en-US" sz="900" dirty="0" smtClean="0">
+                <a:solidFill>
+                  <a:schemeClr val="tx1"/>
+                </a:solidFill>
+                <a:latin typeface="Consolas" pitchFamily="49" charset="0"/>
+                <a:cs typeface="Consolas" pitchFamily="49" charset="0"/>
+              </a:rPr>
+              <a:t>metadata[x] = {x,x+7}</a:t>
+            </a:r>
+          </a:p>
+          <a:p>
+            <a:endParaRPr lang="en-US" sz="900" dirty="0">
+              <a:solidFill>
+                <a:schemeClr val="tx1"/>
+              </a:solidFill>
+              <a:latin typeface="Consolas" pitchFamily="49" charset="0"/>
+              <a:cs typeface="Consolas" pitchFamily="49" charset="0"/>
+            </a:endParaRPr>
+          </a:p>
+          <a:p>
+            <a:r>
+              <a:rPr lang="en-US" sz="900" dirty="0" smtClean="0">
+                <a:solidFill>
+                  <a:schemeClr val="tx1"/>
+                </a:solidFill>
+                <a:latin typeface="Consolas" pitchFamily="49" charset="0"/>
+                <a:cs typeface="Consolas" pitchFamily="49" charset="0"/>
+              </a:rPr>
+              <a:t>metadata[y] = </a:t>
+            </a:r>
+          </a:p>
+          <a:p>
+            <a:r>
+              <a:rPr lang="en-US" sz="900" dirty="0">
+                <a:solidFill>
+                  <a:schemeClr val="tx1"/>
+                </a:solidFill>
+                <a:latin typeface="Consolas" pitchFamily="49" charset="0"/>
+                <a:cs typeface="Consolas" pitchFamily="49" charset="0"/>
+              </a:rPr>
+              <a:t> </a:t>
+            </a:r>
+            <a:r>
+              <a:rPr lang="en-US" sz="900" dirty="0" smtClean="0">
+                <a:solidFill>
+                  <a:schemeClr val="tx1"/>
+                </a:solidFill>
+                <a:latin typeface="Consolas" pitchFamily="49" charset="0"/>
+                <a:cs typeface="Consolas" pitchFamily="49" charset="0"/>
+              </a:rPr>
+              <a:t> metadata[x]</a:t>
+            </a:r>
+          </a:p>
+          <a:p>
+            <a:endParaRPr lang="en-US" sz="900" dirty="0">
+              <a:solidFill>
+                <a:schemeClr val="tx1"/>
+              </a:solidFill>
+              <a:latin typeface="Consolas" pitchFamily="49" charset="0"/>
+              <a:cs typeface="Consolas" pitchFamily="49" charset="0"/>
+            </a:endParaRPr>
+          </a:p>
+          <a:p>
+            <a:r>
+              <a:rPr lang="en-US" sz="900" dirty="0" smtClean="0">
+                <a:solidFill>
+                  <a:schemeClr val="tx1"/>
+                </a:solidFill>
+                <a:latin typeface="Consolas" pitchFamily="49" charset="0"/>
+                <a:cs typeface="Consolas" pitchFamily="49" charset="0"/>
+              </a:rPr>
+              <a:t>x+7 in metadata[x]?</a:t>
+            </a:r>
+          </a:p>
+          <a:p>
+            <a:r>
+              <a:rPr lang="en-US" sz="900" dirty="0" smtClean="0">
+                <a:solidFill>
+                  <a:srgbClr val="C00000"/>
+                </a:solidFill>
+                <a:latin typeface="Consolas" pitchFamily="49" charset="0"/>
+                <a:cs typeface="Consolas" pitchFamily="49" charset="0"/>
+              </a:rPr>
+              <a:t>  invalid[x] is true.</a:t>
+            </a:r>
+          </a:p>
+          <a:p>
+            <a:r>
+              <a:rPr lang="en-US" sz="900" dirty="0">
+                <a:solidFill>
+                  <a:srgbClr val="C00000"/>
+                </a:solidFill>
+                <a:latin typeface="Consolas" pitchFamily="49" charset="0"/>
+                <a:cs typeface="Consolas" pitchFamily="49" charset="0"/>
+              </a:rPr>
+              <a:t> </a:t>
+            </a:r>
+            <a:r>
+              <a:rPr lang="en-US" sz="900" dirty="0" smtClean="0">
+                <a:solidFill>
+                  <a:srgbClr val="C00000"/>
+                </a:solidFill>
+                <a:latin typeface="Consolas" pitchFamily="49" charset="0"/>
+                <a:cs typeface="Consolas" pitchFamily="49" charset="0"/>
+              </a:rPr>
+              <a:t> No error.</a:t>
+            </a:r>
+            <a:endParaRPr lang="en-US" sz="900" dirty="0">
+              <a:solidFill>
+                <a:srgbClr val="C00000"/>
+              </a:solidFill>
+              <a:latin typeface="Consolas" pitchFamily="49" charset="0"/>
+              <a:cs typeface="Consolas" pitchFamily="49" charset="0"/>
+            </a:endParaRPr>
+          </a:p>
+          <a:p>
+            <a:endParaRPr lang="en-US" sz="900" dirty="0">
+              <a:solidFill>
+                <a:schemeClr val="tx1"/>
+              </a:solidFill>
+              <a:latin typeface="Consolas" pitchFamily="49" charset="0"/>
+              <a:cs typeface="Consolas" pitchFamily="49" charset="0"/>
+            </a:endParaRPr>
+          </a:p>
+          <a:p>
+            <a:r>
+              <a:rPr lang="en-US" sz="900" dirty="0" smtClean="0">
+                <a:solidFill>
+                  <a:schemeClr val="tx1"/>
+                </a:solidFill>
+                <a:latin typeface="Consolas" pitchFamily="49" charset="0"/>
+                <a:cs typeface="Consolas" pitchFamily="49" charset="0"/>
+              </a:rPr>
+              <a:t>y+7 in metadata[y]?</a:t>
+            </a:r>
+          </a:p>
+          <a:p>
+            <a:r>
+              <a:rPr lang="en-US" sz="900" dirty="0">
+                <a:solidFill>
+                  <a:srgbClr val="C00000"/>
+                </a:solidFill>
+                <a:latin typeface="Consolas" pitchFamily="49" charset="0"/>
+                <a:cs typeface="Consolas" pitchFamily="49" charset="0"/>
+              </a:rPr>
+              <a:t> </a:t>
+            </a:r>
+            <a:r>
+              <a:rPr lang="en-US" sz="900" dirty="0" smtClean="0">
+                <a:solidFill>
+                  <a:srgbClr val="C00000"/>
+                </a:solidFill>
+                <a:latin typeface="Consolas" pitchFamily="49" charset="0"/>
+                <a:cs typeface="Consolas" pitchFamily="49" charset="0"/>
+              </a:rPr>
+              <a:t> invalid[y] is true.</a:t>
+            </a:r>
+          </a:p>
+          <a:p>
+            <a:r>
+              <a:rPr lang="en-US" sz="900" dirty="0" smtClean="0">
+                <a:solidFill>
+                  <a:srgbClr val="C00000"/>
+                </a:solidFill>
+                <a:latin typeface="Consolas" pitchFamily="49" charset="0"/>
+                <a:cs typeface="Consolas" pitchFamily="49" charset="0"/>
+              </a:rPr>
+              <a:t>  No error.</a:t>
+            </a:r>
+          </a:p>
+        </p:txBody>
+      </p:sp>
+      <p:cxnSp>
+        <p:nvCxnSpPr>
+          <p:cNvPr id="9" name="Straight Arrow Connector 8"/>
+          <p:cNvCxnSpPr/>
+          <p:nvPr/>
+        </p:nvCxnSpPr>
+        <p:spPr>
+          <a:xfrm flipV="1">
+            <a:off x="1169580" y="698585"/>
+            <a:ext cx="534923" cy="285564"/>
+          </a:xfrm>
+          <a:prstGeom prst="straightConnector1">
+            <a:avLst/>
+          </a:prstGeom>
+          <a:ln w="19050">
+            <a:solidFill>
+              <a:schemeClr val="tx1"/>
+            </a:solidFill>
+            <a:headEnd w="sm" len="sm"/>
+            <a:tailEnd type="arrow" w="sm" len="sm"/>
+          </a:ln>
+        </p:spPr>
+        <p:style>
+          <a:lnRef idx="1">
+            <a:schemeClr val="accent1"/>
+          </a:lnRef>
+          <a:fillRef idx="0">
+            <a:schemeClr val="accent1"/>
+          </a:fillRef>
+          <a:effectRef idx="0">
+            <a:schemeClr val="accent1"/>
+          </a:effectRef>
+          <a:fontRef idx="minor">
+            <a:schemeClr val="tx1"/>
+          </a:fontRef>
+        </p:style>
+      </p:cxnSp>
+      <p:cxnSp>
+        <p:nvCxnSpPr>
+          <p:cNvPr id="10" name="Straight Arrow Connector 9"/>
+          <p:cNvCxnSpPr/>
+          <p:nvPr/>
+        </p:nvCxnSpPr>
+        <p:spPr>
+          <a:xfrm flipV="1">
+            <a:off x="718160" y="1159445"/>
+            <a:ext cx="986343" cy="76810"/>
+          </a:xfrm>
+          <a:prstGeom prst="straightConnector1">
+            <a:avLst/>
+          </a:prstGeom>
+          <a:ln w="19050">
+            <a:solidFill>
+              <a:schemeClr val="tx1"/>
+            </a:solidFill>
+            <a:headEnd w="sm" len="sm"/>
+            <a:tailEnd type="arrow" w="sm" len="sm"/>
+          </a:ln>
+        </p:spPr>
+        <p:style>
+          <a:lnRef idx="1">
+            <a:schemeClr val="accent1"/>
+          </a:lnRef>
+          <a:fillRef idx="0">
+            <a:schemeClr val="accent1"/>
+          </a:fillRef>
+          <a:effectRef idx="0">
+            <a:schemeClr val="accent1"/>
+          </a:effectRef>
+          <a:fontRef idx="minor">
+            <a:schemeClr val="tx1"/>
+          </a:fontRef>
+        </p:style>
+      </p:cxnSp>
+      <p:cxnSp>
+        <p:nvCxnSpPr>
+          <p:cNvPr id="11" name="Straight Arrow Connector 10"/>
+          <p:cNvCxnSpPr/>
+          <p:nvPr/>
+        </p:nvCxnSpPr>
+        <p:spPr>
+          <a:xfrm>
+            <a:off x="713842" y="1505076"/>
+            <a:ext cx="963168" cy="115215"/>
+          </a:xfrm>
+          <a:prstGeom prst="straightConnector1">
+            <a:avLst/>
+          </a:prstGeom>
+          <a:ln w="19050">
+            <a:solidFill>
+              <a:schemeClr val="tx1"/>
+            </a:solidFill>
+            <a:headEnd w="sm" len="sm"/>
+            <a:tailEnd type="arrow" w="sm" len="sm"/>
+          </a:ln>
+        </p:spPr>
+        <p:style>
+          <a:lnRef idx="1">
+            <a:schemeClr val="accent1"/>
+          </a:lnRef>
+          <a:fillRef idx="0">
+            <a:schemeClr val="accent1"/>
+          </a:fillRef>
+          <a:effectRef idx="0">
+            <a:schemeClr val="accent1"/>
+          </a:effectRef>
+          <a:fontRef idx="minor">
+            <a:schemeClr val="tx1"/>
+          </a:fontRef>
+        </p:style>
+      </p:cxnSp>
+      <p:cxnSp>
+        <p:nvCxnSpPr>
+          <p:cNvPr id="12" name="Straight Arrow Connector 11"/>
+          <p:cNvCxnSpPr/>
+          <p:nvPr/>
+        </p:nvCxnSpPr>
+        <p:spPr>
+          <a:xfrm flipV="1">
+            <a:off x="1405455" y="391345"/>
+            <a:ext cx="271555" cy="307240"/>
+          </a:xfrm>
+          <a:prstGeom prst="straightConnector1">
+            <a:avLst/>
+          </a:prstGeom>
+          <a:ln w="19050">
+            <a:solidFill>
+              <a:schemeClr val="tx1"/>
+            </a:solidFill>
+            <a:headEnd w="sm" len="sm"/>
+            <a:tailEnd type="arrow" w="sm" len="sm"/>
+          </a:ln>
+        </p:spPr>
+        <p:style>
+          <a:lnRef idx="1">
+            <a:schemeClr val="accent1"/>
+          </a:lnRef>
+          <a:fillRef idx="0">
+            <a:schemeClr val="accent1"/>
+          </a:fillRef>
+          <a:effectRef idx="0">
+            <a:schemeClr val="accent1"/>
+          </a:effectRef>
+          <a:fontRef idx="minor">
+            <a:schemeClr val="tx1"/>
+          </a:fontRef>
+        </p:style>
+      </p:cxnSp>
+      <p:cxnSp>
+        <p:nvCxnSpPr>
+          <p:cNvPr id="13" name="Straight Arrow Connector 12"/>
+          <p:cNvCxnSpPr/>
+          <p:nvPr/>
+        </p:nvCxnSpPr>
+        <p:spPr>
+          <a:xfrm>
+            <a:off x="1704503" y="352940"/>
+            <a:ext cx="1316682" cy="0"/>
+          </a:xfrm>
+          <a:prstGeom prst="straightConnector1">
+            <a:avLst/>
+          </a:prstGeom>
+          <a:ln w="19050">
+            <a:solidFill>
+              <a:srgbClr val="C00000"/>
+            </a:solidFill>
+            <a:headEnd w="sm" len="sm"/>
+            <a:tailEnd type="none" w="sm" len="sm"/>
+          </a:ln>
+        </p:spPr>
+        <p:style>
+          <a:lnRef idx="1">
+            <a:schemeClr val="accent1"/>
+          </a:lnRef>
+          <a:fillRef idx="0">
+            <a:schemeClr val="accent1"/>
+          </a:fillRef>
+          <a:effectRef idx="0">
+            <a:schemeClr val="accent1"/>
+          </a:effectRef>
+          <a:fontRef idx="minor">
+            <a:schemeClr val="tx1"/>
+          </a:fontRef>
+        </p:style>
+      </p:cxnSp>
+      <p:sp>
+        <p:nvSpPr>
+          <p:cNvPr id="14" name="Cross 13"/>
+          <p:cNvSpPr/>
+          <p:nvPr/>
+        </p:nvSpPr>
+        <p:spPr>
+          <a:xfrm rot="2672377">
+            <a:off x="1445222" y="451894"/>
+            <a:ext cx="192025" cy="192025"/>
+          </a:xfrm>
+          <a:prstGeom prst="plus">
+            <a:avLst>
+              <a:gd name="adj" fmla="val 41501"/>
+            </a:avLst>
+          </a:prstGeom>
+          <a:solidFill>
+            <a:srgbClr val="C00000"/>
+          </a:solidFill>
+          <a:ln>
+            <a:noFill/>
+          </a:ln>
+        </p:spPr>
+        <p:style>
+          <a:lnRef idx="2">
+            <a:schemeClr val="accent1">
+              <a:shade val="50000"/>
+            </a:schemeClr>
+          </a:lnRef>
+          <a:fillRef idx="1">
+            <a:schemeClr val="accent1"/>
+          </a:fillRef>
+          <a:effectRef idx="0">
+            <a:schemeClr val="accent1"/>
+          </a:effectRef>
+          <a:fontRef idx="minor">
+            <a:schemeClr val="lt1"/>
+          </a:fontRef>
+        </p:style>
+        <p:txBody>
+          <a:bodyPr rtlCol="0" anchor="ctr"/>
+          <a:lstStyle/>
+          <a:p>
+            <a:pPr algn="ctr"/>
+            <a:endParaRPr lang="en-US"/>
+          </a:p>
+        </p:txBody>
+      </p:sp>
+      <p:sp>
+        <p:nvSpPr>
+          <p:cNvPr id="17" name="Rectangle 16"/>
+          <p:cNvSpPr/>
+          <p:nvPr/>
+        </p:nvSpPr>
+        <p:spPr>
+          <a:xfrm>
+            <a:off x="3291128" y="194373"/>
+            <a:ext cx="1689821" cy="1809982"/>
+          </a:xfrm>
+          <a:prstGeom prst="rect">
+            <a:avLst/>
+          </a:prstGeom>
+          <a:noFill/>
+          <a:ln w="12700">
+            <a:noFill/>
+          </a:ln>
+        </p:spPr>
+        <p:style>
+          <a:lnRef idx="2">
+            <a:schemeClr val="accent1">
+              <a:shade val="50000"/>
+            </a:schemeClr>
+          </a:lnRef>
+          <a:fillRef idx="1">
+            <a:schemeClr val="accent1"/>
+          </a:fillRef>
+          <a:effectRef idx="0">
+            <a:schemeClr val="accent1"/>
+          </a:effectRef>
+          <a:fontRef idx="minor">
+            <a:schemeClr val="lt1"/>
+          </a:fontRef>
+        </p:style>
+        <p:txBody>
+          <a:bodyPr rtlCol="0" anchor="ctr"/>
+          <a:lstStyle/>
+          <a:p>
+            <a:r>
+              <a:rPr lang="en-US" sz="900" dirty="0" smtClean="0">
+                <a:solidFill>
+                  <a:schemeClr val="tx1"/>
+                </a:solidFill>
+                <a:latin typeface="Consolas" pitchFamily="49" charset="0"/>
+                <a:cs typeface="Consolas" pitchFamily="49" charset="0"/>
+              </a:rPr>
+              <a:t>invalid[x] = true</a:t>
+            </a:r>
+          </a:p>
+          <a:p>
+            <a:endParaRPr lang="en-US" sz="900" dirty="0" smtClean="0">
+              <a:solidFill>
+                <a:schemeClr val="tx1"/>
+              </a:solidFill>
+              <a:latin typeface="Consolas" pitchFamily="49" charset="0"/>
+              <a:cs typeface="Consolas" pitchFamily="49" charset="0"/>
+            </a:endParaRPr>
+          </a:p>
+          <a:p>
+            <a:endParaRPr lang="en-US" sz="900" dirty="0">
+              <a:solidFill>
+                <a:schemeClr val="tx1"/>
+              </a:solidFill>
+              <a:latin typeface="Consolas" pitchFamily="49" charset="0"/>
+              <a:cs typeface="Consolas" pitchFamily="49" charset="0"/>
+            </a:endParaRPr>
+          </a:p>
+          <a:p>
+            <a:r>
+              <a:rPr lang="en-US" sz="900" dirty="0" smtClean="0">
+                <a:solidFill>
+                  <a:schemeClr val="tx1"/>
+                </a:solidFill>
+                <a:latin typeface="Consolas" pitchFamily="49" charset="0"/>
+                <a:cs typeface="Consolas" pitchFamily="49" charset="0"/>
+              </a:rPr>
+              <a:t>invalid[y] = invalid[x]</a:t>
+            </a:r>
+          </a:p>
+          <a:p>
+            <a:endParaRPr lang="en-US" sz="900" dirty="0" smtClean="0">
+              <a:solidFill>
+                <a:schemeClr val="tx1"/>
+              </a:solidFill>
+              <a:latin typeface="Consolas" pitchFamily="49" charset="0"/>
+              <a:cs typeface="Consolas" pitchFamily="49" charset="0"/>
+            </a:endParaRPr>
+          </a:p>
+          <a:p>
+            <a:endParaRPr lang="en-US" sz="900" dirty="0">
+              <a:solidFill>
+                <a:schemeClr val="tx1"/>
+              </a:solidFill>
+              <a:latin typeface="Consolas" pitchFamily="49" charset="0"/>
+              <a:cs typeface="Consolas" pitchFamily="49" charset="0"/>
+            </a:endParaRPr>
+          </a:p>
+          <a:p>
+            <a:endParaRPr lang="en-US" sz="900" dirty="0" smtClean="0">
+              <a:solidFill>
+                <a:schemeClr val="tx1"/>
+              </a:solidFill>
+              <a:latin typeface="Consolas" pitchFamily="49" charset="0"/>
+              <a:cs typeface="Consolas" pitchFamily="49" charset="0"/>
+            </a:endParaRPr>
+          </a:p>
+          <a:p>
+            <a:endParaRPr lang="en-US" sz="900" dirty="0">
+              <a:solidFill>
+                <a:schemeClr val="tx1"/>
+              </a:solidFill>
+              <a:latin typeface="Consolas" pitchFamily="49" charset="0"/>
+              <a:cs typeface="Consolas" pitchFamily="49" charset="0"/>
+            </a:endParaRPr>
+          </a:p>
+          <a:p>
+            <a:endParaRPr lang="en-US" sz="900" dirty="0" smtClean="0">
+              <a:solidFill>
+                <a:schemeClr val="tx1"/>
+              </a:solidFill>
+              <a:latin typeface="Consolas" pitchFamily="49" charset="0"/>
+              <a:cs typeface="Consolas" pitchFamily="49" charset="0"/>
+            </a:endParaRPr>
+          </a:p>
+          <a:p>
+            <a:endParaRPr lang="en-US" sz="900" dirty="0">
+              <a:solidFill>
+                <a:schemeClr val="tx1"/>
+              </a:solidFill>
+              <a:latin typeface="Consolas" pitchFamily="49" charset="0"/>
+              <a:cs typeface="Consolas" pitchFamily="49" charset="0"/>
+            </a:endParaRPr>
+          </a:p>
+          <a:p>
+            <a:endParaRPr lang="en-US" sz="900" dirty="0" smtClean="0">
+              <a:solidFill>
+                <a:schemeClr val="tx1"/>
+              </a:solidFill>
+              <a:latin typeface="Consolas" pitchFamily="49" charset="0"/>
+              <a:cs typeface="Consolas" pitchFamily="49" charset="0"/>
+            </a:endParaRPr>
+          </a:p>
+          <a:p>
+            <a:endParaRPr lang="en-US" sz="900" dirty="0">
+              <a:solidFill>
+                <a:schemeClr val="tx1"/>
+              </a:solidFill>
+              <a:latin typeface="Consolas" pitchFamily="49" charset="0"/>
+              <a:cs typeface="Consolas" pitchFamily="49" charset="0"/>
+            </a:endParaRPr>
+          </a:p>
+        </p:txBody>
+      </p:sp>
+      <p:cxnSp>
+        <p:nvCxnSpPr>
+          <p:cNvPr id="15" name="Straight Arrow Connector 14"/>
+          <p:cNvCxnSpPr/>
+          <p:nvPr/>
+        </p:nvCxnSpPr>
+        <p:spPr>
+          <a:xfrm>
+            <a:off x="3085186" y="316758"/>
+            <a:ext cx="268834" cy="0"/>
+          </a:xfrm>
+          <a:prstGeom prst="straightConnector1">
+            <a:avLst/>
+          </a:prstGeom>
+          <a:ln w="19050">
+            <a:solidFill>
+              <a:srgbClr val="C00000"/>
+            </a:solidFill>
+            <a:headEnd w="sm" len="sm"/>
+            <a:tailEnd type="arrow" w="sm" len="sm"/>
+          </a:ln>
+        </p:spPr>
+        <p:style>
+          <a:lnRef idx="1">
+            <a:schemeClr val="accent1"/>
+          </a:lnRef>
+          <a:fillRef idx="0">
+            <a:schemeClr val="accent1"/>
+          </a:fillRef>
+          <a:effectRef idx="0">
+            <a:schemeClr val="accent1"/>
+          </a:effectRef>
+          <a:fontRef idx="minor">
+            <a:schemeClr val="tx1"/>
+          </a:fontRef>
+        </p:style>
+      </p:cxnSp>
+      <p:cxnSp>
+        <p:nvCxnSpPr>
+          <p:cNvPr id="28" name="Straight Arrow Connector 27"/>
+          <p:cNvCxnSpPr/>
+          <p:nvPr/>
+        </p:nvCxnSpPr>
+        <p:spPr>
+          <a:xfrm>
+            <a:off x="2588624" y="668786"/>
+            <a:ext cx="765396" cy="87406"/>
+          </a:xfrm>
+          <a:prstGeom prst="straightConnector1">
+            <a:avLst/>
+          </a:prstGeom>
+          <a:ln w="19050">
+            <a:solidFill>
+              <a:schemeClr val="tx1"/>
+            </a:solidFill>
+            <a:headEnd w="sm" len="sm"/>
+            <a:tailEnd type="arrow" w="sm" len="sm"/>
+          </a:ln>
+        </p:spPr>
+        <p:style>
+          <a:lnRef idx="1">
+            <a:schemeClr val="accent1"/>
+          </a:lnRef>
+          <a:fillRef idx="0">
+            <a:schemeClr val="accent1"/>
+          </a:fillRef>
+          <a:effectRef idx="0">
+            <a:schemeClr val="accent1"/>
+          </a:effectRef>
+          <a:fontRef idx="minor">
+            <a:schemeClr val="tx1"/>
+          </a:fontRef>
+        </p:style>
+      </p:cxnSp>
+      <p:cxnSp>
+        <p:nvCxnSpPr>
+          <p:cNvPr id="30" name="Straight Arrow Connector 29"/>
+          <p:cNvCxnSpPr/>
+          <p:nvPr/>
+        </p:nvCxnSpPr>
+        <p:spPr>
+          <a:xfrm flipH="1">
+            <a:off x="2971322" y="391345"/>
+            <a:ext cx="459508" cy="729695"/>
+          </a:xfrm>
+          <a:prstGeom prst="straightConnector1">
+            <a:avLst/>
+          </a:prstGeom>
+          <a:ln w="19050">
+            <a:solidFill>
+              <a:srgbClr val="C00000"/>
+            </a:solidFill>
+            <a:headEnd w="sm" len="sm"/>
+            <a:tailEnd type="arrow" w="sm" len="sm"/>
+          </a:ln>
+        </p:spPr>
+        <p:style>
+          <a:lnRef idx="1">
+            <a:schemeClr val="accent1"/>
+          </a:lnRef>
+          <a:fillRef idx="0">
+            <a:schemeClr val="accent1"/>
+          </a:fillRef>
+          <a:effectRef idx="0">
+            <a:schemeClr val="accent1"/>
+          </a:effectRef>
+          <a:fontRef idx="minor">
+            <a:schemeClr val="tx1"/>
+          </a:fontRef>
+        </p:style>
+      </p:cxnSp>
+      <p:cxnSp>
+        <p:nvCxnSpPr>
+          <p:cNvPr id="37" name="Straight Arrow Connector 36"/>
+          <p:cNvCxnSpPr/>
+          <p:nvPr/>
+        </p:nvCxnSpPr>
+        <p:spPr>
+          <a:xfrm flipH="1">
+            <a:off x="3021185" y="841367"/>
+            <a:ext cx="459508" cy="892069"/>
+          </a:xfrm>
+          <a:prstGeom prst="straightConnector1">
+            <a:avLst/>
+          </a:prstGeom>
+          <a:ln w="19050">
+            <a:solidFill>
+              <a:srgbClr val="C00000"/>
+            </a:solidFill>
+            <a:headEnd w="sm" len="sm"/>
+            <a:tailEnd type="arrow" w="sm" len="sm"/>
+          </a:ln>
+        </p:spPr>
+        <p:style>
+          <a:lnRef idx="1">
+            <a:schemeClr val="accent1"/>
+          </a:lnRef>
+          <a:fillRef idx="0">
+            <a:schemeClr val="accent1"/>
+          </a:fillRef>
+          <a:effectRef idx="0">
+            <a:schemeClr val="accent1"/>
+          </a:effectRef>
+          <a:fontRef idx="minor">
+            <a:schemeClr val="tx1"/>
+          </a:fontRef>
+        </p:style>
+      </p:cxnSp>
+    </p:spTree>
+    <p:extLst>
+      <p:ext uri="{BB962C8B-B14F-4D97-AF65-F5344CB8AC3E}">
+        <p14:creationId xmlns:p14="http://schemas.microsoft.com/office/powerpoint/2010/main" val="2000229893"/>
       </p:ext>
     </p:extLst>
   </p:cSld>

</xml_diff>

<commit_message>
Double-check for consistent figure fonts.
</commit_message>
<xml_diff>
--- a/figs_src/diagrams-wide.pptx
+++ b/figs_src/diagrams-wide.pptx
@@ -157,7 +157,7 @@
           </a:prstGeom>
         </p:spPr>
         <p:txBody>
-          <a:bodyPr vert="horz" lIns="71569" tIns="35786" rIns="71569" bIns="35786" rtlCol="0"/>
+          <a:bodyPr vert="horz" lIns="71558" tIns="35781" rIns="71558" bIns="35781" rtlCol="0"/>
           <a:lstStyle>
             <a:lvl1pPr algn="l">
               <a:defRPr sz="900"/>
@@ -188,7 +188,7 @@
           </a:prstGeom>
         </p:spPr>
         <p:txBody>
-          <a:bodyPr vert="horz" lIns="71569" tIns="35786" rIns="71569" bIns="35786" rtlCol="0"/>
+          <a:bodyPr vert="horz" lIns="71558" tIns="35781" rIns="71558" bIns="35781" rtlCol="0"/>
           <a:lstStyle>
             <a:lvl1pPr algn="r">
               <a:defRPr sz="900"/>
@@ -197,7 +197,7 @@
           <a:p>
             <a:fld id="{843567C3-09B7-4EC5-8695-9659B6A4537F}" type="datetimeFigureOut">
               <a:rPr lang="en-US" smtClean="0"/>
-              <a:t>9/11/2014</a:t>
+              <a:t>9/12/2014</a:t>
             </a:fld>
             <a:endParaRPr lang="en-US"/>
           </a:p>
@@ -229,7 +229,7 @@
           </a:ln>
         </p:spPr>
         <p:txBody>
-          <a:bodyPr vert="horz" lIns="71569" tIns="35786" rIns="71569" bIns="35786" rtlCol="0" anchor="ctr"/>
+          <a:bodyPr vert="horz" lIns="71558" tIns="35781" rIns="71558" bIns="35781" rtlCol="0" anchor="ctr"/>
           <a:lstStyle/>
           <a:p>
             <a:endParaRPr lang="en-US"/>
@@ -256,7 +256,7 @@
           </a:prstGeom>
         </p:spPr>
         <p:txBody>
-          <a:bodyPr vert="horz" lIns="71569" tIns="35786" rIns="71569" bIns="35786" rtlCol="0"/>
+          <a:bodyPr vert="horz" lIns="71558" tIns="35781" rIns="71558" bIns="35781" rtlCol="0"/>
           <a:lstStyle/>
           <a:p>
             <a:pPr lvl="0"/>
@@ -316,7 +316,7 @@
           </a:prstGeom>
         </p:spPr>
         <p:txBody>
-          <a:bodyPr vert="horz" lIns="71569" tIns="35786" rIns="71569" bIns="35786" rtlCol="0" anchor="b"/>
+          <a:bodyPr vert="horz" lIns="71558" tIns="35781" rIns="71558" bIns="35781" rtlCol="0" anchor="b"/>
           <a:lstStyle>
             <a:lvl1pPr algn="l">
               <a:defRPr sz="900"/>
@@ -347,7 +347,7 @@
           </a:prstGeom>
         </p:spPr>
         <p:txBody>
-          <a:bodyPr vert="horz" lIns="71569" tIns="35786" rIns="71569" bIns="35786" rtlCol="0" anchor="b"/>
+          <a:bodyPr vert="horz" lIns="71558" tIns="35781" rIns="71558" bIns="35781" rtlCol="0" anchor="b"/>
           <a:lstStyle>
             <a:lvl1pPr algn="r">
               <a:defRPr sz="900"/>
@@ -647,7 +647,7 @@
             <a:fld id="{1D8BD707-D9CF-40AE-B4C6-C98DA3205C09}" type="datetimeFigureOut">
               <a:rPr lang="en-US" smtClean="0"/>
               <a:pPr/>
-              <a:t>9/11/2014</a:t>
+              <a:t>9/12/2014</a:t>
             </a:fld>
             <a:endParaRPr lang="en-US"/>
           </a:p>
@@ -814,7 +814,7 @@
             <a:fld id="{1D8BD707-D9CF-40AE-B4C6-C98DA3205C09}" type="datetimeFigureOut">
               <a:rPr lang="en-US" smtClean="0"/>
               <a:pPr/>
-              <a:t>9/11/2014</a:t>
+              <a:t>9/12/2014</a:t>
             </a:fld>
             <a:endParaRPr lang="en-US"/>
           </a:p>
@@ -991,7 +991,7 @@
             <a:fld id="{1D8BD707-D9CF-40AE-B4C6-C98DA3205C09}" type="datetimeFigureOut">
               <a:rPr lang="en-US" smtClean="0"/>
               <a:pPr/>
-              <a:t>9/11/2014</a:t>
+              <a:t>9/12/2014</a:t>
             </a:fld>
             <a:endParaRPr lang="en-US"/>
           </a:p>
@@ -1158,7 +1158,7 @@
             <a:fld id="{1D8BD707-D9CF-40AE-B4C6-C98DA3205C09}" type="datetimeFigureOut">
               <a:rPr lang="en-US" smtClean="0"/>
               <a:pPr/>
-              <a:t>9/11/2014</a:t>
+              <a:t>9/12/2014</a:t>
             </a:fld>
             <a:endParaRPr lang="en-US"/>
           </a:p>
@@ -1401,7 +1401,7 @@
             <a:fld id="{1D8BD707-D9CF-40AE-B4C6-C98DA3205C09}" type="datetimeFigureOut">
               <a:rPr lang="en-US" smtClean="0"/>
               <a:pPr/>
-              <a:t>9/11/2014</a:t>
+              <a:t>9/12/2014</a:t>
             </a:fld>
             <a:endParaRPr lang="en-US"/>
           </a:p>
@@ -1686,7 +1686,7 @@
             <a:fld id="{1D8BD707-D9CF-40AE-B4C6-C98DA3205C09}" type="datetimeFigureOut">
               <a:rPr lang="en-US" smtClean="0"/>
               <a:pPr/>
-              <a:t>9/11/2014</a:t>
+              <a:t>9/12/2014</a:t>
             </a:fld>
             <a:endParaRPr lang="en-US"/>
           </a:p>
@@ -2105,7 +2105,7 @@
             <a:fld id="{1D8BD707-D9CF-40AE-B4C6-C98DA3205C09}" type="datetimeFigureOut">
               <a:rPr lang="en-US" smtClean="0"/>
               <a:pPr/>
-              <a:t>9/11/2014</a:t>
+              <a:t>9/12/2014</a:t>
             </a:fld>
             <a:endParaRPr lang="en-US"/>
           </a:p>
@@ -2220,7 +2220,7 @@
             <a:fld id="{1D8BD707-D9CF-40AE-B4C6-C98DA3205C09}" type="datetimeFigureOut">
               <a:rPr lang="en-US" smtClean="0"/>
               <a:pPr/>
-              <a:t>9/11/2014</a:t>
+              <a:t>9/12/2014</a:t>
             </a:fld>
             <a:endParaRPr lang="en-US"/>
           </a:p>
@@ -2312,7 +2312,7 @@
             <a:fld id="{1D8BD707-D9CF-40AE-B4C6-C98DA3205C09}" type="datetimeFigureOut">
               <a:rPr lang="en-US" smtClean="0"/>
               <a:pPr/>
-              <a:t>9/11/2014</a:t>
+              <a:t>9/12/2014</a:t>
             </a:fld>
             <a:endParaRPr lang="en-US"/>
           </a:p>
@@ -2586,7 +2586,7 @@
             <a:fld id="{1D8BD707-D9CF-40AE-B4C6-C98DA3205C09}" type="datetimeFigureOut">
               <a:rPr lang="en-US" smtClean="0"/>
               <a:pPr/>
-              <a:t>9/11/2014</a:t>
+              <a:t>9/12/2014</a:t>
             </a:fld>
             <a:endParaRPr lang="en-US"/>
           </a:p>
@@ -2836,7 +2836,7 @@
             <a:fld id="{1D8BD707-D9CF-40AE-B4C6-C98DA3205C09}" type="datetimeFigureOut">
               <a:rPr lang="en-US" smtClean="0"/>
               <a:pPr/>
-              <a:t>9/11/2014</a:t>
+              <a:t>9/12/2014</a:t>
             </a:fld>
             <a:endParaRPr lang="en-US"/>
           </a:p>
@@ -3046,7 +3046,7 @@
             <a:fld id="{1D8BD707-D9CF-40AE-B4C6-C98DA3205C09}" type="datetimeFigureOut">
               <a:rPr lang="en-US" smtClean="0"/>
               <a:pPr/>
-              <a:t>9/11/2014</a:t>
+              <a:t>9/12/2014</a:t>
             </a:fld>
             <a:endParaRPr lang="en-US"/>
           </a:p>
@@ -13417,8 +13417,8 @@
         </p:nvSpPr>
         <p:spPr>
           <a:xfrm>
-            <a:off x="329896" y="-23007"/>
-            <a:ext cx="1152150" cy="215444"/>
+            <a:off x="238819" y="-30701"/>
+            <a:ext cx="1334304" cy="230832"/>
           </a:xfrm>
           <a:prstGeom prst="rect">
             <a:avLst/>
@@ -13431,14 +13431,15 @@
           </a:bodyPr>
           <a:lstStyle/>
           <a:p>
-            <a:r>
-              <a:rPr lang="en-US" sz="800" dirty="0" smtClean="0">
+            <a:pPr algn="ctr"/>
+            <a:r>
+              <a:rPr lang="en-US" sz="900" dirty="0" smtClean="0">
                 <a:latin typeface="Times New Roman" pitchFamily="18" charset="0"/>
                 <a:cs typeface="Times New Roman" pitchFamily="18" charset="0"/>
               </a:rPr>
               <a:t>Main Core (High-level)</a:t>
             </a:r>
-            <a:endParaRPr lang="en-US" sz="800" dirty="0">
+            <a:endParaRPr lang="en-US" sz="900" dirty="0">
               <a:latin typeface="Times New Roman" pitchFamily="18" charset="0"/>
               <a:cs typeface="Times New Roman" pitchFamily="18" charset="0"/>
             </a:endParaRPr>
@@ -13453,8 +13454,8 @@
         </p:nvSpPr>
         <p:spPr>
           <a:xfrm>
-            <a:off x="2309611" y="-23007"/>
-            <a:ext cx="1152150" cy="215444"/>
+            <a:off x="2248266" y="-30701"/>
+            <a:ext cx="1274839" cy="230832"/>
           </a:xfrm>
           <a:prstGeom prst="rect">
             <a:avLst/>
@@ -13467,14 +13468,15 @@
           </a:bodyPr>
           <a:lstStyle/>
           <a:p>
-            <a:r>
-              <a:rPr lang="en-US" sz="800" dirty="0" smtClean="0">
+            <a:pPr algn="ctr"/>
+            <a:r>
+              <a:rPr lang="en-US" sz="900" dirty="0" smtClean="0">
                 <a:latin typeface="Times New Roman" pitchFamily="18" charset="0"/>
                 <a:cs typeface="Times New Roman" pitchFamily="18" charset="0"/>
               </a:rPr>
               <a:t>Main Core (Assembly)</a:t>
             </a:r>
-            <a:endParaRPr lang="en-US" sz="800" dirty="0">
+            <a:endParaRPr lang="en-US" sz="900" dirty="0">
               <a:latin typeface="Times New Roman" pitchFamily="18" charset="0"/>
               <a:cs typeface="Times New Roman" pitchFamily="18" charset="0"/>
             </a:endParaRPr>
@@ -13489,8 +13491,8 @@
         </p:nvSpPr>
         <p:spPr>
           <a:xfrm>
-            <a:off x="4594709" y="-23007"/>
-            <a:ext cx="1152150" cy="215444"/>
+            <a:off x="4594709" y="-30701"/>
+            <a:ext cx="1152150" cy="230832"/>
           </a:xfrm>
           <a:prstGeom prst="rect">
             <a:avLst/>
@@ -13505,13 +13507,13 @@
           <a:p>
             <a:pPr algn="ctr"/>
             <a:r>
-              <a:rPr lang="en-US" sz="800" dirty="0" smtClean="0">
+              <a:rPr lang="en-US" sz="900" dirty="0" smtClean="0">
                 <a:latin typeface="Times New Roman" pitchFamily="18" charset="0"/>
                 <a:cs typeface="Times New Roman" pitchFamily="18" charset="0"/>
               </a:rPr>
               <a:t>Monitoring Core</a:t>
             </a:r>
-            <a:endParaRPr lang="en-US" sz="800" dirty="0">
+            <a:endParaRPr lang="en-US" sz="900" dirty="0">
               <a:latin typeface="Times New Roman" pitchFamily="18" charset="0"/>
               <a:cs typeface="Times New Roman" pitchFamily="18" charset="0"/>
             </a:endParaRPr>
@@ -14432,8 +14434,8 @@
         </p:nvSpPr>
         <p:spPr>
           <a:xfrm>
-            <a:off x="192012" y="-23007"/>
-            <a:ext cx="1152150" cy="215444"/>
+            <a:off x="108803" y="-31512"/>
+            <a:ext cx="1318567" cy="230832"/>
           </a:xfrm>
           <a:prstGeom prst="rect">
             <a:avLst/>
@@ -14446,14 +14448,15 @@
           </a:bodyPr>
           <a:lstStyle/>
           <a:p>
-            <a:r>
-              <a:rPr lang="en-US" sz="800" dirty="0" smtClean="0">
+            <a:pPr algn="ctr"/>
+            <a:r>
+              <a:rPr lang="en-US" sz="900" dirty="0" smtClean="0">
                 <a:latin typeface="Times New Roman" pitchFamily="18" charset="0"/>
                 <a:cs typeface="Times New Roman" pitchFamily="18" charset="0"/>
               </a:rPr>
               <a:t>Main Core (Assembly)</a:t>
             </a:r>
-            <a:endParaRPr lang="en-US" sz="800" dirty="0">
+            <a:endParaRPr lang="en-US" sz="900" dirty="0">
               <a:latin typeface="Times New Roman" pitchFamily="18" charset="0"/>
               <a:cs typeface="Times New Roman" pitchFamily="18" charset="0"/>
             </a:endParaRPr>
@@ -14468,8 +14471,8 @@
         </p:nvSpPr>
         <p:spPr>
           <a:xfrm>
-            <a:off x="1155334" y="170895"/>
-            <a:ext cx="710492" cy="215444"/>
+            <a:off x="2366687" y="-31512"/>
+            <a:ext cx="784107" cy="230832"/>
           </a:xfrm>
           <a:prstGeom prst="rect">
             <a:avLst/>
@@ -14484,13 +14487,13 @@
           <a:p>
             <a:pPr algn="ctr"/>
             <a:r>
-              <a:rPr lang="en-US" sz="800" dirty="0" smtClean="0">
+              <a:rPr lang="en-US" sz="900" dirty="0" smtClean="0">
                 <a:latin typeface="Times New Roman" pitchFamily="18" charset="0"/>
                 <a:cs typeface="Times New Roman" pitchFamily="18" charset="0"/>
               </a:rPr>
               <a:t>Invalidation</a:t>
             </a:r>
-            <a:endParaRPr lang="en-US" sz="800" dirty="0">
+            <a:endParaRPr lang="en-US" sz="900" dirty="0">
               <a:latin typeface="Times New Roman" pitchFamily="18" charset="0"/>
               <a:cs typeface="Times New Roman" pitchFamily="18" charset="0"/>
             </a:endParaRPr>
@@ -14505,8 +14508,8 @@
         </p:nvSpPr>
         <p:spPr>
           <a:xfrm>
-            <a:off x="4582980" y="-23007"/>
-            <a:ext cx="1152150" cy="215444"/>
+            <a:off x="4582980" y="-31512"/>
+            <a:ext cx="1152150" cy="230832"/>
           </a:xfrm>
           <a:prstGeom prst="rect">
             <a:avLst/>
@@ -14521,13 +14524,13 @@
           <a:p>
             <a:pPr algn="ctr"/>
             <a:r>
-              <a:rPr lang="en-US" sz="800" dirty="0" smtClean="0">
+              <a:rPr lang="en-US" sz="900" dirty="0" smtClean="0">
                 <a:latin typeface="Times New Roman" pitchFamily="18" charset="0"/>
                 <a:cs typeface="Times New Roman" pitchFamily="18" charset="0"/>
               </a:rPr>
               <a:t>Monitoring Core</a:t>
             </a:r>
-            <a:endParaRPr lang="en-US" sz="800" dirty="0">
+            <a:endParaRPr lang="en-US" sz="900" dirty="0">
               <a:latin typeface="Times New Roman" pitchFamily="18" charset="0"/>
               <a:cs typeface="Times New Roman" pitchFamily="18" charset="0"/>
             </a:endParaRPr>
@@ -14596,14 +14599,7 @@
                 <a:latin typeface="Consolas" pitchFamily="49" charset="0"/>
                 <a:cs typeface="Consolas" pitchFamily="49" charset="0"/>
               </a:rPr>
-              <a:t>2</a:t>
-            </a:r>
-            <a:r>
-              <a:rPr lang="en-US" sz="600" dirty="0" smtClean="0">
-                <a:latin typeface="Consolas" pitchFamily="49" charset="0"/>
-                <a:cs typeface="Consolas" pitchFamily="49" charset="0"/>
-              </a:rPr>
-              <a:t>: if (</a:t>
+              <a:t>2: if (</a:t>
             </a:r>
             <a:r>
               <a:rPr lang="en-US" sz="600" dirty="0" err="1" smtClean="0">
@@ -14806,14 +14802,7 @@
                 <a:latin typeface="Consolas" pitchFamily="49" charset="0"/>
                 <a:cs typeface="Consolas" pitchFamily="49" charset="0"/>
               </a:rPr>
-              <a:t>[r1 + 12] </a:t>
-            </a:r>
-            <a:r>
-              <a:rPr lang="en-US" sz="600" dirty="0" smtClean="0">
-                <a:latin typeface="Consolas" pitchFamily="49" charset="0"/>
-                <a:cs typeface="Consolas" pitchFamily="49" charset="0"/>
-              </a:rPr>
-              <a:t>= </a:t>
+              <a:t>[r1 + 12] = </a:t>
             </a:r>
             <a:r>
               <a:rPr lang="en-US" sz="600" dirty="0" err="1" smtClean="0">
@@ -14848,125 +14837,97 @@
                 <a:latin typeface="Consolas" pitchFamily="49" charset="0"/>
                 <a:cs typeface="Consolas" pitchFamily="49" charset="0"/>
               </a:rPr>
-              <a:t>4</a:t>
+              <a:t>4: if (</a:t>
+            </a:r>
+            <a:r>
+              <a:rPr lang="en-US" sz="600" dirty="0" err="1" smtClean="0">
+                <a:latin typeface="Consolas" pitchFamily="49" charset="0"/>
+                <a:cs typeface="Consolas" pitchFamily="49" charset="0"/>
+              </a:rPr>
+              <a:t>rf_invalid</a:t>
             </a:r>
             <a:r>
               <a:rPr lang="en-US" sz="600" dirty="0" smtClean="0">
                 <a:latin typeface="Consolas" pitchFamily="49" charset="0"/>
                 <a:cs typeface="Consolas" pitchFamily="49" charset="0"/>
               </a:rPr>
-              <a:t>: </a:t>
+              <a:t>[2] || </a:t>
+            </a:r>
+            <a:r>
+              <a:rPr lang="en-US" sz="600" dirty="0" err="1" smtClean="0">
+                <a:latin typeface="Consolas" pitchFamily="49" charset="0"/>
+                <a:cs typeface="Consolas" pitchFamily="49" charset="0"/>
+              </a:rPr>
+              <a:t>rf_invalid</a:t>
             </a:r>
             <a:r>
               <a:rPr lang="en-US" sz="600" dirty="0" smtClean="0">
                 <a:latin typeface="Consolas" pitchFamily="49" charset="0"/>
                 <a:cs typeface="Consolas" pitchFamily="49" charset="0"/>
               </a:rPr>
-              <a:t>if </a:t>
+              <a:t>[3]) {</a:t>
+            </a:r>
+          </a:p>
+          <a:p>
+            <a:r>
+              <a:rPr lang="en-US" sz="600" dirty="0">
+                <a:latin typeface="Consolas" pitchFamily="49" charset="0"/>
+                <a:cs typeface="Consolas" pitchFamily="49" charset="0"/>
+              </a:rPr>
+              <a:t> </a:t>
             </a:r>
             <a:r>
               <a:rPr lang="en-US" sz="600" dirty="0" smtClean="0">
                 <a:latin typeface="Consolas" pitchFamily="49" charset="0"/>
                 <a:cs typeface="Consolas" pitchFamily="49" charset="0"/>
               </a:rPr>
-              <a:t>(</a:t>
+              <a:t>    // drop monitoring</a:t>
+            </a:r>
+          </a:p>
+          <a:p>
+            <a:r>
+              <a:rPr lang="en-US" sz="600" dirty="0">
+                <a:latin typeface="Consolas" pitchFamily="49" charset="0"/>
+                <a:cs typeface="Consolas" pitchFamily="49" charset="0"/>
+              </a:rPr>
+              <a:t> </a:t>
+            </a:r>
+            <a:r>
+              <a:rPr lang="en-US" sz="600" dirty="0" smtClean="0">
+                <a:latin typeface="Consolas" pitchFamily="49" charset="0"/>
+                <a:cs typeface="Consolas" pitchFamily="49" charset="0"/>
+              </a:rPr>
+              <a:t>  }</a:t>
+            </a:r>
+          </a:p>
+          <a:p>
+            <a:r>
+              <a:rPr lang="en-US" sz="600" dirty="0">
+                <a:latin typeface="Consolas" pitchFamily="49" charset="0"/>
+                <a:cs typeface="Consolas" pitchFamily="49" charset="0"/>
+              </a:rPr>
+              <a:t> </a:t>
+            </a:r>
+            <a:r>
+              <a:rPr lang="en-US" sz="600" dirty="0" smtClean="0">
+                <a:latin typeface="Consolas" pitchFamily="49" charset="0"/>
+                <a:cs typeface="Consolas" pitchFamily="49" charset="0"/>
+              </a:rPr>
+              <a:t>  </a:t>
             </a:r>
             <a:r>
               <a:rPr lang="en-US" sz="600" dirty="0" err="1" smtClean="0">
                 <a:latin typeface="Consolas" pitchFamily="49" charset="0"/>
                 <a:cs typeface="Consolas" pitchFamily="49" charset="0"/>
               </a:rPr>
-              <a:t>rf_invalid</a:t>
+              <a:t>mem_invalid</a:t>
             </a:r>
             <a:r>
               <a:rPr lang="en-US" sz="600" dirty="0" smtClean="0">
                 <a:latin typeface="Consolas" pitchFamily="49" charset="0"/>
                 <a:cs typeface="Consolas" pitchFamily="49" charset="0"/>
               </a:rPr>
-              <a:t>[2] || </a:t>
-            </a:r>
-            <a:r>
-              <a:rPr lang="en-US" sz="600" dirty="0" err="1" smtClean="0">
-                <a:latin typeface="Consolas" pitchFamily="49" charset="0"/>
-                <a:cs typeface="Consolas" pitchFamily="49" charset="0"/>
-              </a:rPr>
-              <a:t>rf_invalid</a:t>
-            </a:r>
-            <a:r>
-              <a:rPr lang="en-US" sz="600" dirty="0" smtClean="0">
-                <a:latin typeface="Consolas" pitchFamily="49" charset="0"/>
-                <a:cs typeface="Consolas" pitchFamily="49" charset="0"/>
-              </a:rPr>
-              <a:t>[3]) {</a:t>
-            </a:r>
-          </a:p>
-          <a:p>
-            <a:r>
-              <a:rPr lang="en-US" sz="600" dirty="0">
-                <a:latin typeface="Consolas" pitchFamily="49" charset="0"/>
-                <a:cs typeface="Consolas" pitchFamily="49" charset="0"/>
-              </a:rPr>
-              <a:t> </a:t>
-            </a:r>
-            <a:r>
-              <a:rPr lang="en-US" sz="600" dirty="0" smtClean="0">
-                <a:latin typeface="Consolas" pitchFamily="49" charset="0"/>
-                <a:cs typeface="Consolas" pitchFamily="49" charset="0"/>
-              </a:rPr>
-              <a:t>    // drop monitoring</a:t>
-            </a:r>
-          </a:p>
-          <a:p>
-            <a:r>
-              <a:rPr lang="en-US" sz="600" dirty="0">
-                <a:latin typeface="Consolas" pitchFamily="49" charset="0"/>
-                <a:cs typeface="Consolas" pitchFamily="49" charset="0"/>
-              </a:rPr>
-              <a:t> </a:t>
-            </a:r>
-            <a:r>
-              <a:rPr lang="en-US" sz="600" dirty="0" smtClean="0">
-                <a:latin typeface="Consolas" pitchFamily="49" charset="0"/>
-                <a:cs typeface="Consolas" pitchFamily="49" charset="0"/>
-              </a:rPr>
-              <a:t>  }</a:t>
-            </a:r>
-          </a:p>
-          <a:p>
-            <a:r>
-              <a:rPr lang="en-US" sz="600" dirty="0">
-                <a:latin typeface="Consolas" pitchFamily="49" charset="0"/>
-                <a:cs typeface="Consolas" pitchFamily="49" charset="0"/>
-              </a:rPr>
-              <a:t> </a:t>
-            </a:r>
-            <a:r>
-              <a:rPr lang="en-US" sz="600" dirty="0" smtClean="0">
-                <a:latin typeface="Consolas" pitchFamily="49" charset="0"/>
-                <a:cs typeface="Consolas" pitchFamily="49" charset="0"/>
-              </a:rPr>
-              <a:t>  </a:t>
-            </a:r>
-            <a:r>
-              <a:rPr lang="en-US" sz="600" dirty="0" err="1" smtClean="0">
-                <a:latin typeface="Consolas" pitchFamily="49" charset="0"/>
-                <a:cs typeface="Consolas" pitchFamily="49" charset="0"/>
-              </a:rPr>
-              <a:t>mem_invalid</a:t>
-            </a:r>
-            <a:r>
-              <a:rPr lang="en-US" sz="600" dirty="0" smtClean="0">
-                <a:latin typeface="Consolas" pitchFamily="49" charset="0"/>
-                <a:cs typeface="Consolas" pitchFamily="49" charset="0"/>
-              </a:rPr>
-              <a:t>[r2 + 12] </a:t>
-            </a:r>
-            <a:r>
-              <a:rPr lang="en-US" sz="600" dirty="0" smtClean="0">
-                <a:latin typeface="Consolas" pitchFamily="49" charset="0"/>
-                <a:cs typeface="Consolas" pitchFamily="49" charset="0"/>
-              </a:rPr>
-              <a:t>= </a:t>
+              <a:t>[r2 + 12] = </a:t>
             </a:r>
             <a:r>
               <a:rPr lang="en-US" sz="600" dirty="0" err="1" smtClean="0">

</xml_diff>

<commit_message>
Various edits throughout paper.
</commit_message>
<xml_diff>
--- a/figs_src/diagrams-wide.pptx
+++ b/figs_src/diagrams-wide.pptx
@@ -5,13 +5,15 @@
     <p:sldMasterId id="2147483648" r:id="rId1"/>
   </p:sldMasterIdLst>
   <p:notesMasterIdLst>
-    <p:notesMasterId r:id="rId6"/>
+    <p:notesMasterId r:id="rId8"/>
   </p:notesMasterIdLst>
   <p:sldIdLst>
     <p:sldId id="260" r:id="rId2"/>
     <p:sldId id="267" r:id="rId3"/>
     <p:sldId id="266" r:id="rId4"/>
-    <p:sldId id="265" r:id="rId5"/>
+    <p:sldId id="268" r:id="rId5"/>
+    <p:sldId id="265" r:id="rId6"/>
+    <p:sldId id="269" r:id="rId7"/>
   </p:sldIdLst>
   <p:sldSz cx="6400800" cy="7772400"/>
   <p:notesSz cx="5943600" cy="7315200"/>
@@ -155,7 +157,7 @@
           </a:prstGeom>
         </p:spPr>
         <p:txBody>
-          <a:bodyPr vert="horz" lIns="71536" tIns="35770" rIns="71536" bIns="35770" rtlCol="0"/>
+          <a:bodyPr vert="horz" lIns="71525" tIns="35764" rIns="71525" bIns="35764" rtlCol="0"/>
           <a:lstStyle>
             <a:lvl1pPr algn="l">
               <a:defRPr sz="900"/>
@@ -186,7 +188,7 @@
           </a:prstGeom>
         </p:spPr>
         <p:txBody>
-          <a:bodyPr vert="horz" lIns="71536" tIns="35770" rIns="71536" bIns="35770" rtlCol="0"/>
+          <a:bodyPr vert="horz" lIns="71525" tIns="35764" rIns="71525" bIns="35764" rtlCol="0"/>
           <a:lstStyle>
             <a:lvl1pPr algn="r">
               <a:defRPr sz="900"/>
@@ -195,7 +197,7 @@
           <a:p>
             <a:fld id="{843567C3-09B7-4EC5-8695-9659B6A4537F}" type="datetimeFigureOut">
               <a:rPr lang="en-US" smtClean="0"/>
-              <a:t>9/12/2014</a:t>
+              <a:t>12/18/2014</a:t>
             </a:fld>
             <a:endParaRPr lang="en-US"/>
           </a:p>
@@ -227,7 +229,7 @@
           </a:ln>
         </p:spPr>
         <p:txBody>
-          <a:bodyPr vert="horz" lIns="71536" tIns="35770" rIns="71536" bIns="35770" rtlCol="0" anchor="ctr"/>
+          <a:bodyPr vert="horz" lIns="71525" tIns="35764" rIns="71525" bIns="35764" rtlCol="0" anchor="ctr"/>
           <a:lstStyle/>
           <a:p>
             <a:endParaRPr lang="en-US"/>
@@ -254,7 +256,7 @@
           </a:prstGeom>
         </p:spPr>
         <p:txBody>
-          <a:bodyPr vert="horz" lIns="71536" tIns="35770" rIns="71536" bIns="35770" rtlCol="0"/>
+          <a:bodyPr vert="horz" lIns="71525" tIns="35764" rIns="71525" bIns="35764" rtlCol="0"/>
           <a:lstStyle/>
           <a:p>
             <a:pPr lvl="0"/>
@@ -314,7 +316,7 @@
           </a:prstGeom>
         </p:spPr>
         <p:txBody>
-          <a:bodyPr vert="horz" lIns="71536" tIns="35770" rIns="71536" bIns="35770" rtlCol="0" anchor="b"/>
+          <a:bodyPr vert="horz" lIns="71525" tIns="35764" rIns="71525" bIns="35764" rtlCol="0" anchor="b"/>
           <a:lstStyle>
             <a:lvl1pPr algn="l">
               <a:defRPr sz="900"/>
@@ -345,7 +347,7 @@
           </a:prstGeom>
         </p:spPr>
         <p:txBody>
-          <a:bodyPr vert="horz" lIns="71536" tIns="35770" rIns="71536" bIns="35770" rtlCol="0" anchor="b"/>
+          <a:bodyPr vert="horz" lIns="71525" tIns="35764" rIns="71525" bIns="35764" rtlCol="0" anchor="b"/>
           <a:lstStyle>
             <a:lvl1pPr algn="r">
               <a:defRPr sz="900"/>
@@ -645,7 +647,7 @@
             <a:fld id="{1D8BD707-D9CF-40AE-B4C6-C98DA3205C09}" type="datetimeFigureOut">
               <a:rPr lang="en-US" smtClean="0"/>
               <a:pPr/>
-              <a:t>9/12/2014</a:t>
+              <a:t>12/18/2014</a:t>
             </a:fld>
             <a:endParaRPr lang="en-US"/>
           </a:p>
@@ -812,7 +814,7 @@
             <a:fld id="{1D8BD707-D9CF-40AE-B4C6-C98DA3205C09}" type="datetimeFigureOut">
               <a:rPr lang="en-US" smtClean="0"/>
               <a:pPr/>
-              <a:t>9/12/2014</a:t>
+              <a:t>12/18/2014</a:t>
             </a:fld>
             <a:endParaRPr lang="en-US"/>
           </a:p>
@@ -989,7 +991,7 @@
             <a:fld id="{1D8BD707-D9CF-40AE-B4C6-C98DA3205C09}" type="datetimeFigureOut">
               <a:rPr lang="en-US" smtClean="0"/>
               <a:pPr/>
-              <a:t>9/12/2014</a:t>
+              <a:t>12/18/2014</a:t>
             </a:fld>
             <a:endParaRPr lang="en-US"/>
           </a:p>
@@ -1156,7 +1158,7 @@
             <a:fld id="{1D8BD707-D9CF-40AE-B4C6-C98DA3205C09}" type="datetimeFigureOut">
               <a:rPr lang="en-US" smtClean="0"/>
               <a:pPr/>
-              <a:t>9/12/2014</a:t>
+              <a:t>12/18/2014</a:t>
             </a:fld>
             <a:endParaRPr lang="en-US"/>
           </a:p>
@@ -1399,7 +1401,7 @@
             <a:fld id="{1D8BD707-D9CF-40AE-B4C6-C98DA3205C09}" type="datetimeFigureOut">
               <a:rPr lang="en-US" smtClean="0"/>
               <a:pPr/>
-              <a:t>9/12/2014</a:t>
+              <a:t>12/18/2014</a:t>
             </a:fld>
             <a:endParaRPr lang="en-US"/>
           </a:p>
@@ -1684,7 +1686,7 @@
             <a:fld id="{1D8BD707-D9CF-40AE-B4C6-C98DA3205C09}" type="datetimeFigureOut">
               <a:rPr lang="en-US" smtClean="0"/>
               <a:pPr/>
-              <a:t>9/12/2014</a:t>
+              <a:t>12/18/2014</a:t>
             </a:fld>
             <a:endParaRPr lang="en-US"/>
           </a:p>
@@ -2103,7 +2105,7 @@
             <a:fld id="{1D8BD707-D9CF-40AE-B4C6-C98DA3205C09}" type="datetimeFigureOut">
               <a:rPr lang="en-US" smtClean="0"/>
               <a:pPr/>
-              <a:t>9/12/2014</a:t>
+              <a:t>12/18/2014</a:t>
             </a:fld>
             <a:endParaRPr lang="en-US"/>
           </a:p>
@@ -2218,7 +2220,7 @@
             <a:fld id="{1D8BD707-D9CF-40AE-B4C6-C98DA3205C09}" type="datetimeFigureOut">
               <a:rPr lang="en-US" smtClean="0"/>
               <a:pPr/>
-              <a:t>9/12/2014</a:t>
+              <a:t>12/18/2014</a:t>
             </a:fld>
             <a:endParaRPr lang="en-US"/>
           </a:p>
@@ -2310,7 +2312,7 @@
             <a:fld id="{1D8BD707-D9CF-40AE-B4C6-C98DA3205C09}" type="datetimeFigureOut">
               <a:rPr lang="en-US" smtClean="0"/>
               <a:pPr/>
-              <a:t>9/12/2014</a:t>
+              <a:t>12/18/2014</a:t>
             </a:fld>
             <a:endParaRPr lang="en-US"/>
           </a:p>
@@ -2584,7 +2586,7 @@
             <a:fld id="{1D8BD707-D9CF-40AE-B4C6-C98DA3205C09}" type="datetimeFigureOut">
               <a:rPr lang="en-US" smtClean="0"/>
               <a:pPr/>
-              <a:t>9/12/2014</a:t>
+              <a:t>12/18/2014</a:t>
             </a:fld>
             <a:endParaRPr lang="en-US"/>
           </a:p>
@@ -2834,7 +2836,7 @@
             <a:fld id="{1D8BD707-D9CF-40AE-B4C6-C98DA3205C09}" type="datetimeFigureOut">
               <a:rPr lang="en-US" smtClean="0"/>
               <a:pPr/>
-              <a:t>9/12/2014</a:t>
+              <a:t>12/18/2014</a:t>
             </a:fld>
             <a:endParaRPr lang="en-US"/>
           </a:p>
@@ -3044,7 +3046,7 @@
             <a:fld id="{1D8BD707-D9CF-40AE-B4C6-C98DA3205C09}" type="datetimeFigureOut">
               <a:rPr lang="en-US" smtClean="0"/>
               <a:pPr/>
-              <a:t>9/12/2014</a:t>
+              <a:t>12/18/2014</a:t>
             </a:fld>
             <a:endParaRPr lang="en-US"/>
           </a:p>
@@ -6185,7 +6187,7 @@
         </p:nvSpPr>
         <p:spPr>
           <a:xfrm>
-            <a:off x="4744198" y="213904"/>
+            <a:off x="4744198" y="233699"/>
             <a:ext cx="615854" cy="215444"/>
           </a:xfrm>
           <a:prstGeom prst="rect">
@@ -8053,7 +8055,7 @@
         </p:nvSpPr>
         <p:spPr>
           <a:xfrm>
-            <a:off x="5868931" y="429749"/>
+            <a:off x="5868931" y="192625"/>
             <a:ext cx="557489" cy="215444"/>
           </a:xfrm>
           <a:prstGeom prst="rect">
@@ -9881,7 +9883,7 @@
                 <a:latin typeface="Arial" pitchFamily="34" charset="0"/>
                 <a:cs typeface="Arial" pitchFamily="34" charset="0"/>
               </a:rPr>
-              <a:t>Monitoring Core</a:t>
+              <a:t>Monitor</a:t>
             </a:r>
             <a:endParaRPr lang="en-US" sz="800" dirty="0">
               <a:latin typeface="Arial" pitchFamily="34" charset="0"/>
@@ -10195,6 +10197,1179 @@
       </p:grpSpPr>
       <p:sp>
         <p:nvSpPr>
+          <p:cNvPr id="5" name="TextBox 4"/>
+          <p:cNvSpPr txBox="1"/>
+          <p:nvPr/>
+        </p:nvSpPr>
+        <p:spPr>
+          <a:xfrm>
+            <a:off x="250149" y="164543"/>
+            <a:ext cx="1746885" cy="1384995"/>
+          </a:xfrm>
+          <a:prstGeom prst="rect">
+            <a:avLst/>
+          </a:prstGeom>
+          <a:noFill/>
+        </p:spPr>
+        <p:txBody>
+          <a:bodyPr wrap="square" rtlCol="0">
+            <a:spAutoFit/>
+          </a:bodyPr>
+          <a:lstStyle/>
+          <a:p>
+            <a:r>
+              <a:rPr lang="en-US" sz="600" dirty="0" smtClean="0">
+                <a:latin typeface="Consolas" pitchFamily="49" charset="0"/>
+                <a:cs typeface="Consolas" pitchFamily="49" charset="0"/>
+              </a:rPr>
+              <a:t>1: </a:t>
+            </a:r>
+            <a:r>
+              <a:rPr lang="en-US" sz="600" dirty="0" err="1" smtClean="0">
+                <a:latin typeface="Consolas" pitchFamily="49" charset="0"/>
+                <a:cs typeface="Consolas" pitchFamily="49" charset="0"/>
+              </a:rPr>
+              <a:t>int</a:t>
+            </a:r>
+            <a:r>
+              <a:rPr lang="en-US" sz="600" dirty="0" smtClean="0">
+                <a:latin typeface="Consolas" pitchFamily="49" charset="0"/>
+                <a:cs typeface="Consolas" pitchFamily="49" charset="0"/>
+              </a:rPr>
+              <a:t> *x = </a:t>
+            </a:r>
+            <a:r>
+              <a:rPr lang="en-US" sz="600" dirty="0" err="1" smtClean="0">
+                <a:latin typeface="Consolas" pitchFamily="49" charset="0"/>
+                <a:cs typeface="Consolas" pitchFamily="49" charset="0"/>
+              </a:rPr>
+              <a:t>malloc</a:t>
+            </a:r>
+            <a:r>
+              <a:rPr lang="en-US" sz="600" dirty="0" smtClean="0">
+                <a:latin typeface="Consolas" pitchFamily="49" charset="0"/>
+                <a:cs typeface="Consolas" pitchFamily="49" charset="0"/>
+              </a:rPr>
+              <a:t>(4*</a:t>
+            </a:r>
+            <a:r>
+              <a:rPr lang="en-US" sz="600" dirty="0" err="1" smtClean="0">
+                <a:latin typeface="Consolas" pitchFamily="49" charset="0"/>
+                <a:cs typeface="Consolas" pitchFamily="49" charset="0"/>
+              </a:rPr>
+              <a:t>sizeof</a:t>
+            </a:r>
+            <a:r>
+              <a:rPr lang="en-US" sz="600" dirty="0" smtClean="0">
+                <a:latin typeface="Consolas" pitchFamily="49" charset="0"/>
+                <a:cs typeface="Consolas" pitchFamily="49" charset="0"/>
+              </a:rPr>
+              <a:t>(</a:t>
+            </a:r>
+            <a:r>
+              <a:rPr lang="en-US" sz="600" dirty="0" err="1" smtClean="0">
+                <a:latin typeface="Consolas" pitchFamily="49" charset="0"/>
+                <a:cs typeface="Consolas" pitchFamily="49" charset="0"/>
+              </a:rPr>
+              <a:t>int</a:t>
+            </a:r>
+            <a:r>
+              <a:rPr lang="en-US" sz="600" dirty="0" smtClean="0">
+                <a:latin typeface="Consolas" pitchFamily="49" charset="0"/>
+                <a:cs typeface="Consolas" pitchFamily="49" charset="0"/>
+              </a:rPr>
+              <a:t>));</a:t>
+            </a:r>
+          </a:p>
+          <a:p>
+            <a:endParaRPr lang="en-US" sz="600" dirty="0">
+              <a:latin typeface="Consolas" pitchFamily="49" charset="0"/>
+              <a:cs typeface="Consolas" pitchFamily="49" charset="0"/>
+            </a:endParaRPr>
+          </a:p>
+          <a:p>
+            <a:endParaRPr lang="en-US" sz="600" dirty="0" smtClean="0">
+              <a:latin typeface="Consolas" pitchFamily="49" charset="0"/>
+              <a:cs typeface="Consolas" pitchFamily="49" charset="0"/>
+            </a:endParaRPr>
+          </a:p>
+          <a:p>
+            <a:r>
+              <a:rPr lang="en-US" sz="600" dirty="0" smtClean="0">
+                <a:latin typeface="Consolas" pitchFamily="49" charset="0"/>
+                <a:cs typeface="Consolas" pitchFamily="49" charset="0"/>
+              </a:rPr>
+              <a:t>2: </a:t>
+            </a:r>
+            <a:r>
+              <a:rPr lang="en-US" sz="600" dirty="0" err="1" smtClean="0">
+                <a:latin typeface="Consolas" pitchFamily="49" charset="0"/>
+                <a:cs typeface="Consolas" pitchFamily="49" charset="0"/>
+              </a:rPr>
+              <a:t>int</a:t>
+            </a:r>
+            <a:r>
+              <a:rPr lang="en-US" sz="600" dirty="0" smtClean="0">
+                <a:latin typeface="Consolas" pitchFamily="49" charset="0"/>
+                <a:cs typeface="Consolas" pitchFamily="49" charset="0"/>
+              </a:rPr>
+              <a:t> *y = x + </a:t>
+            </a:r>
+            <a:r>
+              <a:rPr lang="en-US" sz="600" dirty="0">
+                <a:latin typeface="Consolas" pitchFamily="49" charset="0"/>
+                <a:cs typeface="Consolas" pitchFamily="49" charset="0"/>
+              </a:rPr>
+              <a:t>2</a:t>
+            </a:r>
+            <a:r>
+              <a:rPr lang="en-US" sz="600" dirty="0" smtClean="0">
+                <a:latin typeface="Consolas" pitchFamily="49" charset="0"/>
+                <a:cs typeface="Consolas" pitchFamily="49" charset="0"/>
+              </a:rPr>
+              <a:t>;</a:t>
+            </a:r>
+          </a:p>
+          <a:p>
+            <a:endParaRPr lang="en-US" sz="600" dirty="0">
+              <a:latin typeface="Consolas" pitchFamily="49" charset="0"/>
+              <a:cs typeface="Consolas" pitchFamily="49" charset="0"/>
+            </a:endParaRPr>
+          </a:p>
+          <a:p>
+            <a:r>
+              <a:rPr lang="en-US" sz="600" dirty="0" smtClean="0">
+                <a:latin typeface="Consolas" pitchFamily="49" charset="0"/>
+                <a:cs typeface="Consolas" pitchFamily="49" charset="0"/>
+              </a:rPr>
+              <a:t>3: x[3] = 1;</a:t>
+            </a:r>
+          </a:p>
+          <a:p>
+            <a:endParaRPr lang="en-US" sz="600" dirty="0">
+              <a:latin typeface="Consolas" pitchFamily="49" charset="0"/>
+              <a:cs typeface="Consolas" pitchFamily="49" charset="0"/>
+            </a:endParaRPr>
+          </a:p>
+          <a:p>
+            <a:endParaRPr lang="en-US" sz="600" dirty="0" smtClean="0">
+              <a:latin typeface="Consolas" pitchFamily="49" charset="0"/>
+              <a:cs typeface="Consolas" pitchFamily="49" charset="0"/>
+            </a:endParaRPr>
+          </a:p>
+          <a:p>
+            <a:endParaRPr lang="en-US" sz="600" dirty="0">
+              <a:latin typeface="Consolas" pitchFamily="49" charset="0"/>
+              <a:cs typeface="Consolas" pitchFamily="49" charset="0"/>
+            </a:endParaRPr>
+          </a:p>
+          <a:p>
+            <a:endParaRPr lang="en-US" sz="600" dirty="0" smtClean="0">
+              <a:latin typeface="Consolas" pitchFamily="49" charset="0"/>
+              <a:cs typeface="Consolas" pitchFamily="49" charset="0"/>
+            </a:endParaRPr>
+          </a:p>
+          <a:p>
+            <a:endParaRPr lang="en-US" sz="600" dirty="0" smtClean="0">
+              <a:latin typeface="Consolas" pitchFamily="49" charset="0"/>
+              <a:cs typeface="Consolas" pitchFamily="49" charset="0"/>
+            </a:endParaRPr>
+          </a:p>
+          <a:p>
+            <a:endParaRPr lang="en-US" sz="600" dirty="0">
+              <a:latin typeface="Consolas" pitchFamily="49" charset="0"/>
+              <a:cs typeface="Consolas" pitchFamily="49" charset="0"/>
+            </a:endParaRPr>
+          </a:p>
+          <a:p>
+            <a:endParaRPr lang="en-US" sz="600" dirty="0" smtClean="0">
+              <a:latin typeface="Consolas" pitchFamily="49" charset="0"/>
+              <a:cs typeface="Consolas" pitchFamily="49" charset="0"/>
+            </a:endParaRPr>
+          </a:p>
+          <a:p>
+            <a:r>
+              <a:rPr lang="en-US" sz="600" dirty="0" smtClean="0">
+                <a:latin typeface="Consolas" pitchFamily="49" charset="0"/>
+                <a:cs typeface="Consolas" pitchFamily="49" charset="0"/>
+              </a:rPr>
+              <a:t>4: y[3] = 1;</a:t>
+            </a:r>
+            <a:endParaRPr lang="en-US" sz="600" dirty="0">
+              <a:latin typeface="Consolas" pitchFamily="49" charset="0"/>
+              <a:cs typeface="Consolas" pitchFamily="49" charset="0"/>
+            </a:endParaRPr>
+          </a:p>
+        </p:txBody>
+      </p:sp>
+      <p:sp>
+        <p:nvSpPr>
+          <p:cNvPr id="8" name="TextBox 7"/>
+          <p:cNvSpPr txBox="1"/>
+          <p:nvPr/>
+        </p:nvSpPr>
+        <p:spPr>
+          <a:xfrm>
+            <a:off x="1997034" y="164541"/>
+            <a:ext cx="2212545" cy="1384995"/>
+          </a:xfrm>
+          <a:prstGeom prst="rect">
+            <a:avLst/>
+          </a:prstGeom>
+          <a:noFill/>
+        </p:spPr>
+        <p:txBody>
+          <a:bodyPr wrap="square" rtlCol="0">
+            <a:spAutoFit/>
+          </a:bodyPr>
+          <a:lstStyle/>
+          <a:p>
+            <a:r>
+              <a:rPr lang="en-US" sz="600" dirty="0" smtClean="0">
+                <a:latin typeface="Consolas" pitchFamily="49" charset="0"/>
+                <a:cs typeface="Consolas" pitchFamily="49" charset="0"/>
+              </a:rPr>
+              <a:t>1: call </a:t>
+            </a:r>
+            <a:r>
+              <a:rPr lang="en-US" sz="600" dirty="0" err="1" smtClean="0">
+                <a:latin typeface="Consolas" pitchFamily="49" charset="0"/>
+                <a:cs typeface="Consolas" pitchFamily="49" charset="0"/>
+              </a:rPr>
+              <a:t>malloc</a:t>
+            </a:r>
+            <a:r>
+              <a:rPr lang="en-US" sz="600" dirty="0">
+                <a:latin typeface="Consolas" pitchFamily="49" charset="0"/>
+                <a:cs typeface="Consolas" pitchFamily="49" charset="0"/>
+              </a:rPr>
+              <a:t> </a:t>
+            </a:r>
+            <a:r>
+              <a:rPr lang="en-US" sz="600" dirty="0" smtClean="0">
+                <a:latin typeface="Consolas" pitchFamily="49" charset="0"/>
+                <a:cs typeface="Consolas" pitchFamily="49" charset="0"/>
+              </a:rPr>
+              <a:t>;return pointer 0x12340000 in r1</a:t>
+            </a:r>
+          </a:p>
+          <a:p>
+            <a:endParaRPr lang="en-US" sz="600" dirty="0">
+              <a:latin typeface="Consolas" pitchFamily="49" charset="0"/>
+              <a:cs typeface="Consolas" pitchFamily="49" charset="0"/>
+            </a:endParaRPr>
+          </a:p>
+          <a:p>
+            <a:endParaRPr lang="en-US" sz="600" dirty="0" smtClean="0">
+              <a:latin typeface="Consolas" pitchFamily="49" charset="0"/>
+              <a:cs typeface="Consolas" pitchFamily="49" charset="0"/>
+            </a:endParaRPr>
+          </a:p>
+          <a:p>
+            <a:r>
+              <a:rPr lang="en-US" sz="600" dirty="0" smtClean="0">
+                <a:latin typeface="Consolas" pitchFamily="49" charset="0"/>
+                <a:cs typeface="Consolas" pitchFamily="49" charset="0"/>
+              </a:rPr>
+              <a:t>2: add r2, r1, #8</a:t>
+            </a:r>
+          </a:p>
+          <a:p>
+            <a:endParaRPr lang="en-US" sz="600" dirty="0">
+              <a:latin typeface="Consolas" pitchFamily="49" charset="0"/>
+              <a:cs typeface="Consolas" pitchFamily="49" charset="0"/>
+            </a:endParaRPr>
+          </a:p>
+          <a:p>
+            <a:r>
+              <a:rPr lang="en-US" sz="600" dirty="0" smtClean="0">
+                <a:latin typeface="Consolas" pitchFamily="49" charset="0"/>
+                <a:cs typeface="Consolas" pitchFamily="49" charset="0"/>
+              </a:rPr>
+              <a:t>3a: </a:t>
+            </a:r>
+            <a:r>
+              <a:rPr lang="en-US" sz="600" dirty="0" err="1" smtClean="0">
+                <a:latin typeface="Consolas" pitchFamily="49" charset="0"/>
+                <a:cs typeface="Consolas" pitchFamily="49" charset="0"/>
+              </a:rPr>
+              <a:t>mov</a:t>
+            </a:r>
+            <a:r>
+              <a:rPr lang="en-US" sz="600" dirty="0" smtClean="0">
+                <a:latin typeface="Consolas" pitchFamily="49" charset="0"/>
+                <a:cs typeface="Consolas" pitchFamily="49" charset="0"/>
+              </a:rPr>
+              <a:t> r3, #1</a:t>
+            </a:r>
+          </a:p>
+          <a:p>
+            <a:endParaRPr lang="en-US" sz="600" dirty="0">
+              <a:latin typeface="Consolas" pitchFamily="49" charset="0"/>
+              <a:cs typeface="Consolas" pitchFamily="49" charset="0"/>
+            </a:endParaRPr>
+          </a:p>
+          <a:p>
+            <a:r>
+              <a:rPr lang="en-US" sz="600" dirty="0" smtClean="0">
+                <a:latin typeface="Consolas" pitchFamily="49" charset="0"/>
+                <a:cs typeface="Consolas" pitchFamily="49" charset="0"/>
+              </a:rPr>
+              <a:t>3b: </a:t>
+            </a:r>
+            <a:r>
+              <a:rPr lang="en-US" sz="600" dirty="0" err="1" smtClean="0">
+                <a:latin typeface="Consolas" pitchFamily="49" charset="0"/>
+                <a:cs typeface="Consolas" pitchFamily="49" charset="0"/>
+              </a:rPr>
+              <a:t>str</a:t>
+            </a:r>
+            <a:r>
+              <a:rPr lang="en-US" sz="600" dirty="0" smtClean="0">
+                <a:latin typeface="Consolas" pitchFamily="49" charset="0"/>
+                <a:cs typeface="Consolas" pitchFamily="49" charset="0"/>
+              </a:rPr>
+              <a:t> r3, [r1, #12] ; store to 0x1234000c</a:t>
+            </a:r>
+          </a:p>
+          <a:p>
+            <a:endParaRPr lang="en-US" sz="600" dirty="0">
+              <a:latin typeface="Consolas" pitchFamily="49" charset="0"/>
+              <a:cs typeface="Consolas" pitchFamily="49" charset="0"/>
+            </a:endParaRPr>
+          </a:p>
+          <a:p>
+            <a:endParaRPr lang="en-US" sz="600" dirty="0" smtClean="0">
+              <a:latin typeface="Consolas" pitchFamily="49" charset="0"/>
+              <a:cs typeface="Consolas" pitchFamily="49" charset="0"/>
+            </a:endParaRPr>
+          </a:p>
+          <a:p>
+            <a:endParaRPr lang="en-US" sz="600" dirty="0" smtClean="0">
+              <a:latin typeface="Consolas" pitchFamily="49" charset="0"/>
+              <a:cs typeface="Consolas" pitchFamily="49" charset="0"/>
+            </a:endParaRPr>
+          </a:p>
+          <a:p>
+            <a:endParaRPr lang="en-US" sz="600" dirty="0">
+              <a:latin typeface="Consolas" pitchFamily="49" charset="0"/>
+              <a:cs typeface="Consolas" pitchFamily="49" charset="0"/>
+            </a:endParaRPr>
+          </a:p>
+          <a:p>
+            <a:endParaRPr lang="en-US" sz="600" dirty="0" smtClean="0">
+              <a:latin typeface="Consolas" pitchFamily="49" charset="0"/>
+              <a:cs typeface="Consolas" pitchFamily="49" charset="0"/>
+            </a:endParaRPr>
+          </a:p>
+          <a:p>
+            <a:r>
+              <a:rPr lang="en-US" sz="600" dirty="0" smtClean="0">
+                <a:latin typeface="Consolas" pitchFamily="49" charset="0"/>
+                <a:cs typeface="Consolas" pitchFamily="49" charset="0"/>
+              </a:rPr>
+              <a:t>4: </a:t>
+            </a:r>
+            <a:r>
+              <a:rPr lang="en-US" sz="600" dirty="0" err="1" smtClean="0">
+                <a:latin typeface="Consolas" pitchFamily="49" charset="0"/>
+                <a:cs typeface="Consolas" pitchFamily="49" charset="0"/>
+              </a:rPr>
+              <a:t>str</a:t>
+            </a:r>
+            <a:r>
+              <a:rPr lang="en-US" sz="600" dirty="0" smtClean="0">
+                <a:latin typeface="Consolas" pitchFamily="49" charset="0"/>
+                <a:cs typeface="Consolas" pitchFamily="49" charset="0"/>
+              </a:rPr>
+              <a:t> r3, [r2, #12] ; store to 0x12340014</a:t>
+            </a:r>
+            <a:endParaRPr lang="en-US" sz="600" dirty="0">
+              <a:latin typeface="Consolas" pitchFamily="49" charset="0"/>
+              <a:cs typeface="Consolas" pitchFamily="49" charset="0"/>
+            </a:endParaRPr>
+          </a:p>
+        </p:txBody>
+      </p:sp>
+      <p:sp>
+        <p:nvSpPr>
+          <p:cNvPr id="10" name="TextBox 9"/>
+          <p:cNvSpPr txBox="1"/>
+          <p:nvPr/>
+        </p:nvSpPr>
+        <p:spPr>
+          <a:xfrm>
+            <a:off x="4209579" y="164543"/>
+            <a:ext cx="1973601" cy="1754326"/>
+          </a:xfrm>
+          <a:prstGeom prst="rect">
+            <a:avLst/>
+          </a:prstGeom>
+          <a:noFill/>
+        </p:spPr>
+        <p:txBody>
+          <a:bodyPr wrap="square" rtlCol="0">
+            <a:spAutoFit/>
+          </a:bodyPr>
+          <a:lstStyle/>
+          <a:p>
+            <a:r>
+              <a:rPr lang="en-US" sz="600" dirty="0" smtClean="0">
+                <a:latin typeface="Consolas" pitchFamily="49" charset="0"/>
+                <a:cs typeface="Consolas" pitchFamily="49" charset="0"/>
+              </a:rPr>
+              <a:t>1: </a:t>
+            </a:r>
+            <a:r>
+              <a:rPr lang="en-US" sz="600" dirty="0" err="1" smtClean="0">
+                <a:latin typeface="Consolas" pitchFamily="49" charset="0"/>
+                <a:cs typeface="Consolas" pitchFamily="49" charset="0"/>
+              </a:rPr>
+              <a:t>rf_metadata</a:t>
+            </a:r>
+            <a:r>
+              <a:rPr lang="en-US" sz="600" dirty="0" smtClean="0">
+                <a:latin typeface="Consolas" pitchFamily="49" charset="0"/>
+                <a:cs typeface="Consolas" pitchFamily="49" charset="0"/>
+              </a:rPr>
+              <a:t>[1] = {r1, r1 + 0xf}</a:t>
+            </a:r>
+          </a:p>
+          <a:p>
+            <a:r>
+              <a:rPr lang="en-US" sz="600" dirty="0" smtClean="0">
+                <a:latin typeface="Consolas" pitchFamily="49" charset="0"/>
+                <a:cs typeface="Consolas" pitchFamily="49" charset="0"/>
+              </a:rPr>
+              <a:t>     // {base, bounds} of array</a:t>
+            </a:r>
+          </a:p>
+          <a:p>
+            <a:endParaRPr lang="en-US" sz="600" dirty="0" smtClean="0">
+              <a:latin typeface="Consolas" pitchFamily="49" charset="0"/>
+              <a:cs typeface="Consolas" pitchFamily="49" charset="0"/>
+            </a:endParaRPr>
+          </a:p>
+          <a:p>
+            <a:r>
+              <a:rPr lang="en-US" sz="600" dirty="0" smtClean="0">
+                <a:latin typeface="Consolas" pitchFamily="49" charset="0"/>
+                <a:cs typeface="Consolas" pitchFamily="49" charset="0"/>
+              </a:rPr>
+              <a:t>2: </a:t>
+            </a:r>
+            <a:r>
+              <a:rPr lang="en-US" sz="600" dirty="0" err="1" smtClean="0">
+                <a:latin typeface="Consolas" pitchFamily="49" charset="0"/>
+                <a:cs typeface="Consolas" pitchFamily="49" charset="0"/>
+              </a:rPr>
+              <a:t>rf_metadata</a:t>
+            </a:r>
+            <a:r>
+              <a:rPr lang="en-US" sz="600" dirty="0" smtClean="0">
+                <a:latin typeface="Consolas" pitchFamily="49" charset="0"/>
+                <a:cs typeface="Consolas" pitchFamily="49" charset="0"/>
+              </a:rPr>
+              <a:t>[2] = </a:t>
+            </a:r>
+            <a:r>
+              <a:rPr lang="en-US" sz="600" dirty="0" err="1" smtClean="0">
+                <a:latin typeface="Consolas" pitchFamily="49" charset="0"/>
+                <a:cs typeface="Consolas" pitchFamily="49" charset="0"/>
+              </a:rPr>
+              <a:t>rf_metadata</a:t>
+            </a:r>
+            <a:r>
+              <a:rPr lang="en-US" sz="600" dirty="0" smtClean="0">
+                <a:latin typeface="Consolas" pitchFamily="49" charset="0"/>
+                <a:cs typeface="Consolas" pitchFamily="49" charset="0"/>
+              </a:rPr>
+              <a:t>[1]</a:t>
+            </a:r>
+          </a:p>
+          <a:p>
+            <a:endParaRPr lang="en-US" sz="600" dirty="0">
+              <a:latin typeface="Consolas" pitchFamily="49" charset="0"/>
+              <a:cs typeface="Consolas" pitchFamily="49" charset="0"/>
+            </a:endParaRPr>
+          </a:p>
+          <a:p>
+            <a:r>
+              <a:rPr lang="en-US" sz="600" dirty="0" smtClean="0">
+                <a:latin typeface="Consolas" pitchFamily="49" charset="0"/>
+                <a:cs typeface="Consolas" pitchFamily="49" charset="0"/>
+              </a:rPr>
+              <a:t>3a: </a:t>
+            </a:r>
+            <a:r>
+              <a:rPr lang="en-US" sz="600" dirty="0" err="1" smtClean="0">
+                <a:latin typeface="Consolas" pitchFamily="49" charset="0"/>
+                <a:cs typeface="Consolas" pitchFamily="49" charset="0"/>
+              </a:rPr>
+              <a:t>rf_metadata</a:t>
+            </a:r>
+            <a:r>
+              <a:rPr lang="en-US" sz="600" dirty="0" smtClean="0">
+                <a:latin typeface="Consolas" pitchFamily="49" charset="0"/>
+                <a:cs typeface="Consolas" pitchFamily="49" charset="0"/>
+              </a:rPr>
+              <a:t>[3] = NULL</a:t>
+            </a:r>
+          </a:p>
+          <a:p>
+            <a:endParaRPr lang="en-US" sz="600" dirty="0">
+              <a:latin typeface="Consolas" pitchFamily="49" charset="0"/>
+              <a:cs typeface="Consolas" pitchFamily="49" charset="0"/>
+            </a:endParaRPr>
+          </a:p>
+          <a:p>
+            <a:r>
+              <a:rPr lang="en-US" sz="600" dirty="0" smtClean="0">
+                <a:latin typeface="Consolas" pitchFamily="49" charset="0"/>
+                <a:cs typeface="Consolas" pitchFamily="49" charset="0"/>
+              </a:rPr>
+              <a:t>3b: if (r1 + 12 &lt; base(</a:t>
+            </a:r>
+            <a:r>
+              <a:rPr lang="en-US" sz="600" dirty="0" err="1" smtClean="0">
+                <a:latin typeface="Consolas" pitchFamily="49" charset="0"/>
+                <a:cs typeface="Consolas" pitchFamily="49" charset="0"/>
+              </a:rPr>
+              <a:t>rf_metadata</a:t>
+            </a:r>
+            <a:r>
+              <a:rPr lang="en-US" sz="600" dirty="0" smtClean="0">
+                <a:latin typeface="Consolas" pitchFamily="49" charset="0"/>
+                <a:cs typeface="Consolas" pitchFamily="49" charset="0"/>
+              </a:rPr>
+              <a:t>[1]) ||</a:t>
+            </a:r>
+          </a:p>
+          <a:p>
+            <a:r>
+              <a:rPr lang="en-US" sz="600" dirty="0">
+                <a:latin typeface="Consolas" pitchFamily="49" charset="0"/>
+                <a:cs typeface="Consolas" pitchFamily="49" charset="0"/>
+              </a:rPr>
+              <a:t> </a:t>
+            </a:r>
+            <a:r>
+              <a:rPr lang="en-US" sz="600" dirty="0" smtClean="0">
+                <a:latin typeface="Consolas" pitchFamily="49" charset="0"/>
+                <a:cs typeface="Consolas" pitchFamily="49" charset="0"/>
+              </a:rPr>
+              <a:t>       r1 + 12 &gt; bound(</a:t>
+            </a:r>
+            <a:r>
+              <a:rPr lang="en-US" sz="600" dirty="0" err="1" smtClean="0">
+                <a:latin typeface="Consolas" pitchFamily="49" charset="0"/>
+                <a:cs typeface="Consolas" pitchFamily="49" charset="0"/>
+              </a:rPr>
+              <a:t>rf_metadata</a:t>
+            </a:r>
+            <a:r>
+              <a:rPr lang="en-US" sz="600" dirty="0" smtClean="0">
+                <a:latin typeface="Consolas" pitchFamily="49" charset="0"/>
+                <a:cs typeface="Consolas" pitchFamily="49" charset="0"/>
+              </a:rPr>
+              <a:t>[1])) {</a:t>
+            </a:r>
+          </a:p>
+          <a:p>
+            <a:r>
+              <a:rPr lang="en-US" sz="600" dirty="0" smtClean="0">
+                <a:latin typeface="Consolas" pitchFamily="49" charset="0"/>
+                <a:cs typeface="Consolas" pitchFamily="49" charset="0"/>
+              </a:rPr>
+              <a:t>      // raise error</a:t>
+            </a:r>
+          </a:p>
+          <a:p>
+            <a:r>
+              <a:rPr lang="en-US" sz="600" dirty="0" smtClean="0">
+                <a:latin typeface="Consolas" pitchFamily="49" charset="0"/>
+                <a:cs typeface="Consolas" pitchFamily="49" charset="0"/>
+              </a:rPr>
+              <a:t>    }</a:t>
+            </a:r>
+          </a:p>
+          <a:p>
+            <a:r>
+              <a:rPr lang="en-US" sz="600" dirty="0" smtClean="0">
+                <a:latin typeface="Consolas" pitchFamily="49" charset="0"/>
+                <a:cs typeface="Consolas" pitchFamily="49" charset="0"/>
+              </a:rPr>
+              <a:t>    </a:t>
+            </a:r>
+            <a:r>
+              <a:rPr lang="en-US" sz="600" dirty="0" err="1" smtClean="0">
+                <a:latin typeface="Consolas" pitchFamily="49" charset="0"/>
+                <a:cs typeface="Consolas" pitchFamily="49" charset="0"/>
+              </a:rPr>
+              <a:t>mem_metadata</a:t>
+            </a:r>
+            <a:r>
+              <a:rPr lang="en-US" sz="600" dirty="0" smtClean="0">
+                <a:latin typeface="Consolas" pitchFamily="49" charset="0"/>
+                <a:cs typeface="Consolas" pitchFamily="49" charset="0"/>
+              </a:rPr>
+              <a:t>[r1 + 12] = </a:t>
+            </a:r>
+            <a:r>
+              <a:rPr lang="en-US" sz="600" dirty="0" err="1" smtClean="0">
+                <a:latin typeface="Consolas" pitchFamily="49" charset="0"/>
+                <a:cs typeface="Consolas" pitchFamily="49" charset="0"/>
+              </a:rPr>
+              <a:t>rf_metadata</a:t>
+            </a:r>
+            <a:r>
+              <a:rPr lang="en-US" sz="600" dirty="0" smtClean="0">
+                <a:latin typeface="Consolas" pitchFamily="49" charset="0"/>
+                <a:cs typeface="Consolas" pitchFamily="49" charset="0"/>
+              </a:rPr>
+              <a:t>[3];</a:t>
+            </a:r>
+          </a:p>
+          <a:p>
+            <a:endParaRPr lang="en-US" sz="600" dirty="0">
+              <a:latin typeface="Consolas" pitchFamily="49" charset="0"/>
+              <a:cs typeface="Consolas" pitchFamily="49" charset="0"/>
+            </a:endParaRPr>
+          </a:p>
+          <a:p>
+            <a:r>
+              <a:rPr lang="en-US" sz="600" dirty="0" smtClean="0">
+                <a:latin typeface="Consolas" pitchFamily="49" charset="0"/>
+                <a:cs typeface="Consolas" pitchFamily="49" charset="0"/>
+              </a:rPr>
+              <a:t>4: if (r2 + 12 &lt; base(</a:t>
+            </a:r>
+            <a:r>
+              <a:rPr lang="en-US" sz="600" dirty="0" err="1" smtClean="0">
+                <a:latin typeface="Consolas" pitchFamily="49" charset="0"/>
+                <a:cs typeface="Consolas" pitchFamily="49" charset="0"/>
+              </a:rPr>
+              <a:t>rf_metadata</a:t>
+            </a:r>
+            <a:r>
+              <a:rPr lang="en-US" sz="600" dirty="0" smtClean="0">
+                <a:latin typeface="Consolas" pitchFamily="49" charset="0"/>
+                <a:cs typeface="Consolas" pitchFamily="49" charset="0"/>
+              </a:rPr>
+              <a:t>[2]) ||</a:t>
+            </a:r>
+          </a:p>
+          <a:p>
+            <a:r>
+              <a:rPr lang="en-US" sz="600" dirty="0">
+                <a:latin typeface="Consolas" pitchFamily="49" charset="0"/>
+                <a:cs typeface="Consolas" pitchFamily="49" charset="0"/>
+              </a:rPr>
+              <a:t> </a:t>
+            </a:r>
+            <a:r>
+              <a:rPr lang="en-US" sz="600" dirty="0" smtClean="0">
+                <a:latin typeface="Consolas" pitchFamily="49" charset="0"/>
+                <a:cs typeface="Consolas" pitchFamily="49" charset="0"/>
+              </a:rPr>
+              <a:t>      r2 + 12 &gt; bound(</a:t>
+            </a:r>
+            <a:r>
+              <a:rPr lang="en-US" sz="600" dirty="0" err="1" smtClean="0">
+                <a:latin typeface="Consolas" pitchFamily="49" charset="0"/>
+                <a:cs typeface="Consolas" pitchFamily="49" charset="0"/>
+              </a:rPr>
+              <a:t>rf_metadata</a:t>
+            </a:r>
+            <a:r>
+              <a:rPr lang="en-US" sz="600" dirty="0" smtClean="0">
+                <a:latin typeface="Consolas" pitchFamily="49" charset="0"/>
+                <a:cs typeface="Consolas" pitchFamily="49" charset="0"/>
+              </a:rPr>
+              <a:t>[2])) {</a:t>
+            </a:r>
+          </a:p>
+          <a:p>
+            <a:r>
+              <a:rPr lang="en-US" sz="600" dirty="0">
+                <a:latin typeface="Consolas" pitchFamily="49" charset="0"/>
+                <a:cs typeface="Consolas" pitchFamily="49" charset="0"/>
+              </a:rPr>
+              <a:t> </a:t>
+            </a:r>
+            <a:r>
+              <a:rPr lang="en-US" sz="600" dirty="0" smtClean="0">
+                <a:latin typeface="Consolas" pitchFamily="49" charset="0"/>
+                <a:cs typeface="Consolas" pitchFamily="49" charset="0"/>
+              </a:rPr>
+              <a:t>    // raise error</a:t>
+            </a:r>
+          </a:p>
+          <a:p>
+            <a:r>
+              <a:rPr lang="en-US" sz="600" dirty="0" smtClean="0">
+                <a:latin typeface="Consolas" pitchFamily="49" charset="0"/>
+                <a:cs typeface="Consolas" pitchFamily="49" charset="0"/>
+              </a:rPr>
+              <a:t>   }</a:t>
+            </a:r>
+          </a:p>
+          <a:p>
+            <a:r>
+              <a:rPr lang="en-US" sz="600" dirty="0" smtClean="0">
+                <a:latin typeface="Consolas" pitchFamily="49" charset="0"/>
+                <a:cs typeface="Consolas" pitchFamily="49" charset="0"/>
+              </a:rPr>
+              <a:t>   </a:t>
+            </a:r>
+            <a:r>
+              <a:rPr lang="en-US" sz="600" dirty="0" err="1" smtClean="0">
+                <a:latin typeface="Consolas" pitchFamily="49" charset="0"/>
+                <a:cs typeface="Consolas" pitchFamily="49" charset="0"/>
+              </a:rPr>
+              <a:t>mem_metadata</a:t>
+            </a:r>
+            <a:r>
+              <a:rPr lang="en-US" sz="600" dirty="0" smtClean="0">
+                <a:latin typeface="Consolas" pitchFamily="49" charset="0"/>
+                <a:cs typeface="Consolas" pitchFamily="49" charset="0"/>
+              </a:rPr>
+              <a:t>[r2 + 12] = </a:t>
+            </a:r>
+            <a:r>
+              <a:rPr lang="en-US" sz="600" dirty="0" err="1" smtClean="0">
+                <a:latin typeface="Consolas" pitchFamily="49" charset="0"/>
+                <a:cs typeface="Consolas" pitchFamily="49" charset="0"/>
+              </a:rPr>
+              <a:t>rf_metadata</a:t>
+            </a:r>
+            <a:r>
+              <a:rPr lang="en-US" sz="600" dirty="0" smtClean="0">
+                <a:latin typeface="Consolas" pitchFamily="49" charset="0"/>
+                <a:cs typeface="Consolas" pitchFamily="49" charset="0"/>
+              </a:rPr>
+              <a:t>[3];</a:t>
+            </a:r>
+            <a:endParaRPr lang="en-US" sz="600" dirty="0">
+              <a:latin typeface="Consolas" pitchFamily="49" charset="0"/>
+              <a:cs typeface="Consolas" pitchFamily="49" charset="0"/>
+            </a:endParaRPr>
+          </a:p>
+        </p:txBody>
+      </p:sp>
+      <p:sp>
+        <p:nvSpPr>
+          <p:cNvPr id="15" name="TextBox 14"/>
+          <p:cNvSpPr txBox="1"/>
+          <p:nvPr/>
+        </p:nvSpPr>
+        <p:spPr>
+          <a:xfrm>
+            <a:off x="456439" y="-30701"/>
+            <a:ext cx="1334304" cy="215444"/>
+          </a:xfrm>
+          <a:prstGeom prst="rect">
+            <a:avLst/>
+          </a:prstGeom>
+          <a:noFill/>
+        </p:spPr>
+        <p:txBody>
+          <a:bodyPr wrap="square" rtlCol="0">
+            <a:spAutoFit/>
+          </a:bodyPr>
+          <a:lstStyle/>
+          <a:p>
+            <a:pPr algn="ctr"/>
+            <a:r>
+              <a:rPr lang="en-US" sz="800" dirty="0" smtClean="0">
+                <a:latin typeface="Arial" pitchFamily="34" charset="0"/>
+                <a:cs typeface="Arial" pitchFamily="34" charset="0"/>
+              </a:rPr>
+              <a:t>Main Core (High-level)</a:t>
+            </a:r>
+            <a:endParaRPr lang="en-US" sz="800" dirty="0">
+              <a:latin typeface="Arial" pitchFamily="34" charset="0"/>
+              <a:cs typeface="Arial" pitchFamily="34" charset="0"/>
+            </a:endParaRPr>
+          </a:p>
+        </p:txBody>
+      </p:sp>
+      <p:sp>
+        <p:nvSpPr>
+          <p:cNvPr id="16" name="TextBox 15"/>
+          <p:cNvSpPr txBox="1"/>
+          <p:nvPr/>
+        </p:nvSpPr>
+        <p:spPr>
+          <a:xfrm>
+            <a:off x="2465886" y="-30701"/>
+            <a:ext cx="1274839" cy="215444"/>
+          </a:xfrm>
+          <a:prstGeom prst="rect">
+            <a:avLst/>
+          </a:prstGeom>
+          <a:noFill/>
+        </p:spPr>
+        <p:txBody>
+          <a:bodyPr wrap="square" rtlCol="0">
+            <a:spAutoFit/>
+          </a:bodyPr>
+          <a:lstStyle/>
+          <a:p>
+            <a:pPr algn="ctr"/>
+            <a:r>
+              <a:rPr lang="en-US" sz="800" dirty="0" smtClean="0">
+                <a:latin typeface="Arial" pitchFamily="34" charset="0"/>
+                <a:cs typeface="Arial" pitchFamily="34" charset="0"/>
+              </a:rPr>
+              <a:t>Main Core (Assembly)</a:t>
+            </a:r>
+            <a:endParaRPr lang="en-US" sz="800" dirty="0">
+              <a:latin typeface="Arial" pitchFamily="34" charset="0"/>
+              <a:cs typeface="Arial" pitchFamily="34" charset="0"/>
+            </a:endParaRPr>
+          </a:p>
+        </p:txBody>
+      </p:sp>
+      <p:sp>
+        <p:nvSpPr>
+          <p:cNvPr id="17" name="TextBox 16"/>
+          <p:cNvSpPr txBox="1"/>
+          <p:nvPr/>
+        </p:nvSpPr>
+        <p:spPr>
+          <a:xfrm>
+            <a:off x="4620304" y="-30701"/>
+            <a:ext cx="1152150" cy="215444"/>
+          </a:xfrm>
+          <a:prstGeom prst="rect">
+            <a:avLst/>
+          </a:prstGeom>
+          <a:noFill/>
+        </p:spPr>
+        <p:txBody>
+          <a:bodyPr wrap="square" rtlCol="0">
+            <a:spAutoFit/>
+          </a:bodyPr>
+          <a:lstStyle/>
+          <a:p>
+            <a:pPr algn="ctr"/>
+            <a:r>
+              <a:rPr lang="en-US" sz="800" dirty="0" smtClean="0">
+                <a:latin typeface="Arial" pitchFamily="34" charset="0"/>
+                <a:cs typeface="Arial" pitchFamily="34" charset="0"/>
+              </a:rPr>
+              <a:t>Monitor</a:t>
+            </a:r>
+            <a:endParaRPr lang="en-US" sz="800" dirty="0">
+              <a:latin typeface="Arial" pitchFamily="34" charset="0"/>
+              <a:cs typeface="Arial" pitchFamily="34" charset="0"/>
+            </a:endParaRPr>
+          </a:p>
+        </p:txBody>
+      </p:sp>
+      <p:cxnSp>
+        <p:nvCxnSpPr>
+          <p:cNvPr id="11" name="Straight Connector 10"/>
+          <p:cNvCxnSpPr/>
+          <p:nvPr/>
+        </p:nvCxnSpPr>
+        <p:spPr>
+          <a:xfrm>
+            <a:off x="243215" y="429750"/>
+            <a:ext cx="5939965" cy="0"/>
+          </a:xfrm>
+          <a:prstGeom prst="line">
+            <a:avLst/>
+          </a:prstGeom>
+          <a:ln>
+            <a:solidFill>
+              <a:schemeClr val="bg1">
+                <a:lumMod val="75000"/>
+              </a:schemeClr>
+            </a:solidFill>
+            <a:prstDash val="solid"/>
+          </a:ln>
+        </p:spPr>
+        <p:style>
+          <a:lnRef idx="1">
+            <a:schemeClr val="accent1"/>
+          </a:lnRef>
+          <a:fillRef idx="0">
+            <a:schemeClr val="accent1"/>
+          </a:fillRef>
+          <a:effectRef idx="0">
+            <a:schemeClr val="accent1"/>
+          </a:effectRef>
+          <a:fontRef idx="minor">
+            <a:schemeClr val="tx1"/>
+          </a:fontRef>
+        </p:style>
+      </p:cxnSp>
+      <p:cxnSp>
+        <p:nvCxnSpPr>
+          <p:cNvPr id="18" name="Straight Connector 17"/>
+          <p:cNvCxnSpPr/>
+          <p:nvPr/>
+        </p:nvCxnSpPr>
+        <p:spPr>
+          <a:xfrm>
+            <a:off x="250149" y="621775"/>
+            <a:ext cx="5933031" cy="0"/>
+          </a:xfrm>
+          <a:prstGeom prst="line">
+            <a:avLst/>
+          </a:prstGeom>
+          <a:ln>
+            <a:solidFill>
+              <a:schemeClr val="bg1">
+                <a:lumMod val="75000"/>
+              </a:schemeClr>
+            </a:solidFill>
+            <a:prstDash val="solid"/>
+          </a:ln>
+        </p:spPr>
+        <p:style>
+          <a:lnRef idx="1">
+            <a:schemeClr val="accent1"/>
+          </a:lnRef>
+          <a:fillRef idx="0">
+            <a:schemeClr val="accent1"/>
+          </a:fillRef>
+          <a:effectRef idx="0">
+            <a:schemeClr val="accent1"/>
+          </a:effectRef>
+          <a:fontRef idx="minor">
+            <a:schemeClr val="tx1"/>
+          </a:fontRef>
+        </p:style>
+      </p:cxnSp>
+      <p:cxnSp>
+        <p:nvCxnSpPr>
+          <p:cNvPr id="19" name="Straight Connector 18"/>
+          <p:cNvCxnSpPr/>
+          <p:nvPr/>
+        </p:nvCxnSpPr>
+        <p:spPr>
+          <a:xfrm>
+            <a:off x="250149" y="1351470"/>
+            <a:ext cx="5933031" cy="0"/>
+          </a:xfrm>
+          <a:prstGeom prst="line">
+            <a:avLst/>
+          </a:prstGeom>
+          <a:ln>
+            <a:solidFill>
+              <a:schemeClr val="bg1">
+                <a:lumMod val="75000"/>
+              </a:schemeClr>
+            </a:solidFill>
+            <a:prstDash val="solid"/>
+          </a:ln>
+        </p:spPr>
+        <p:style>
+          <a:lnRef idx="1">
+            <a:schemeClr val="accent1"/>
+          </a:lnRef>
+          <a:fillRef idx="0">
+            <a:schemeClr val="accent1"/>
+          </a:fillRef>
+          <a:effectRef idx="0">
+            <a:schemeClr val="accent1"/>
+          </a:effectRef>
+          <a:fontRef idx="minor">
+            <a:schemeClr val="tx1"/>
+          </a:fontRef>
+        </p:style>
+      </p:cxnSp>
+      <p:cxnSp>
+        <p:nvCxnSpPr>
+          <p:cNvPr id="20" name="Straight Connector 19"/>
+          <p:cNvCxnSpPr/>
+          <p:nvPr/>
+        </p:nvCxnSpPr>
+        <p:spPr>
+          <a:xfrm>
+            <a:off x="1997034" y="775395"/>
+            <a:ext cx="4186146" cy="0"/>
+          </a:xfrm>
+          <a:prstGeom prst="line">
+            <a:avLst/>
+          </a:prstGeom>
+          <a:ln>
+            <a:solidFill>
+              <a:schemeClr val="bg1">
+                <a:lumMod val="75000"/>
+              </a:schemeClr>
+            </a:solidFill>
+            <a:prstDash val="solid"/>
+          </a:ln>
+        </p:spPr>
+        <p:style>
+          <a:lnRef idx="1">
+            <a:schemeClr val="accent1"/>
+          </a:lnRef>
+          <a:fillRef idx="0">
+            <a:schemeClr val="accent1"/>
+          </a:fillRef>
+          <a:effectRef idx="0">
+            <a:schemeClr val="accent1"/>
+          </a:effectRef>
+          <a:fontRef idx="minor">
+            <a:schemeClr val="tx1"/>
+          </a:fontRef>
+        </p:style>
+      </p:cxnSp>
+      <p:cxnSp>
+        <p:nvCxnSpPr>
+          <p:cNvPr id="7" name="Straight Connector 6"/>
+          <p:cNvCxnSpPr/>
+          <p:nvPr/>
+        </p:nvCxnSpPr>
+        <p:spPr>
+          <a:xfrm>
+            <a:off x="1997034" y="164541"/>
+            <a:ext cx="0" cy="1754328"/>
+          </a:xfrm>
+          <a:prstGeom prst="line">
+            <a:avLst/>
+          </a:prstGeom>
+          <a:ln>
+            <a:solidFill>
+              <a:schemeClr val="tx1"/>
+            </a:solidFill>
+          </a:ln>
+        </p:spPr>
+        <p:style>
+          <a:lnRef idx="1">
+            <a:schemeClr val="accent1"/>
+          </a:lnRef>
+          <a:fillRef idx="0">
+            <a:schemeClr val="accent1"/>
+          </a:fillRef>
+          <a:effectRef idx="0">
+            <a:schemeClr val="accent1"/>
+          </a:effectRef>
+          <a:fontRef idx="minor">
+            <a:schemeClr val="tx1"/>
+          </a:fontRef>
+        </p:style>
+      </p:cxnSp>
+      <p:cxnSp>
+        <p:nvCxnSpPr>
+          <p:cNvPr id="9" name="Straight Connector 8"/>
+          <p:cNvCxnSpPr/>
+          <p:nvPr/>
+        </p:nvCxnSpPr>
+        <p:spPr>
+          <a:xfrm>
+            <a:off x="4234119" y="164543"/>
+            <a:ext cx="0" cy="1754326"/>
+          </a:xfrm>
+          <a:prstGeom prst="line">
+            <a:avLst/>
+          </a:prstGeom>
+          <a:ln>
+            <a:solidFill>
+              <a:schemeClr val="tx1"/>
+            </a:solidFill>
+          </a:ln>
+        </p:spPr>
+        <p:style>
+          <a:lnRef idx="1">
+            <a:schemeClr val="accent1"/>
+          </a:lnRef>
+          <a:fillRef idx="0">
+            <a:schemeClr val="accent1"/>
+          </a:fillRef>
+          <a:effectRef idx="0">
+            <a:schemeClr val="accent1"/>
+          </a:effectRef>
+          <a:fontRef idx="minor">
+            <a:schemeClr val="tx1"/>
+          </a:fontRef>
+        </p:style>
+      </p:cxnSp>
+      <p:sp>
+        <p:nvSpPr>
+          <p:cNvPr id="2" name="Rounded Rectangle 1"/>
+          <p:cNvSpPr/>
+          <p:nvPr/>
+        </p:nvSpPr>
+        <p:spPr>
+          <a:xfrm>
+            <a:off x="250149" y="160915"/>
+            <a:ext cx="5933031" cy="1757954"/>
+          </a:xfrm>
+          <a:prstGeom prst="roundRect">
+            <a:avLst>
+              <a:gd name="adj" fmla="val 4386"/>
+            </a:avLst>
+          </a:prstGeom>
+          <a:noFill/>
+          <a:ln w="12700">
+            <a:solidFill>
+              <a:schemeClr val="tx1"/>
+            </a:solidFill>
+          </a:ln>
+        </p:spPr>
+        <p:style>
+          <a:lnRef idx="2">
+            <a:schemeClr val="accent1">
+              <a:shade val="50000"/>
+            </a:schemeClr>
+          </a:lnRef>
+          <a:fillRef idx="1">
+            <a:schemeClr val="accent1"/>
+          </a:fillRef>
+          <a:effectRef idx="0">
+            <a:schemeClr val="accent1"/>
+          </a:effectRef>
+          <a:fontRef idx="minor">
+            <a:schemeClr val="lt1"/>
+          </a:fontRef>
+        </p:style>
+        <p:txBody>
+          <a:bodyPr rtlCol="0" anchor="ctr"/>
+          <a:lstStyle/>
+          <a:p>
+            <a:pPr algn="ctr"/>
+            <a:endParaRPr lang="en-US"/>
+          </a:p>
+        </p:txBody>
+      </p:sp>
+    </p:spTree>
+    <p:extLst>
+      <p:ext uri="{BB962C8B-B14F-4D97-AF65-F5344CB8AC3E}">
+        <p14:creationId xmlns:p14="http://schemas.microsoft.com/office/powerpoint/2010/main" val="617646783"/>
+      </p:ext>
+    </p:extLst>
+  </p:cSld>
+  <p:clrMapOvr>
+    <a:masterClrMapping/>
+  </p:clrMapOvr>
+</p:sld>
+</file>
+
+<file path=ppt/slides/slide5.xml><?xml version="1.0" encoding="utf-8"?>
+<p:sld xmlns:a="http://schemas.openxmlformats.org/drawingml/2006/main" xmlns:r="http://schemas.openxmlformats.org/officeDocument/2006/relationships" xmlns:p="http://schemas.openxmlformats.org/presentationml/2006/main">
+  <p:cSld>
+    <p:spTree>
+      <p:nvGrpSpPr>
+        <p:cNvPr id="1" name=""/>
+        <p:cNvGrpSpPr/>
+        <p:nvPr/>
+      </p:nvGrpSpPr>
+      <p:grpSpPr>
+        <a:xfrm>
+          <a:off x="0" y="0"/>
+          <a:ext cx="0" cy="0"/>
+          <a:chOff x="0" y="0"/>
+          <a:chExt cx="0" cy="0"/>
+        </a:xfrm>
+      </p:grpSpPr>
+      <p:sp>
+        <p:nvSpPr>
           <p:cNvPr id="8" name="TextBox 7"/>
           <p:cNvSpPr txBox="1"/>
           <p:nvPr/>
@@ -11731,6 +12906,1574 @@
     <p:extLst>
       <p:ext uri="{BB962C8B-B14F-4D97-AF65-F5344CB8AC3E}">
         <p14:creationId xmlns:p14="http://schemas.microsoft.com/office/powerpoint/2010/main" val="268456540"/>
+      </p:ext>
+    </p:extLst>
+  </p:cSld>
+  <p:clrMapOvr>
+    <a:masterClrMapping/>
+  </p:clrMapOvr>
+  <p:timing>
+    <p:tnLst>
+      <p:par>
+        <p:cTn id="1" dur="indefinite" restart="never" nodeType="tmRoot"/>
+      </p:par>
+    </p:tnLst>
+  </p:timing>
+</p:sld>
+</file>
+
+<file path=ppt/slides/slide6.xml><?xml version="1.0" encoding="utf-8"?>
+<p:sld xmlns:a="http://schemas.openxmlformats.org/drawingml/2006/main" xmlns:r="http://schemas.openxmlformats.org/officeDocument/2006/relationships" xmlns:p="http://schemas.openxmlformats.org/presentationml/2006/main">
+  <p:cSld>
+    <p:spTree>
+      <p:nvGrpSpPr>
+        <p:cNvPr id="1" name=""/>
+        <p:cNvGrpSpPr/>
+        <p:nvPr/>
+      </p:nvGrpSpPr>
+      <p:grpSpPr>
+        <a:xfrm>
+          <a:off x="0" y="0"/>
+          <a:ext cx="0" cy="0"/>
+          <a:chOff x="0" y="0"/>
+          <a:chExt cx="0" cy="0"/>
+        </a:xfrm>
+      </p:grpSpPr>
+      <p:sp>
+        <p:nvSpPr>
+          <p:cNvPr id="8" name="TextBox 7"/>
+          <p:cNvSpPr txBox="1"/>
+          <p:nvPr/>
+        </p:nvSpPr>
+        <p:spPr>
+          <a:xfrm>
+            <a:off x="243215" y="164543"/>
+            <a:ext cx="1484985" cy="1754326"/>
+          </a:xfrm>
+          <a:prstGeom prst="rect">
+            <a:avLst/>
+          </a:prstGeom>
+          <a:noFill/>
+        </p:spPr>
+        <p:txBody>
+          <a:bodyPr wrap="square" rtlCol="0">
+            <a:spAutoFit/>
+          </a:bodyPr>
+          <a:lstStyle/>
+          <a:p>
+            <a:r>
+              <a:rPr lang="en-US" sz="600" dirty="0">
+                <a:latin typeface="Consolas" pitchFamily="49" charset="0"/>
+                <a:cs typeface="Consolas" pitchFamily="49" charset="0"/>
+              </a:rPr>
+              <a:t>1: call </a:t>
+            </a:r>
+            <a:r>
+              <a:rPr lang="en-US" sz="600" dirty="0" err="1">
+                <a:latin typeface="Consolas" pitchFamily="49" charset="0"/>
+                <a:cs typeface="Consolas" pitchFamily="49" charset="0"/>
+              </a:rPr>
+              <a:t>malloc</a:t>
+            </a:r>
+            <a:r>
+              <a:rPr lang="en-US" sz="600" dirty="0">
+                <a:latin typeface="Consolas" pitchFamily="49" charset="0"/>
+                <a:cs typeface="Consolas" pitchFamily="49" charset="0"/>
+              </a:rPr>
+              <a:t> </a:t>
+            </a:r>
+            <a:r>
+              <a:rPr lang="en-US" sz="600" dirty="0" smtClean="0">
+                <a:latin typeface="Consolas" pitchFamily="49" charset="0"/>
+                <a:cs typeface="Consolas" pitchFamily="49" charset="0"/>
+              </a:rPr>
+              <a:t>;</a:t>
+            </a:r>
+            <a:r>
+              <a:rPr lang="en-US" sz="600" dirty="0">
+                <a:latin typeface="Consolas" pitchFamily="49" charset="0"/>
+                <a:cs typeface="Consolas" pitchFamily="49" charset="0"/>
+              </a:rPr>
+              <a:t>return pointer </a:t>
+            </a:r>
+            <a:r>
+              <a:rPr lang="en-US" sz="600" dirty="0" smtClean="0">
+                <a:latin typeface="Consolas" pitchFamily="49" charset="0"/>
+                <a:cs typeface="Consolas" pitchFamily="49" charset="0"/>
+              </a:rPr>
+              <a:t>0x12340000 in </a:t>
+            </a:r>
+            <a:r>
+              <a:rPr lang="en-US" sz="600" dirty="0">
+                <a:latin typeface="Consolas" pitchFamily="49" charset="0"/>
+                <a:cs typeface="Consolas" pitchFamily="49" charset="0"/>
+              </a:rPr>
+              <a:t>r1</a:t>
+            </a:r>
+          </a:p>
+          <a:p>
+            <a:endParaRPr lang="en-US" sz="600" dirty="0">
+              <a:latin typeface="Consolas" pitchFamily="49" charset="0"/>
+              <a:cs typeface="Consolas" pitchFamily="49" charset="0"/>
+            </a:endParaRPr>
+          </a:p>
+          <a:p>
+            <a:r>
+              <a:rPr lang="en-US" sz="600" dirty="0" smtClean="0">
+                <a:latin typeface="Consolas" pitchFamily="49" charset="0"/>
+                <a:cs typeface="Consolas" pitchFamily="49" charset="0"/>
+              </a:rPr>
+              <a:t>2</a:t>
+            </a:r>
+            <a:r>
+              <a:rPr lang="en-US" sz="600" dirty="0">
+                <a:latin typeface="Consolas" pitchFamily="49" charset="0"/>
+                <a:cs typeface="Consolas" pitchFamily="49" charset="0"/>
+              </a:rPr>
+              <a:t>: add r2, r1, #8</a:t>
+            </a:r>
+          </a:p>
+          <a:p>
+            <a:endParaRPr lang="en-US" sz="600" dirty="0">
+              <a:latin typeface="Consolas" pitchFamily="49" charset="0"/>
+              <a:cs typeface="Consolas" pitchFamily="49" charset="0"/>
+            </a:endParaRPr>
+          </a:p>
+          <a:p>
+            <a:endParaRPr lang="en-US" sz="600" dirty="0" smtClean="0">
+              <a:latin typeface="Consolas" pitchFamily="49" charset="0"/>
+              <a:cs typeface="Consolas" pitchFamily="49" charset="0"/>
+            </a:endParaRPr>
+          </a:p>
+          <a:p>
+            <a:endParaRPr lang="en-US" sz="600" dirty="0">
+              <a:latin typeface="Consolas" pitchFamily="49" charset="0"/>
+              <a:cs typeface="Consolas" pitchFamily="49" charset="0"/>
+            </a:endParaRPr>
+          </a:p>
+          <a:p>
+            <a:endParaRPr lang="en-US" sz="600" dirty="0" smtClean="0">
+              <a:latin typeface="Consolas" pitchFamily="49" charset="0"/>
+              <a:cs typeface="Consolas" pitchFamily="49" charset="0"/>
+            </a:endParaRPr>
+          </a:p>
+          <a:p>
+            <a:r>
+              <a:rPr lang="en-US" sz="600" dirty="0" smtClean="0">
+                <a:latin typeface="Consolas" pitchFamily="49" charset="0"/>
+                <a:cs typeface="Consolas" pitchFamily="49" charset="0"/>
+              </a:rPr>
+              <a:t>3a</a:t>
+            </a:r>
+            <a:r>
+              <a:rPr lang="en-US" sz="600" dirty="0">
+                <a:latin typeface="Consolas" pitchFamily="49" charset="0"/>
+                <a:cs typeface="Consolas" pitchFamily="49" charset="0"/>
+              </a:rPr>
+              <a:t>: </a:t>
+            </a:r>
+            <a:r>
+              <a:rPr lang="en-US" sz="600" dirty="0" err="1">
+                <a:latin typeface="Consolas" pitchFamily="49" charset="0"/>
+                <a:cs typeface="Consolas" pitchFamily="49" charset="0"/>
+              </a:rPr>
+              <a:t>mov</a:t>
+            </a:r>
+            <a:r>
+              <a:rPr lang="en-US" sz="600" dirty="0">
+                <a:latin typeface="Consolas" pitchFamily="49" charset="0"/>
+                <a:cs typeface="Consolas" pitchFamily="49" charset="0"/>
+              </a:rPr>
+              <a:t> r3, #1</a:t>
+            </a:r>
+          </a:p>
+          <a:p>
+            <a:endParaRPr lang="en-US" sz="600" dirty="0">
+              <a:latin typeface="Consolas" pitchFamily="49" charset="0"/>
+              <a:cs typeface="Consolas" pitchFamily="49" charset="0"/>
+            </a:endParaRPr>
+          </a:p>
+          <a:p>
+            <a:r>
+              <a:rPr lang="en-US" sz="600" dirty="0">
+                <a:latin typeface="Consolas" pitchFamily="49" charset="0"/>
+                <a:cs typeface="Consolas" pitchFamily="49" charset="0"/>
+              </a:rPr>
+              <a:t>3b: </a:t>
+            </a:r>
+            <a:r>
+              <a:rPr lang="en-US" sz="600" dirty="0" err="1">
+                <a:latin typeface="Consolas" pitchFamily="49" charset="0"/>
+                <a:cs typeface="Consolas" pitchFamily="49" charset="0"/>
+              </a:rPr>
+              <a:t>str</a:t>
+            </a:r>
+            <a:r>
+              <a:rPr lang="en-US" sz="600" dirty="0">
+                <a:latin typeface="Consolas" pitchFamily="49" charset="0"/>
+                <a:cs typeface="Consolas" pitchFamily="49" charset="0"/>
+              </a:rPr>
+              <a:t> r3, [r1, #12]</a:t>
+            </a:r>
+          </a:p>
+          <a:p>
+            <a:r>
+              <a:rPr lang="en-US" sz="600" dirty="0">
+                <a:latin typeface="Consolas" pitchFamily="49" charset="0"/>
+                <a:cs typeface="Consolas" pitchFamily="49" charset="0"/>
+              </a:rPr>
+              <a:t>    ; store to 0x1234000c</a:t>
+            </a:r>
+          </a:p>
+          <a:p>
+            <a:endParaRPr lang="en-US" sz="600" dirty="0">
+              <a:latin typeface="Consolas" pitchFamily="49" charset="0"/>
+              <a:cs typeface="Consolas" pitchFamily="49" charset="0"/>
+            </a:endParaRPr>
+          </a:p>
+          <a:p>
+            <a:endParaRPr lang="en-US" sz="600" dirty="0">
+              <a:latin typeface="Consolas" pitchFamily="49" charset="0"/>
+              <a:cs typeface="Consolas" pitchFamily="49" charset="0"/>
+            </a:endParaRPr>
+          </a:p>
+          <a:p>
+            <a:endParaRPr lang="en-US" sz="600" dirty="0">
+              <a:latin typeface="Consolas" pitchFamily="49" charset="0"/>
+              <a:cs typeface="Consolas" pitchFamily="49" charset="0"/>
+            </a:endParaRPr>
+          </a:p>
+          <a:p>
+            <a:endParaRPr lang="en-US" sz="600" dirty="0" smtClean="0">
+              <a:latin typeface="Consolas" pitchFamily="49" charset="0"/>
+              <a:cs typeface="Consolas" pitchFamily="49" charset="0"/>
+            </a:endParaRPr>
+          </a:p>
+          <a:p>
+            <a:r>
+              <a:rPr lang="en-US" sz="600" dirty="0" smtClean="0">
+                <a:latin typeface="Consolas" pitchFamily="49" charset="0"/>
+                <a:cs typeface="Consolas" pitchFamily="49" charset="0"/>
+              </a:rPr>
+              <a:t>4</a:t>
+            </a:r>
+            <a:r>
+              <a:rPr lang="en-US" sz="600" dirty="0">
+                <a:latin typeface="Consolas" pitchFamily="49" charset="0"/>
+                <a:cs typeface="Consolas" pitchFamily="49" charset="0"/>
+              </a:rPr>
+              <a:t>: </a:t>
+            </a:r>
+            <a:r>
+              <a:rPr lang="en-US" sz="600" dirty="0" err="1">
+                <a:latin typeface="Consolas" pitchFamily="49" charset="0"/>
+                <a:cs typeface="Consolas" pitchFamily="49" charset="0"/>
+              </a:rPr>
+              <a:t>str</a:t>
+            </a:r>
+            <a:r>
+              <a:rPr lang="en-US" sz="600" dirty="0">
+                <a:latin typeface="Consolas" pitchFamily="49" charset="0"/>
+                <a:cs typeface="Consolas" pitchFamily="49" charset="0"/>
+              </a:rPr>
+              <a:t> r3, [r2, #12]</a:t>
+            </a:r>
+          </a:p>
+          <a:p>
+            <a:r>
+              <a:rPr lang="en-US" sz="600" dirty="0">
+                <a:latin typeface="Consolas" pitchFamily="49" charset="0"/>
+                <a:cs typeface="Consolas" pitchFamily="49" charset="0"/>
+              </a:rPr>
+              <a:t>   ; store to 0x12340014</a:t>
+            </a:r>
+          </a:p>
+        </p:txBody>
+      </p:sp>
+      <p:sp>
+        <p:nvSpPr>
+          <p:cNvPr id="10" name="TextBox 9"/>
+          <p:cNvSpPr txBox="1"/>
+          <p:nvPr/>
+        </p:nvSpPr>
+        <p:spPr>
+          <a:xfrm>
+            <a:off x="4186119" y="164543"/>
+            <a:ext cx="1997061" cy="2031325"/>
+          </a:xfrm>
+          <a:prstGeom prst="rect">
+            <a:avLst/>
+          </a:prstGeom>
+          <a:noFill/>
+        </p:spPr>
+        <p:txBody>
+          <a:bodyPr wrap="square" rtlCol="0">
+            <a:spAutoFit/>
+          </a:bodyPr>
+          <a:lstStyle/>
+          <a:p>
+            <a:r>
+              <a:rPr lang="en-US" sz="600" dirty="0">
+                <a:latin typeface="Consolas" pitchFamily="49" charset="0"/>
+                <a:cs typeface="Consolas" pitchFamily="49" charset="0"/>
+              </a:rPr>
+              <a:t>1: </a:t>
+            </a:r>
+            <a:r>
+              <a:rPr lang="en-US" sz="600" dirty="0" err="1">
+                <a:latin typeface="Consolas" pitchFamily="49" charset="0"/>
+                <a:cs typeface="Consolas" pitchFamily="49" charset="0"/>
+              </a:rPr>
+              <a:t>rf_metadata</a:t>
+            </a:r>
+            <a:r>
+              <a:rPr lang="en-US" sz="600" dirty="0">
+                <a:latin typeface="Consolas" pitchFamily="49" charset="0"/>
+                <a:cs typeface="Consolas" pitchFamily="49" charset="0"/>
+              </a:rPr>
+              <a:t>[1] = </a:t>
+            </a:r>
+            <a:r>
+              <a:rPr lang="en-US" sz="600" dirty="0" smtClean="0">
+                <a:latin typeface="Consolas" pitchFamily="49" charset="0"/>
+                <a:cs typeface="Consolas" pitchFamily="49" charset="0"/>
+              </a:rPr>
+              <a:t>{r1, r1 </a:t>
+            </a:r>
+            <a:r>
+              <a:rPr lang="en-US" sz="600" dirty="0">
+                <a:latin typeface="Consolas" pitchFamily="49" charset="0"/>
+                <a:cs typeface="Consolas" pitchFamily="49" charset="0"/>
+              </a:rPr>
+              <a:t>+ </a:t>
+            </a:r>
+            <a:r>
+              <a:rPr lang="en-US" sz="600" dirty="0" smtClean="0">
+                <a:latin typeface="Consolas" pitchFamily="49" charset="0"/>
+                <a:cs typeface="Consolas" pitchFamily="49" charset="0"/>
+              </a:rPr>
+              <a:t>0xf}</a:t>
+            </a:r>
+            <a:endParaRPr lang="en-US" sz="600" dirty="0">
+              <a:latin typeface="Consolas" pitchFamily="49" charset="0"/>
+              <a:cs typeface="Consolas" pitchFamily="49" charset="0"/>
+            </a:endParaRPr>
+          </a:p>
+          <a:p>
+            <a:r>
+              <a:rPr lang="en-US" sz="600" dirty="0">
+                <a:latin typeface="Consolas" pitchFamily="49" charset="0"/>
+                <a:cs typeface="Consolas" pitchFamily="49" charset="0"/>
+              </a:rPr>
+              <a:t>     // </a:t>
+            </a:r>
+            <a:r>
+              <a:rPr lang="en-US" sz="600" dirty="0" smtClean="0">
+                <a:latin typeface="Consolas" pitchFamily="49" charset="0"/>
+                <a:cs typeface="Consolas" pitchFamily="49" charset="0"/>
+              </a:rPr>
+              <a:t>{base, bounds} of array</a:t>
+            </a:r>
+            <a:endParaRPr lang="en-US" sz="600" dirty="0">
+              <a:latin typeface="Consolas" pitchFamily="49" charset="0"/>
+              <a:cs typeface="Consolas" pitchFamily="49" charset="0"/>
+            </a:endParaRPr>
+          </a:p>
+          <a:p>
+            <a:endParaRPr lang="en-US" sz="600" dirty="0">
+              <a:latin typeface="Consolas" pitchFamily="49" charset="0"/>
+              <a:cs typeface="Consolas" pitchFamily="49" charset="0"/>
+            </a:endParaRPr>
+          </a:p>
+          <a:p>
+            <a:r>
+              <a:rPr lang="en-US" sz="600" dirty="0">
+                <a:latin typeface="Consolas" pitchFamily="49" charset="0"/>
+                <a:cs typeface="Consolas" pitchFamily="49" charset="0"/>
+              </a:rPr>
+              <a:t>2: </a:t>
+            </a:r>
+            <a:r>
+              <a:rPr lang="en-US" sz="600" dirty="0" err="1">
+                <a:latin typeface="Consolas" pitchFamily="49" charset="0"/>
+                <a:cs typeface="Consolas" pitchFamily="49" charset="0"/>
+              </a:rPr>
+              <a:t>rf_metadata</a:t>
+            </a:r>
+            <a:r>
+              <a:rPr lang="en-US" sz="600" dirty="0">
+                <a:latin typeface="Consolas" pitchFamily="49" charset="0"/>
+                <a:cs typeface="Consolas" pitchFamily="49" charset="0"/>
+              </a:rPr>
+              <a:t>[2] = </a:t>
+            </a:r>
+            <a:r>
+              <a:rPr lang="en-US" sz="600" dirty="0" err="1">
+                <a:latin typeface="Consolas" pitchFamily="49" charset="0"/>
+                <a:cs typeface="Consolas" pitchFamily="49" charset="0"/>
+              </a:rPr>
+              <a:t>rf_metadata</a:t>
+            </a:r>
+            <a:r>
+              <a:rPr lang="en-US" sz="600" dirty="0">
+                <a:latin typeface="Consolas" pitchFamily="49" charset="0"/>
+                <a:cs typeface="Consolas" pitchFamily="49" charset="0"/>
+              </a:rPr>
+              <a:t>[1]</a:t>
+            </a:r>
+          </a:p>
+          <a:p>
+            <a:endParaRPr lang="en-US" sz="600" dirty="0">
+              <a:latin typeface="Consolas" pitchFamily="49" charset="0"/>
+              <a:cs typeface="Consolas" pitchFamily="49" charset="0"/>
+            </a:endParaRPr>
+          </a:p>
+          <a:p>
+            <a:endParaRPr lang="en-US" sz="600" dirty="0" smtClean="0">
+              <a:latin typeface="Consolas" pitchFamily="49" charset="0"/>
+              <a:cs typeface="Consolas" pitchFamily="49" charset="0"/>
+            </a:endParaRPr>
+          </a:p>
+          <a:p>
+            <a:endParaRPr lang="en-US" sz="600" dirty="0" smtClean="0">
+              <a:latin typeface="Consolas" pitchFamily="49" charset="0"/>
+              <a:cs typeface="Consolas" pitchFamily="49" charset="0"/>
+            </a:endParaRPr>
+          </a:p>
+          <a:p>
+            <a:endParaRPr lang="en-US" sz="600" dirty="0" smtClean="0">
+              <a:latin typeface="Consolas" pitchFamily="49" charset="0"/>
+              <a:cs typeface="Consolas" pitchFamily="49" charset="0"/>
+            </a:endParaRPr>
+          </a:p>
+          <a:p>
+            <a:r>
+              <a:rPr lang="en-US" sz="600" dirty="0" smtClean="0">
+                <a:latin typeface="Consolas" pitchFamily="49" charset="0"/>
+                <a:cs typeface="Consolas" pitchFamily="49" charset="0"/>
+              </a:rPr>
+              <a:t>3a</a:t>
+            </a:r>
+            <a:r>
+              <a:rPr lang="en-US" sz="600" dirty="0">
+                <a:latin typeface="Consolas" pitchFamily="49" charset="0"/>
+                <a:cs typeface="Consolas" pitchFamily="49" charset="0"/>
+              </a:rPr>
+              <a:t>: </a:t>
+            </a:r>
+            <a:r>
+              <a:rPr lang="en-US" sz="600" dirty="0" err="1">
+                <a:latin typeface="Consolas" pitchFamily="49" charset="0"/>
+                <a:cs typeface="Consolas" pitchFamily="49" charset="0"/>
+              </a:rPr>
+              <a:t>rf_metadata</a:t>
+            </a:r>
+            <a:r>
+              <a:rPr lang="en-US" sz="600" dirty="0">
+                <a:latin typeface="Consolas" pitchFamily="49" charset="0"/>
+                <a:cs typeface="Consolas" pitchFamily="49" charset="0"/>
+              </a:rPr>
+              <a:t>[3] = NULL</a:t>
+            </a:r>
+          </a:p>
+          <a:p>
+            <a:endParaRPr lang="en-US" sz="600" dirty="0">
+              <a:latin typeface="Consolas" pitchFamily="49" charset="0"/>
+              <a:cs typeface="Consolas" pitchFamily="49" charset="0"/>
+            </a:endParaRPr>
+          </a:p>
+          <a:p>
+            <a:r>
+              <a:rPr lang="en-US" sz="600" dirty="0" smtClean="0">
+                <a:latin typeface="Consolas" pitchFamily="49" charset="0"/>
+                <a:cs typeface="Consolas" pitchFamily="49" charset="0"/>
+              </a:rPr>
+              <a:t>3b</a:t>
+            </a:r>
+            <a:r>
+              <a:rPr lang="en-US" sz="600" dirty="0">
+                <a:latin typeface="Consolas" pitchFamily="49" charset="0"/>
+                <a:cs typeface="Consolas" pitchFamily="49" charset="0"/>
+              </a:rPr>
+              <a:t>: if (r1 + 12 &lt; </a:t>
+            </a:r>
+            <a:r>
+              <a:rPr lang="en-US" sz="600" dirty="0" smtClean="0">
+                <a:latin typeface="Consolas" pitchFamily="49" charset="0"/>
+                <a:cs typeface="Consolas" pitchFamily="49" charset="0"/>
+              </a:rPr>
+              <a:t>base(</a:t>
+            </a:r>
+            <a:r>
+              <a:rPr lang="en-US" sz="600" dirty="0" err="1" smtClean="0">
+                <a:latin typeface="Consolas" pitchFamily="49" charset="0"/>
+                <a:cs typeface="Consolas" pitchFamily="49" charset="0"/>
+              </a:rPr>
+              <a:t>rf_metadata</a:t>
+            </a:r>
+            <a:r>
+              <a:rPr lang="en-US" sz="600" dirty="0" smtClean="0">
+                <a:latin typeface="Consolas" pitchFamily="49" charset="0"/>
+                <a:cs typeface="Consolas" pitchFamily="49" charset="0"/>
+              </a:rPr>
+              <a:t>[1</a:t>
+            </a:r>
+            <a:r>
+              <a:rPr lang="en-US" sz="600" dirty="0">
+                <a:latin typeface="Consolas" pitchFamily="49" charset="0"/>
+                <a:cs typeface="Consolas" pitchFamily="49" charset="0"/>
+              </a:rPr>
+              <a:t>]) ||</a:t>
+            </a:r>
+          </a:p>
+          <a:p>
+            <a:r>
+              <a:rPr lang="en-US" sz="600" dirty="0">
+                <a:latin typeface="Consolas" pitchFamily="49" charset="0"/>
+                <a:cs typeface="Consolas" pitchFamily="49" charset="0"/>
+              </a:rPr>
+              <a:t>        r1 + 12 &gt; </a:t>
+            </a:r>
+            <a:r>
+              <a:rPr lang="en-US" sz="600" dirty="0" smtClean="0">
+                <a:latin typeface="Consolas" pitchFamily="49" charset="0"/>
+                <a:cs typeface="Consolas" pitchFamily="49" charset="0"/>
+              </a:rPr>
+              <a:t>bound(</a:t>
+            </a:r>
+            <a:r>
+              <a:rPr lang="en-US" sz="600" dirty="0" err="1" smtClean="0">
+                <a:latin typeface="Consolas" pitchFamily="49" charset="0"/>
+                <a:cs typeface="Consolas" pitchFamily="49" charset="0"/>
+              </a:rPr>
+              <a:t>rf_metadata</a:t>
+            </a:r>
+            <a:r>
+              <a:rPr lang="en-US" sz="600" dirty="0" smtClean="0">
+                <a:latin typeface="Consolas" pitchFamily="49" charset="0"/>
+                <a:cs typeface="Consolas" pitchFamily="49" charset="0"/>
+              </a:rPr>
+              <a:t>[1</a:t>
+            </a:r>
+            <a:r>
+              <a:rPr lang="en-US" sz="600" dirty="0">
+                <a:latin typeface="Consolas" pitchFamily="49" charset="0"/>
+                <a:cs typeface="Consolas" pitchFamily="49" charset="0"/>
+              </a:rPr>
+              <a:t>])) {</a:t>
+            </a:r>
+          </a:p>
+          <a:p>
+            <a:r>
+              <a:rPr lang="en-US" sz="600" dirty="0">
+                <a:latin typeface="Consolas" pitchFamily="49" charset="0"/>
+                <a:cs typeface="Consolas" pitchFamily="49" charset="0"/>
+              </a:rPr>
+              <a:t>      // raise error</a:t>
+            </a:r>
+          </a:p>
+          <a:p>
+            <a:r>
+              <a:rPr lang="en-US" sz="600" dirty="0">
+                <a:latin typeface="Consolas" pitchFamily="49" charset="0"/>
+                <a:cs typeface="Consolas" pitchFamily="49" charset="0"/>
+              </a:rPr>
+              <a:t>    }</a:t>
+            </a:r>
+          </a:p>
+          <a:p>
+            <a:r>
+              <a:rPr lang="en-US" sz="600" dirty="0">
+                <a:latin typeface="Consolas" pitchFamily="49" charset="0"/>
+                <a:cs typeface="Consolas" pitchFamily="49" charset="0"/>
+              </a:rPr>
+              <a:t>    </a:t>
+            </a:r>
+            <a:r>
+              <a:rPr lang="en-US" sz="600" dirty="0" err="1">
+                <a:latin typeface="Consolas" pitchFamily="49" charset="0"/>
+                <a:cs typeface="Consolas" pitchFamily="49" charset="0"/>
+              </a:rPr>
+              <a:t>mem_metadata</a:t>
+            </a:r>
+            <a:r>
+              <a:rPr lang="en-US" sz="600" dirty="0">
+                <a:latin typeface="Consolas" pitchFamily="49" charset="0"/>
+                <a:cs typeface="Consolas" pitchFamily="49" charset="0"/>
+              </a:rPr>
+              <a:t>[r1 + 12] </a:t>
+            </a:r>
+            <a:r>
+              <a:rPr lang="en-US" sz="600" dirty="0" smtClean="0">
+                <a:latin typeface="Consolas" pitchFamily="49" charset="0"/>
+                <a:cs typeface="Consolas" pitchFamily="49" charset="0"/>
+              </a:rPr>
+              <a:t>= </a:t>
+            </a:r>
+            <a:r>
+              <a:rPr lang="en-US" sz="600" dirty="0" err="1" smtClean="0">
+                <a:latin typeface="Consolas" pitchFamily="49" charset="0"/>
+                <a:cs typeface="Consolas" pitchFamily="49" charset="0"/>
+              </a:rPr>
+              <a:t>rf_metadata</a:t>
+            </a:r>
+            <a:r>
+              <a:rPr lang="en-US" sz="600" dirty="0" smtClean="0">
+                <a:latin typeface="Consolas" pitchFamily="49" charset="0"/>
+                <a:cs typeface="Consolas" pitchFamily="49" charset="0"/>
+              </a:rPr>
+              <a:t>[3</a:t>
+            </a:r>
+            <a:r>
+              <a:rPr lang="en-US" sz="600" dirty="0">
+                <a:latin typeface="Consolas" pitchFamily="49" charset="0"/>
+                <a:cs typeface="Consolas" pitchFamily="49" charset="0"/>
+              </a:rPr>
+              <a:t>];</a:t>
+            </a:r>
+          </a:p>
+          <a:p>
+            <a:endParaRPr lang="en-US" sz="600" dirty="0">
+              <a:latin typeface="Consolas" pitchFamily="49" charset="0"/>
+              <a:cs typeface="Consolas" pitchFamily="49" charset="0"/>
+            </a:endParaRPr>
+          </a:p>
+          <a:p>
+            <a:r>
+              <a:rPr lang="en-US" sz="600" dirty="0">
+                <a:latin typeface="Consolas" pitchFamily="49" charset="0"/>
+                <a:cs typeface="Consolas" pitchFamily="49" charset="0"/>
+              </a:rPr>
+              <a:t>4: if (r2 + 12 &lt; </a:t>
+            </a:r>
+            <a:r>
+              <a:rPr lang="en-US" sz="600" dirty="0" smtClean="0">
+                <a:latin typeface="Consolas" pitchFamily="49" charset="0"/>
+                <a:cs typeface="Consolas" pitchFamily="49" charset="0"/>
+              </a:rPr>
+              <a:t>base(</a:t>
+            </a:r>
+            <a:r>
+              <a:rPr lang="en-US" sz="600" dirty="0" err="1" smtClean="0">
+                <a:latin typeface="Consolas" pitchFamily="49" charset="0"/>
+                <a:cs typeface="Consolas" pitchFamily="49" charset="0"/>
+              </a:rPr>
+              <a:t>rf_metadata</a:t>
+            </a:r>
+            <a:r>
+              <a:rPr lang="en-US" sz="600" dirty="0" smtClean="0">
+                <a:latin typeface="Consolas" pitchFamily="49" charset="0"/>
+                <a:cs typeface="Consolas" pitchFamily="49" charset="0"/>
+              </a:rPr>
+              <a:t>[2</a:t>
+            </a:r>
+            <a:r>
+              <a:rPr lang="en-US" sz="600" dirty="0">
+                <a:latin typeface="Consolas" pitchFamily="49" charset="0"/>
+                <a:cs typeface="Consolas" pitchFamily="49" charset="0"/>
+              </a:rPr>
+              <a:t>]) ||</a:t>
+            </a:r>
+          </a:p>
+          <a:p>
+            <a:r>
+              <a:rPr lang="en-US" sz="600" dirty="0">
+                <a:latin typeface="Consolas" pitchFamily="49" charset="0"/>
+                <a:cs typeface="Consolas" pitchFamily="49" charset="0"/>
+              </a:rPr>
+              <a:t>       r2 + 12 &gt; </a:t>
+            </a:r>
+            <a:r>
+              <a:rPr lang="en-US" sz="600" dirty="0" smtClean="0">
+                <a:latin typeface="Consolas" pitchFamily="49" charset="0"/>
+                <a:cs typeface="Consolas" pitchFamily="49" charset="0"/>
+              </a:rPr>
+              <a:t>bound(</a:t>
+            </a:r>
+            <a:r>
+              <a:rPr lang="en-US" sz="600" dirty="0" err="1" smtClean="0">
+                <a:latin typeface="Consolas" pitchFamily="49" charset="0"/>
+                <a:cs typeface="Consolas" pitchFamily="49" charset="0"/>
+              </a:rPr>
+              <a:t>rf_metadata</a:t>
+            </a:r>
+            <a:r>
+              <a:rPr lang="en-US" sz="600" dirty="0" smtClean="0">
+                <a:latin typeface="Consolas" pitchFamily="49" charset="0"/>
+                <a:cs typeface="Consolas" pitchFamily="49" charset="0"/>
+              </a:rPr>
+              <a:t>[2</a:t>
+            </a:r>
+            <a:r>
+              <a:rPr lang="en-US" sz="600" dirty="0">
+                <a:latin typeface="Consolas" pitchFamily="49" charset="0"/>
+                <a:cs typeface="Consolas" pitchFamily="49" charset="0"/>
+              </a:rPr>
+              <a:t>])) {</a:t>
+            </a:r>
+          </a:p>
+          <a:p>
+            <a:r>
+              <a:rPr lang="en-US" sz="600" dirty="0">
+                <a:latin typeface="Consolas" pitchFamily="49" charset="0"/>
+                <a:cs typeface="Consolas" pitchFamily="49" charset="0"/>
+              </a:rPr>
+              <a:t>     // raise error</a:t>
+            </a:r>
+          </a:p>
+          <a:p>
+            <a:r>
+              <a:rPr lang="en-US" sz="600" dirty="0">
+                <a:latin typeface="Consolas" pitchFamily="49" charset="0"/>
+                <a:cs typeface="Consolas" pitchFamily="49" charset="0"/>
+              </a:rPr>
+              <a:t>   }</a:t>
+            </a:r>
+          </a:p>
+          <a:p>
+            <a:r>
+              <a:rPr lang="en-US" sz="600" dirty="0">
+                <a:latin typeface="Consolas" pitchFamily="49" charset="0"/>
+                <a:cs typeface="Consolas" pitchFamily="49" charset="0"/>
+              </a:rPr>
+              <a:t>   </a:t>
+            </a:r>
+            <a:r>
+              <a:rPr lang="en-US" sz="600" dirty="0" err="1">
+                <a:latin typeface="Consolas" pitchFamily="49" charset="0"/>
+                <a:cs typeface="Consolas" pitchFamily="49" charset="0"/>
+              </a:rPr>
+              <a:t>mem_metadata</a:t>
+            </a:r>
+            <a:r>
+              <a:rPr lang="en-US" sz="600" dirty="0">
+                <a:latin typeface="Consolas" pitchFamily="49" charset="0"/>
+                <a:cs typeface="Consolas" pitchFamily="49" charset="0"/>
+              </a:rPr>
+              <a:t>[r2 + 12] </a:t>
+            </a:r>
+            <a:r>
+              <a:rPr lang="en-US" sz="600" dirty="0" smtClean="0">
+                <a:latin typeface="Consolas" pitchFamily="49" charset="0"/>
+                <a:cs typeface="Consolas" pitchFamily="49" charset="0"/>
+              </a:rPr>
+              <a:t>= </a:t>
+            </a:r>
+            <a:r>
+              <a:rPr lang="en-US" sz="600" dirty="0" err="1">
+                <a:latin typeface="Consolas" pitchFamily="49" charset="0"/>
+                <a:cs typeface="Consolas" pitchFamily="49" charset="0"/>
+              </a:rPr>
+              <a:t>rf_metadata</a:t>
+            </a:r>
+            <a:r>
+              <a:rPr lang="en-US" sz="600" dirty="0">
+                <a:latin typeface="Consolas" pitchFamily="49" charset="0"/>
+                <a:cs typeface="Consolas" pitchFamily="49" charset="0"/>
+              </a:rPr>
+              <a:t>[3];</a:t>
+            </a:r>
+          </a:p>
+        </p:txBody>
+      </p:sp>
+      <p:sp>
+        <p:nvSpPr>
+          <p:cNvPr id="15" name="TextBox 14"/>
+          <p:cNvSpPr txBox="1"/>
+          <p:nvPr/>
+        </p:nvSpPr>
+        <p:spPr>
+          <a:xfrm>
+            <a:off x="326422" y="-31512"/>
+            <a:ext cx="1318567" cy="215444"/>
+          </a:xfrm>
+          <a:prstGeom prst="rect">
+            <a:avLst/>
+          </a:prstGeom>
+          <a:noFill/>
+        </p:spPr>
+        <p:txBody>
+          <a:bodyPr wrap="square" rtlCol="0">
+            <a:spAutoFit/>
+          </a:bodyPr>
+          <a:lstStyle/>
+          <a:p>
+            <a:pPr algn="ctr"/>
+            <a:r>
+              <a:rPr lang="en-US" sz="800" dirty="0" smtClean="0">
+                <a:latin typeface="Arial" pitchFamily="34" charset="0"/>
+                <a:cs typeface="Arial" pitchFamily="34" charset="0"/>
+              </a:rPr>
+              <a:t>Main Core (Assembly)</a:t>
+            </a:r>
+            <a:endParaRPr lang="en-US" sz="800" dirty="0">
+              <a:latin typeface="Arial" pitchFamily="34" charset="0"/>
+              <a:cs typeface="Arial" pitchFamily="34" charset="0"/>
+            </a:endParaRPr>
+          </a:p>
+        </p:txBody>
+      </p:sp>
+      <p:sp>
+        <p:nvSpPr>
+          <p:cNvPr id="16" name="TextBox 15"/>
+          <p:cNvSpPr txBox="1"/>
+          <p:nvPr/>
+        </p:nvSpPr>
+        <p:spPr>
+          <a:xfrm>
+            <a:off x="2584307" y="-31512"/>
+            <a:ext cx="784107" cy="215444"/>
+          </a:xfrm>
+          <a:prstGeom prst="rect">
+            <a:avLst/>
+          </a:prstGeom>
+          <a:noFill/>
+        </p:spPr>
+        <p:txBody>
+          <a:bodyPr wrap="square" rtlCol="0">
+            <a:spAutoFit/>
+          </a:bodyPr>
+          <a:lstStyle/>
+          <a:p>
+            <a:pPr algn="ctr"/>
+            <a:r>
+              <a:rPr lang="en-US" sz="800" dirty="0" smtClean="0">
+                <a:latin typeface="Arial" pitchFamily="34" charset="0"/>
+                <a:cs typeface="Arial" pitchFamily="34" charset="0"/>
+              </a:rPr>
+              <a:t>Invalidation</a:t>
+            </a:r>
+            <a:endParaRPr lang="en-US" sz="800" dirty="0">
+              <a:latin typeface="Arial" pitchFamily="34" charset="0"/>
+              <a:cs typeface="Arial" pitchFamily="34" charset="0"/>
+            </a:endParaRPr>
+          </a:p>
+        </p:txBody>
+      </p:sp>
+      <p:sp>
+        <p:nvSpPr>
+          <p:cNvPr id="17" name="TextBox 16"/>
+          <p:cNvSpPr txBox="1"/>
+          <p:nvPr/>
+        </p:nvSpPr>
+        <p:spPr>
+          <a:xfrm>
+            <a:off x="4608574" y="-31512"/>
+            <a:ext cx="1152150" cy="215444"/>
+          </a:xfrm>
+          <a:prstGeom prst="rect">
+            <a:avLst/>
+          </a:prstGeom>
+          <a:noFill/>
+        </p:spPr>
+        <p:txBody>
+          <a:bodyPr wrap="square" rtlCol="0">
+            <a:spAutoFit/>
+          </a:bodyPr>
+          <a:lstStyle/>
+          <a:p>
+            <a:pPr algn="ctr"/>
+            <a:r>
+              <a:rPr lang="en-US" sz="800" dirty="0" smtClean="0">
+                <a:latin typeface="Arial" pitchFamily="34" charset="0"/>
+                <a:cs typeface="Arial" pitchFamily="34" charset="0"/>
+              </a:rPr>
+              <a:t>Monitor</a:t>
+            </a:r>
+            <a:endParaRPr lang="en-US" sz="800" dirty="0">
+              <a:latin typeface="Arial" pitchFamily="34" charset="0"/>
+              <a:cs typeface="Arial" pitchFamily="34" charset="0"/>
+            </a:endParaRPr>
+          </a:p>
+        </p:txBody>
+      </p:sp>
+      <p:sp>
+        <p:nvSpPr>
+          <p:cNvPr id="11" name="TextBox 10"/>
+          <p:cNvSpPr txBox="1"/>
+          <p:nvPr/>
+        </p:nvSpPr>
+        <p:spPr>
+          <a:xfrm>
+            <a:off x="1728199" y="164543"/>
+            <a:ext cx="2496325" cy="1938992"/>
+          </a:xfrm>
+          <a:prstGeom prst="rect">
+            <a:avLst/>
+          </a:prstGeom>
+          <a:noFill/>
+        </p:spPr>
+        <p:txBody>
+          <a:bodyPr wrap="square" rtlCol="0">
+            <a:spAutoFit/>
+          </a:bodyPr>
+          <a:lstStyle/>
+          <a:p>
+            <a:r>
+              <a:rPr lang="en-US" sz="600" dirty="0" smtClean="0">
+                <a:latin typeface="Consolas" pitchFamily="49" charset="0"/>
+                <a:cs typeface="Consolas" pitchFamily="49" charset="0"/>
+              </a:rPr>
+              <a:t>1: </a:t>
+            </a:r>
+            <a:r>
+              <a:rPr lang="en-US" sz="600" dirty="0" err="1" smtClean="0">
+                <a:latin typeface="Consolas" pitchFamily="49" charset="0"/>
+                <a:cs typeface="Consolas" pitchFamily="49" charset="0"/>
+              </a:rPr>
+              <a:t>rf_invalid</a:t>
+            </a:r>
+            <a:r>
+              <a:rPr lang="en-US" sz="600" dirty="0" smtClean="0">
+                <a:latin typeface="Consolas" pitchFamily="49" charset="0"/>
+                <a:cs typeface="Consolas" pitchFamily="49" charset="0"/>
+              </a:rPr>
+              <a:t>[1] = false // true if dropped</a:t>
+            </a:r>
+          </a:p>
+          <a:p>
+            <a:endParaRPr lang="en-US" sz="600" dirty="0">
+              <a:latin typeface="Consolas" pitchFamily="49" charset="0"/>
+              <a:cs typeface="Consolas" pitchFamily="49" charset="0"/>
+            </a:endParaRPr>
+          </a:p>
+          <a:p>
+            <a:endParaRPr lang="en-US" sz="600" dirty="0" smtClean="0">
+              <a:latin typeface="Consolas" pitchFamily="49" charset="0"/>
+              <a:cs typeface="Consolas" pitchFamily="49" charset="0"/>
+            </a:endParaRPr>
+          </a:p>
+          <a:p>
+            <a:r>
+              <a:rPr lang="en-US" sz="600" dirty="0" smtClean="0">
+                <a:latin typeface="Consolas" pitchFamily="49" charset="0"/>
+                <a:cs typeface="Consolas" pitchFamily="49" charset="0"/>
+              </a:rPr>
+              <a:t>2: if (</a:t>
+            </a:r>
+            <a:r>
+              <a:rPr lang="en-US" sz="600" dirty="0" err="1" smtClean="0">
+                <a:latin typeface="Consolas" pitchFamily="49" charset="0"/>
+                <a:cs typeface="Consolas" pitchFamily="49" charset="0"/>
+              </a:rPr>
+              <a:t>rf_invalid</a:t>
+            </a:r>
+            <a:r>
+              <a:rPr lang="en-US" sz="600" dirty="0" smtClean="0">
+                <a:latin typeface="Consolas" pitchFamily="49" charset="0"/>
+                <a:cs typeface="Consolas" pitchFamily="49" charset="0"/>
+              </a:rPr>
+              <a:t>[1]) {</a:t>
+            </a:r>
+          </a:p>
+          <a:p>
+            <a:r>
+              <a:rPr lang="en-US" sz="600" dirty="0">
+                <a:latin typeface="Consolas" pitchFamily="49" charset="0"/>
+                <a:cs typeface="Consolas" pitchFamily="49" charset="0"/>
+              </a:rPr>
+              <a:t> </a:t>
+            </a:r>
+            <a:r>
+              <a:rPr lang="en-US" sz="600" dirty="0" smtClean="0">
+                <a:latin typeface="Consolas" pitchFamily="49" charset="0"/>
+                <a:cs typeface="Consolas" pitchFamily="49" charset="0"/>
+              </a:rPr>
+              <a:t>    // drop monitoring</a:t>
+            </a:r>
+          </a:p>
+          <a:p>
+            <a:r>
+              <a:rPr lang="en-US" sz="600" dirty="0" smtClean="0">
+                <a:latin typeface="Consolas" pitchFamily="49" charset="0"/>
+                <a:cs typeface="Consolas" pitchFamily="49" charset="0"/>
+              </a:rPr>
+              <a:t>   }</a:t>
+            </a:r>
+          </a:p>
+          <a:p>
+            <a:r>
+              <a:rPr lang="en-US" sz="600" dirty="0" smtClean="0">
+                <a:latin typeface="Consolas" pitchFamily="49" charset="0"/>
+                <a:cs typeface="Consolas" pitchFamily="49" charset="0"/>
+              </a:rPr>
+              <a:t>   </a:t>
+            </a:r>
+            <a:r>
+              <a:rPr lang="en-US" sz="600" dirty="0" err="1" smtClean="0">
+                <a:latin typeface="Consolas" pitchFamily="49" charset="0"/>
+                <a:cs typeface="Consolas" pitchFamily="49" charset="0"/>
+              </a:rPr>
+              <a:t>rf_invalid</a:t>
+            </a:r>
+            <a:r>
+              <a:rPr lang="en-US" sz="600" dirty="0" smtClean="0">
+                <a:latin typeface="Consolas" pitchFamily="49" charset="0"/>
+                <a:cs typeface="Consolas" pitchFamily="49" charset="0"/>
+              </a:rPr>
+              <a:t>[2] = </a:t>
+            </a:r>
+            <a:r>
+              <a:rPr lang="en-US" sz="600" dirty="0" err="1" smtClean="0">
+                <a:latin typeface="Consolas" pitchFamily="49" charset="0"/>
+                <a:cs typeface="Consolas" pitchFamily="49" charset="0"/>
+              </a:rPr>
+              <a:t>rf_invalid</a:t>
+            </a:r>
+            <a:r>
+              <a:rPr lang="en-US" sz="600" dirty="0" smtClean="0">
+                <a:latin typeface="Consolas" pitchFamily="49" charset="0"/>
+                <a:cs typeface="Consolas" pitchFamily="49" charset="0"/>
+              </a:rPr>
+              <a:t>[1]</a:t>
+            </a:r>
+          </a:p>
+          <a:p>
+            <a:endParaRPr lang="en-US" sz="600" dirty="0">
+              <a:latin typeface="Consolas" pitchFamily="49" charset="0"/>
+              <a:cs typeface="Consolas" pitchFamily="49" charset="0"/>
+            </a:endParaRPr>
+          </a:p>
+          <a:p>
+            <a:r>
+              <a:rPr lang="en-US" sz="600" dirty="0" smtClean="0">
+                <a:latin typeface="Consolas" pitchFamily="49" charset="0"/>
+                <a:cs typeface="Consolas" pitchFamily="49" charset="0"/>
+              </a:rPr>
+              <a:t>3a: </a:t>
+            </a:r>
+            <a:r>
+              <a:rPr lang="en-US" sz="600" dirty="0" err="1" smtClean="0">
+                <a:latin typeface="Consolas" pitchFamily="49" charset="0"/>
+                <a:cs typeface="Consolas" pitchFamily="49" charset="0"/>
+              </a:rPr>
+              <a:t>rf_invalid</a:t>
+            </a:r>
+            <a:r>
+              <a:rPr lang="en-US" sz="600" dirty="0" smtClean="0">
+                <a:latin typeface="Consolas" pitchFamily="49" charset="0"/>
+                <a:cs typeface="Consolas" pitchFamily="49" charset="0"/>
+              </a:rPr>
+              <a:t>[3] = false</a:t>
+            </a:r>
+          </a:p>
+          <a:p>
+            <a:endParaRPr lang="en-US" sz="600" dirty="0">
+              <a:latin typeface="Consolas" pitchFamily="49" charset="0"/>
+              <a:cs typeface="Consolas" pitchFamily="49" charset="0"/>
+            </a:endParaRPr>
+          </a:p>
+          <a:p>
+            <a:r>
+              <a:rPr lang="en-US" sz="600" dirty="0" smtClean="0">
+                <a:latin typeface="Consolas" pitchFamily="49" charset="0"/>
+                <a:cs typeface="Consolas" pitchFamily="49" charset="0"/>
+              </a:rPr>
+              <a:t>3b: if (</a:t>
+            </a:r>
+            <a:r>
+              <a:rPr lang="en-US" sz="600" dirty="0" err="1" smtClean="0">
+                <a:latin typeface="Consolas" pitchFamily="49" charset="0"/>
+                <a:cs typeface="Consolas" pitchFamily="49" charset="0"/>
+              </a:rPr>
+              <a:t>rf_invalid</a:t>
+            </a:r>
+            <a:r>
+              <a:rPr lang="en-US" sz="600" dirty="0" smtClean="0">
+                <a:latin typeface="Consolas" pitchFamily="49" charset="0"/>
+                <a:cs typeface="Consolas" pitchFamily="49" charset="0"/>
+              </a:rPr>
+              <a:t>[1] || </a:t>
+            </a:r>
+            <a:r>
+              <a:rPr lang="en-US" sz="600" dirty="0" err="1" smtClean="0">
+                <a:latin typeface="Consolas" pitchFamily="49" charset="0"/>
+                <a:cs typeface="Consolas" pitchFamily="49" charset="0"/>
+              </a:rPr>
+              <a:t>rf_invalid</a:t>
+            </a:r>
+            <a:r>
+              <a:rPr lang="en-US" sz="600" dirty="0" smtClean="0">
+                <a:latin typeface="Consolas" pitchFamily="49" charset="0"/>
+                <a:cs typeface="Consolas" pitchFamily="49" charset="0"/>
+              </a:rPr>
+              <a:t>[3]) {</a:t>
+            </a:r>
+          </a:p>
+          <a:p>
+            <a:r>
+              <a:rPr lang="en-US" sz="600" dirty="0">
+                <a:latin typeface="Consolas" pitchFamily="49" charset="0"/>
+                <a:cs typeface="Consolas" pitchFamily="49" charset="0"/>
+              </a:rPr>
+              <a:t> </a:t>
+            </a:r>
+            <a:r>
+              <a:rPr lang="en-US" sz="600" dirty="0" smtClean="0">
+                <a:latin typeface="Consolas" pitchFamily="49" charset="0"/>
+                <a:cs typeface="Consolas" pitchFamily="49" charset="0"/>
+              </a:rPr>
+              <a:t>     // drop monitoring</a:t>
+            </a:r>
+          </a:p>
+          <a:p>
+            <a:r>
+              <a:rPr lang="en-US" sz="600" dirty="0">
+                <a:latin typeface="Consolas" pitchFamily="49" charset="0"/>
+                <a:cs typeface="Consolas" pitchFamily="49" charset="0"/>
+              </a:rPr>
+              <a:t> </a:t>
+            </a:r>
+            <a:r>
+              <a:rPr lang="en-US" sz="600" dirty="0" smtClean="0">
+                <a:latin typeface="Consolas" pitchFamily="49" charset="0"/>
+                <a:cs typeface="Consolas" pitchFamily="49" charset="0"/>
+              </a:rPr>
+              <a:t>   }</a:t>
+            </a:r>
+          </a:p>
+          <a:p>
+            <a:r>
+              <a:rPr lang="en-US" sz="600" dirty="0" smtClean="0">
+                <a:latin typeface="Consolas" pitchFamily="49" charset="0"/>
+                <a:cs typeface="Consolas" pitchFamily="49" charset="0"/>
+              </a:rPr>
+              <a:t>    </a:t>
+            </a:r>
+            <a:r>
+              <a:rPr lang="en-US" sz="600" dirty="0" err="1" smtClean="0">
+                <a:latin typeface="Consolas" pitchFamily="49" charset="0"/>
+                <a:cs typeface="Consolas" pitchFamily="49" charset="0"/>
+              </a:rPr>
+              <a:t>mem_invalid</a:t>
+            </a:r>
+            <a:r>
+              <a:rPr lang="en-US" sz="600" dirty="0" smtClean="0">
+                <a:latin typeface="Consolas" pitchFamily="49" charset="0"/>
+                <a:cs typeface="Consolas" pitchFamily="49" charset="0"/>
+              </a:rPr>
+              <a:t>[r1 + 12] = </a:t>
+            </a:r>
+            <a:r>
+              <a:rPr lang="en-US" sz="600" dirty="0" err="1" smtClean="0">
+                <a:latin typeface="Consolas" pitchFamily="49" charset="0"/>
+                <a:cs typeface="Consolas" pitchFamily="49" charset="0"/>
+              </a:rPr>
+              <a:t>rf_invalid</a:t>
+            </a:r>
+            <a:r>
+              <a:rPr lang="en-US" sz="600" dirty="0" smtClean="0">
+                <a:latin typeface="Consolas" pitchFamily="49" charset="0"/>
+                <a:cs typeface="Consolas" pitchFamily="49" charset="0"/>
+              </a:rPr>
+              <a:t>[3]</a:t>
+            </a:r>
+          </a:p>
+          <a:p>
+            <a:endParaRPr lang="en-US" sz="600" dirty="0" smtClean="0">
+              <a:latin typeface="Consolas" pitchFamily="49" charset="0"/>
+              <a:cs typeface="Consolas" pitchFamily="49" charset="0"/>
+            </a:endParaRPr>
+          </a:p>
+          <a:p>
+            <a:endParaRPr lang="en-US" sz="600" dirty="0" smtClean="0">
+              <a:latin typeface="Consolas" pitchFamily="49" charset="0"/>
+              <a:cs typeface="Consolas" pitchFamily="49" charset="0"/>
+            </a:endParaRPr>
+          </a:p>
+          <a:p>
+            <a:r>
+              <a:rPr lang="en-US" sz="600" dirty="0" smtClean="0">
+                <a:latin typeface="Consolas" pitchFamily="49" charset="0"/>
+                <a:cs typeface="Consolas" pitchFamily="49" charset="0"/>
+              </a:rPr>
+              <a:t>4: if (</a:t>
+            </a:r>
+            <a:r>
+              <a:rPr lang="en-US" sz="600" dirty="0" err="1" smtClean="0">
+                <a:latin typeface="Consolas" pitchFamily="49" charset="0"/>
+                <a:cs typeface="Consolas" pitchFamily="49" charset="0"/>
+              </a:rPr>
+              <a:t>rf_invalid</a:t>
+            </a:r>
+            <a:r>
+              <a:rPr lang="en-US" sz="600" dirty="0" smtClean="0">
+                <a:latin typeface="Consolas" pitchFamily="49" charset="0"/>
+                <a:cs typeface="Consolas" pitchFamily="49" charset="0"/>
+              </a:rPr>
+              <a:t>[2] || </a:t>
+            </a:r>
+            <a:r>
+              <a:rPr lang="en-US" sz="600" dirty="0" err="1" smtClean="0">
+                <a:latin typeface="Consolas" pitchFamily="49" charset="0"/>
+                <a:cs typeface="Consolas" pitchFamily="49" charset="0"/>
+              </a:rPr>
+              <a:t>rf_invalid</a:t>
+            </a:r>
+            <a:r>
+              <a:rPr lang="en-US" sz="600" dirty="0" smtClean="0">
+                <a:latin typeface="Consolas" pitchFamily="49" charset="0"/>
+                <a:cs typeface="Consolas" pitchFamily="49" charset="0"/>
+              </a:rPr>
+              <a:t>[3]) {</a:t>
+            </a:r>
+          </a:p>
+          <a:p>
+            <a:r>
+              <a:rPr lang="en-US" sz="600" dirty="0">
+                <a:latin typeface="Consolas" pitchFamily="49" charset="0"/>
+                <a:cs typeface="Consolas" pitchFamily="49" charset="0"/>
+              </a:rPr>
+              <a:t> </a:t>
+            </a:r>
+            <a:r>
+              <a:rPr lang="en-US" sz="600" dirty="0" smtClean="0">
+                <a:latin typeface="Consolas" pitchFamily="49" charset="0"/>
+                <a:cs typeface="Consolas" pitchFamily="49" charset="0"/>
+              </a:rPr>
+              <a:t>    // drop monitoring</a:t>
+            </a:r>
+          </a:p>
+          <a:p>
+            <a:r>
+              <a:rPr lang="en-US" sz="600" dirty="0">
+                <a:latin typeface="Consolas" pitchFamily="49" charset="0"/>
+                <a:cs typeface="Consolas" pitchFamily="49" charset="0"/>
+              </a:rPr>
+              <a:t> </a:t>
+            </a:r>
+            <a:r>
+              <a:rPr lang="en-US" sz="600" dirty="0" smtClean="0">
+                <a:latin typeface="Consolas" pitchFamily="49" charset="0"/>
+                <a:cs typeface="Consolas" pitchFamily="49" charset="0"/>
+              </a:rPr>
+              <a:t>  }</a:t>
+            </a:r>
+          </a:p>
+          <a:p>
+            <a:r>
+              <a:rPr lang="en-US" sz="600" dirty="0">
+                <a:latin typeface="Consolas" pitchFamily="49" charset="0"/>
+                <a:cs typeface="Consolas" pitchFamily="49" charset="0"/>
+              </a:rPr>
+              <a:t> </a:t>
+            </a:r>
+            <a:r>
+              <a:rPr lang="en-US" sz="600" dirty="0" smtClean="0">
+                <a:latin typeface="Consolas" pitchFamily="49" charset="0"/>
+                <a:cs typeface="Consolas" pitchFamily="49" charset="0"/>
+              </a:rPr>
+              <a:t>  </a:t>
+            </a:r>
+            <a:r>
+              <a:rPr lang="en-US" sz="600" dirty="0" err="1" smtClean="0">
+                <a:latin typeface="Consolas" pitchFamily="49" charset="0"/>
+                <a:cs typeface="Consolas" pitchFamily="49" charset="0"/>
+              </a:rPr>
+              <a:t>mem_invalid</a:t>
+            </a:r>
+            <a:r>
+              <a:rPr lang="en-US" sz="600" dirty="0" smtClean="0">
+                <a:latin typeface="Consolas" pitchFamily="49" charset="0"/>
+                <a:cs typeface="Consolas" pitchFamily="49" charset="0"/>
+              </a:rPr>
+              <a:t>[r2 + 12] = </a:t>
+            </a:r>
+            <a:r>
+              <a:rPr lang="en-US" sz="600" dirty="0" err="1" smtClean="0">
+                <a:latin typeface="Consolas" pitchFamily="49" charset="0"/>
+                <a:cs typeface="Consolas" pitchFamily="49" charset="0"/>
+              </a:rPr>
+              <a:t>rf_invalid</a:t>
+            </a:r>
+            <a:r>
+              <a:rPr lang="en-US" sz="600" dirty="0" smtClean="0">
+                <a:latin typeface="Consolas" pitchFamily="49" charset="0"/>
+                <a:cs typeface="Consolas" pitchFamily="49" charset="0"/>
+              </a:rPr>
+              <a:t>[3]</a:t>
+            </a:r>
+            <a:endParaRPr lang="en-US" sz="600" dirty="0">
+              <a:latin typeface="Consolas" pitchFamily="49" charset="0"/>
+              <a:cs typeface="Consolas" pitchFamily="49" charset="0"/>
+            </a:endParaRPr>
+          </a:p>
+        </p:txBody>
+      </p:sp>
+      <p:cxnSp>
+        <p:nvCxnSpPr>
+          <p:cNvPr id="12" name="Straight Connector 11"/>
+          <p:cNvCxnSpPr/>
+          <p:nvPr/>
+        </p:nvCxnSpPr>
+        <p:spPr>
+          <a:xfrm>
+            <a:off x="243215" y="468155"/>
+            <a:ext cx="5939965" cy="0"/>
+          </a:xfrm>
+          <a:prstGeom prst="line">
+            <a:avLst/>
+          </a:prstGeom>
+          <a:ln>
+            <a:solidFill>
+              <a:schemeClr val="bg1">
+                <a:lumMod val="75000"/>
+              </a:schemeClr>
+            </a:solidFill>
+            <a:prstDash val="solid"/>
+          </a:ln>
+        </p:spPr>
+        <p:style>
+          <a:lnRef idx="1">
+            <a:schemeClr val="accent1"/>
+          </a:lnRef>
+          <a:fillRef idx="0">
+            <a:schemeClr val="accent1"/>
+          </a:fillRef>
+          <a:effectRef idx="0">
+            <a:schemeClr val="accent1"/>
+          </a:effectRef>
+          <a:fontRef idx="minor">
+            <a:schemeClr val="tx1"/>
+          </a:fontRef>
+        </p:style>
+      </p:cxnSp>
+      <p:cxnSp>
+        <p:nvCxnSpPr>
+          <p:cNvPr id="13" name="Straight Connector 12"/>
+          <p:cNvCxnSpPr/>
+          <p:nvPr/>
+        </p:nvCxnSpPr>
+        <p:spPr>
+          <a:xfrm>
+            <a:off x="243216" y="929015"/>
+            <a:ext cx="5939964" cy="0"/>
+          </a:xfrm>
+          <a:prstGeom prst="line">
+            <a:avLst/>
+          </a:prstGeom>
+          <a:ln>
+            <a:solidFill>
+              <a:schemeClr val="bg1">
+                <a:lumMod val="75000"/>
+              </a:schemeClr>
+            </a:solidFill>
+            <a:prstDash val="solid"/>
+          </a:ln>
+        </p:spPr>
+        <p:style>
+          <a:lnRef idx="1">
+            <a:schemeClr val="accent1"/>
+          </a:lnRef>
+          <a:fillRef idx="0">
+            <a:schemeClr val="accent1"/>
+          </a:fillRef>
+          <a:effectRef idx="0">
+            <a:schemeClr val="accent1"/>
+          </a:effectRef>
+          <a:fontRef idx="minor">
+            <a:schemeClr val="tx1"/>
+          </a:fontRef>
+        </p:style>
+      </p:cxnSp>
+      <p:cxnSp>
+        <p:nvCxnSpPr>
+          <p:cNvPr id="14" name="Straight Connector 13"/>
+          <p:cNvCxnSpPr/>
+          <p:nvPr/>
+        </p:nvCxnSpPr>
+        <p:spPr>
+          <a:xfrm>
+            <a:off x="243215" y="1620305"/>
+            <a:ext cx="5939965" cy="0"/>
+          </a:xfrm>
+          <a:prstGeom prst="line">
+            <a:avLst/>
+          </a:prstGeom>
+          <a:ln>
+            <a:solidFill>
+              <a:schemeClr val="bg1">
+                <a:lumMod val="75000"/>
+              </a:schemeClr>
+            </a:solidFill>
+            <a:prstDash val="solid"/>
+          </a:ln>
+        </p:spPr>
+        <p:style>
+          <a:lnRef idx="1">
+            <a:schemeClr val="accent1"/>
+          </a:lnRef>
+          <a:fillRef idx="0">
+            <a:schemeClr val="accent1"/>
+          </a:fillRef>
+          <a:effectRef idx="0">
+            <a:schemeClr val="accent1"/>
+          </a:effectRef>
+          <a:fontRef idx="minor">
+            <a:schemeClr val="tx1"/>
+          </a:fontRef>
+        </p:style>
+      </p:cxnSp>
+      <p:cxnSp>
+        <p:nvCxnSpPr>
+          <p:cNvPr id="22" name="Straight Connector 21"/>
+          <p:cNvCxnSpPr/>
+          <p:nvPr/>
+        </p:nvCxnSpPr>
+        <p:spPr>
+          <a:xfrm>
+            <a:off x="243215" y="1081415"/>
+            <a:ext cx="5939965" cy="0"/>
+          </a:xfrm>
+          <a:prstGeom prst="line">
+            <a:avLst/>
+          </a:prstGeom>
+          <a:ln>
+            <a:solidFill>
+              <a:schemeClr val="bg1">
+                <a:lumMod val="75000"/>
+              </a:schemeClr>
+            </a:solidFill>
+            <a:prstDash val="solid"/>
+          </a:ln>
+        </p:spPr>
+        <p:style>
+          <a:lnRef idx="1">
+            <a:schemeClr val="accent1"/>
+          </a:lnRef>
+          <a:fillRef idx="0">
+            <a:schemeClr val="accent1"/>
+          </a:fillRef>
+          <a:effectRef idx="0">
+            <a:schemeClr val="accent1"/>
+          </a:effectRef>
+          <a:fontRef idx="minor">
+            <a:schemeClr val="tx1"/>
+          </a:fontRef>
+        </p:style>
+      </p:cxnSp>
+      <p:cxnSp>
+        <p:nvCxnSpPr>
+          <p:cNvPr id="7" name="Straight Connector 6"/>
+          <p:cNvCxnSpPr/>
+          <p:nvPr/>
+        </p:nvCxnSpPr>
+        <p:spPr>
+          <a:xfrm>
+            <a:off x="1728200" y="164541"/>
+            <a:ext cx="0" cy="2031327"/>
+          </a:xfrm>
+          <a:prstGeom prst="line">
+            <a:avLst/>
+          </a:prstGeom>
+          <a:ln>
+            <a:solidFill>
+              <a:schemeClr val="tx1"/>
+            </a:solidFill>
+          </a:ln>
+        </p:spPr>
+        <p:style>
+          <a:lnRef idx="1">
+            <a:schemeClr val="accent1"/>
+          </a:lnRef>
+          <a:fillRef idx="0">
+            <a:schemeClr val="accent1"/>
+          </a:fillRef>
+          <a:effectRef idx="0">
+            <a:schemeClr val="accent1"/>
+          </a:effectRef>
+          <a:fontRef idx="minor">
+            <a:schemeClr val="tx1"/>
+          </a:fontRef>
+        </p:style>
+      </p:cxnSp>
+      <p:cxnSp>
+        <p:nvCxnSpPr>
+          <p:cNvPr id="9" name="Straight Connector 8"/>
+          <p:cNvCxnSpPr/>
+          <p:nvPr/>
+        </p:nvCxnSpPr>
+        <p:spPr>
+          <a:xfrm>
+            <a:off x="4186120" y="164542"/>
+            <a:ext cx="0" cy="2031326"/>
+          </a:xfrm>
+          <a:prstGeom prst="line">
+            <a:avLst/>
+          </a:prstGeom>
+          <a:ln>
+            <a:solidFill>
+              <a:schemeClr val="tx1"/>
+            </a:solidFill>
+          </a:ln>
+        </p:spPr>
+        <p:style>
+          <a:lnRef idx="1">
+            <a:schemeClr val="accent1"/>
+          </a:lnRef>
+          <a:fillRef idx="0">
+            <a:schemeClr val="accent1"/>
+          </a:fillRef>
+          <a:effectRef idx="0">
+            <a:schemeClr val="accent1"/>
+          </a:effectRef>
+          <a:fontRef idx="minor">
+            <a:schemeClr val="tx1"/>
+          </a:fontRef>
+        </p:style>
+      </p:cxnSp>
+      <p:sp>
+        <p:nvSpPr>
+          <p:cNvPr id="18" name="Rounded Rectangle 17"/>
+          <p:cNvSpPr/>
+          <p:nvPr/>
+        </p:nvSpPr>
+        <p:spPr>
+          <a:xfrm>
+            <a:off x="243217" y="160914"/>
+            <a:ext cx="5939963" cy="2034953"/>
+          </a:xfrm>
+          <a:prstGeom prst="roundRect">
+            <a:avLst>
+              <a:gd name="adj" fmla="val 4386"/>
+            </a:avLst>
+          </a:prstGeom>
+          <a:noFill/>
+          <a:ln w="12700">
+            <a:solidFill>
+              <a:schemeClr val="tx1"/>
+            </a:solidFill>
+          </a:ln>
+        </p:spPr>
+        <p:style>
+          <a:lnRef idx="2">
+            <a:schemeClr val="accent1">
+              <a:shade val="50000"/>
+            </a:schemeClr>
+          </a:lnRef>
+          <a:fillRef idx="1">
+            <a:schemeClr val="accent1"/>
+          </a:fillRef>
+          <a:effectRef idx="0">
+            <a:schemeClr val="accent1"/>
+          </a:effectRef>
+          <a:fontRef idx="minor">
+            <a:schemeClr val="lt1"/>
+          </a:fontRef>
+        </p:style>
+        <p:txBody>
+          <a:bodyPr rtlCol="0" anchor="ctr"/>
+          <a:lstStyle/>
+          <a:p>
+            <a:pPr algn="ctr"/>
+            <a:endParaRPr lang="en-US"/>
+          </a:p>
+        </p:txBody>
+      </p:sp>
+    </p:spTree>
+    <p:extLst>
+      <p:ext uri="{BB962C8B-B14F-4D97-AF65-F5344CB8AC3E}">
+        <p14:creationId xmlns:p14="http://schemas.microsoft.com/office/powerpoint/2010/main" val="2410017047"/>
       </p:ext>
     </p:extLst>
   </p:cSld>

</xml_diff>

<commit_message>
Various minor edits. Figure clean-up.
</commit_message>
<xml_diff>
--- a/figs_src/diagrams-wide.pptx
+++ b/figs_src/diagrams-wide.pptx
@@ -197,7 +197,7 @@
           <a:p>
             <a:fld id="{843567C3-09B7-4EC5-8695-9659B6A4537F}" type="datetimeFigureOut">
               <a:rPr lang="en-US" smtClean="0"/>
-              <a:t>12/18/2014</a:t>
+              <a:t>12/22/2014</a:t>
             </a:fld>
             <a:endParaRPr lang="en-US"/>
           </a:p>
@@ -647,7 +647,7 @@
             <a:fld id="{1D8BD707-D9CF-40AE-B4C6-C98DA3205C09}" type="datetimeFigureOut">
               <a:rPr lang="en-US" smtClean="0"/>
               <a:pPr/>
-              <a:t>12/18/2014</a:t>
+              <a:t>12/22/2014</a:t>
             </a:fld>
             <a:endParaRPr lang="en-US"/>
           </a:p>
@@ -814,7 +814,7 @@
             <a:fld id="{1D8BD707-D9CF-40AE-B4C6-C98DA3205C09}" type="datetimeFigureOut">
               <a:rPr lang="en-US" smtClean="0"/>
               <a:pPr/>
-              <a:t>12/18/2014</a:t>
+              <a:t>12/22/2014</a:t>
             </a:fld>
             <a:endParaRPr lang="en-US"/>
           </a:p>
@@ -991,7 +991,7 @@
             <a:fld id="{1D8BD707-D9CF-40AE-B4C6-C98DA3205C09}" type="datetimeFigureOut">
               <a:rPr lang="en-US" smtClean="0"/>
               <a:pPr/>
-              <a:t>12/18/2014</a:t>
+              <a:t>12/22/2014</a:t>
             </a:fld>
             <a:endParaRPr lang="en-US"/>
           </a:p>
@@ -1158,7 +1158,7 @@
             <a:fld id="{1D8BD707-D9CF-40AE-B4C6-C98DA3205C09}" type="datetimeFigureOut">
               <a:rPr lang="en-US" smtClean="0"/>
               <a:pPr/>
-              <a:t>12/18/2014</a:t>
+              <a:t>12/22/2014</a:t>
             </a:fld>
             <a:endParaRPr lang="en-US"/>
           </a:p>
@@ -1401,7 +1401,7 @@
             <a:fld id="{1D8BD707-D9CF-40AE-B4C6-C98DA3205C09}" type="datetimeFigureOut">
               <a:rPr lang="en-US" smtClean="0"/>
               <a:pPr/>
-              <a:t>12/18/2014</a:t>
+              <a:t>12/22/2014</a:t>
             </a:fld>
             <a:endParaRPr lang="en-US"/>
           </a:p>
@@ -1686,7 +1686,7 @@
             <a:fld id="{1D8BD707-D9CF-40AE-B4C6-C98DA3205C09}" type="datetimeFigureOut">
               <a:rPr lang="en-US" smtClean="0"/>
               <a:pPr/>
-              <a:t>12/18/2014</a:t>
+              <a:t>12/22/2014</a:t>
             </a:fld>
             <a:endParaRPr lang="en-US"/>
           </a:p>
@@ -2105,7 +2105,7 @@
             <a:fld id="{1D8BD707-D9CF-40AE-B4C6-C98DA3205C09}" type="datetimeFigureOut">
               <a:rPr lang="en-US" smtClean="0"/>
               <a:pPr/>
-              <a:t>12/18/2014</a:t>
+              <a:t>12/22/2014</a:t>
             </a:fld>
             <a:endParaRPr lang="en-US"/>
           </a:p>
@@ -2220,7 +2220,7 @@
             <a:fld id="{1D8BD707-D9CF-40AE-B4C6-C98DA3205C09}" type="datetimeFigureOut">
               <a:rPr lang="en-US" smtClean="0"/>
               <a:pPr/>
-              <a:t>12/18/2014</a:t>
+              <a:t>12/22/2014</a:t>
             </a:fld>
             <a:endParaRPr lang="en-US"/>
           </a:p>
@@ -2312,7 +2312,7 @@
             <a:fld id="{1D8BD707-D9CF-40AE-B4C6-C98DA3205C09}" type="datetimeFigureOut">
               <a:rPr lang="en-US" smtClean="0"/>
               <a:pPr/>
-              <a:t>12/18/2014</a:t>
+              <a:t>12/22/2014</a:t>
             </a:fld>
             <a:endParaRPr lang="en-US"/>
           </a:p>
@@ -2586,7 +2586,7 @@
             <a:fld id="{1D8BD707-D9CF-40AE-B4C6-C98DA3205C09}" type="datetimeFigureOut">
               <a:rPr lang="en-US" smtClean="0"/>
               <a:pPr/>
-              <a:t>12/18/2014</a:t>
+              <a:t>12/22/2014</a:t>
             </a:fld>
             <a:endParaRPr lang="en-US"/>
           </a:p>
@@ -2836,7 +2836,7 @@
             <a:fld id="{1D8BD707-D9CF-40AE-B4C6-C98DA3205C09}" type="datetimeFigureOut">
               <a:rPr lang="en-US" smtClean="0"/>
               <a:pPr/>
-              <a:t>12/18/2014</a:t>
+              <a:t>12/22/2014</a:t>
             </a:fld>
             <a:endParaRPr lang="en-US"/>
           </a:p>
@@ -3046,7 +3046,7 @@
             <a:fld id="{1D8BD707-D9CF-40AE-B4C6-C98DA3205C09}" type="datetimeFigureOut">
               <a:rPr lang="en-US" smtClean="0"/>
               <a:pPr/>
-              <a:t>12/18/2014</a:t>
+              <a:t>12/22/2014</a:t>
             </a:fld>
             <a:endParaRPr lang="en-US"/>
           </a:p>
@@ -6144,6 +6144,89 @@
       </p:grpSpPr>
       <p:sp>
         <p:nvSpPr>
+          <p:cNvPr id="90" name="TextBox 89"/>
+          <p:cNvSpPr txBox="1"/>
+          <p:nvPr/>
+        </p:nvSpPr>
+        <p:spPr>
+          <a:xfrm>
+            <a:off x="5868931" y="192625"/>
+            <a:ext cx="557489" cy="215444"/>
+          </a:xfrm>
+          <a:prstGeom prst="rect">
+            <a:avLst/>
+          </a:prstGeom>
+          <a:noFill/>
+        </p:spPr>
+        <p:txBody>
+          <a:bodyPr wrap="square" rtlCol="0">
+            <a:spAutoFit/>
+          </a:bodyPr>
+          <a:lstStyle/>
+          <a:p>
+            <a:pPr algn="ctr"/>
+            <a:r>
+              <a:rPr lang="en-US" sz="800" dirty="0" smtClean="0">
+                <a:latin typeface="Arial" pitchFamily="34" charset="0"/>
+                <a:cs typeface="Arial" pitchFamily="34" charset="0"/>
+              </a:rPr>
+              <a:t>filter</a:t>
+            </a:r>
+          </a:p>
+        </p:txBody>
+      </p:sp>
+      <p:sp>
+        <p:nvSpPr>
+          <p:cNvPr id="110" name="TextBox 109"/>
+          <p:cNvSpPr txBox="1"/>
+          <p:nvPr/>
+        </p:nvSpPr>
+        <p:spPr>
+          <a:xfrm>
+            <a:off x="133116" y="514304"/>
+            <a:ext cx="652886" cy="215444"/>
+          </a:xfrm>
+          <a:prstGeom prst="rect">
+            <a:avLst/>
+          </a:prstGeom>
+          <a:noFill/>
+        </p:spPr>
+        <p:txBody>
+          <a:bodyPr wrap="square" rtlCol="0">
+            <a:spAutoFit/>
+          </a:bodyPr>
+          <a:lstStyle/>
+          <a:p>
+            <a:r>
+              <a:rPr lang="en-US" sz="800" dirty="0" err="1">
+                <a:latin typeface="Arial" pitchFamily="34" charset="0"/>
+                <a:cs typeface="Arial" pitchFamily="34" charset="0"/>
+              </a:rPr>
+              <a:t>i</a:t>
+            </a:r>
+            <a:r>
+              <a:rPr lang="en-US" sz="800" dirty="0" err="1" smtClean="0">
+                <a:latin typeface="Arial" pitchFamily="34" charset="0"/>
+                <a:cs typeface="Arial" pitchFamily="34" charset="0"/>
+              </a:rPr>
+              <a:t>nst</a:t>
+            </a:r>
+            <a:r>
+              <a:rPr lang="en-US" sz="800" dirty="0" smtClean="0">
+                <a:latin typeface="Arial" pitchFamily="34" charset="0"/>
+                <a:cs typeface="Arial" pitchFamily="34" charset="0"/>
+              </a:rPr>
+              <a:t> type</a:t>
+            </a:r>
+            <a:endParaRPr lang="en-US" sz="800" dirty="0">
+              <a:latin typeface="Arial" pitchFamily="34" charset="0"/>
+              <a:cs typeface="Arial" pitchFamily="34" charset="0"/>
+            </a:endParaRPr>
+          </a:p>
+        </p:txBody>
+      </p:sp>
+      <p:sp>
+        <p:nvSpPr>
           <p:cNvPr id="68" name="TextBox 67"/>
           <p:cNvSpPr txBox="1"/>
           <p:nvPr/>
@@ -6287,12 +6370,12 @@
           <a:prstGeom prst="straightConnector1">
             <a:avLst/>
           </a:prstGeom>
-          <a:ln w="19050">
+          <a:ln w="12700">
             <a:solidFill>
               <a:schemeClr val="tx1"/>
             </a:solidFill>
             <a:headEnd w="sm" len="sm"/>
-            <a:tailEnd type="arrow" w="sm" len="sm"/>
+            <a:tailEnd type="triangle" w="med" len="med"/>
           </a:ln>
         </p:spPr>
         <p:style>
@@ -6589,7 +6672,7 @@
         </p:nvSpPr>
         <p:spPr>
           <a:xfrm>
-            <a:off x="4711548" y="598357"/>
+            <a:off x="4723483" y="616794"/>
             <a:ext cx="608679" cy="215444"/>
           </a:xfrm>
           <a:prstGeom prst="rect">
@@ -7029,12 +7112,12 @@
           <a:prstGeom prst="straightConnector1">
             <a:avLst/>
           </a:prstGeom>
-          <a:ln w="19050">
+          <a:ln w="12700">
             <a:solidFill>
               <a:schemeClr val="tx1"/>
             </a:solidFill>
             <a:headEnd w="sm" len="sm"/>
-            <a:tailEnd type="arrow" w="sm" len="sm"/>
+            <a:tailEnd type="triangle" w="med" len="med"/>
           </a:ln>
         </p:spPr>
         <p:style>
@@ -7066,12 +7149,12 @@
           <a:prstGeom prst="straightConnector1">
             <a:avLst/>
           </a:prstGeom>
-          <a:ln w="19050">
+          <a:ln w="12700">
             <a:solidFill>
               <a:schemeClr val="tx1"/>
             </a:solidFill>
             <a:headEnd w="sm" len="sm"/>
-            <a:tailEnd type="arrow" w="sm" len="sm"/>
+            <a:tailEnd type="triangle" w="med" len="med"/>
           </a:ln>
         </p:spPr>
         <p:style>
@@ -7215,12 +7298,12 @@
             <a:prstGeom prst="straightConnector1">
               <a:avLst/>
             </a:prstGeom>
-            <a:ln w="19050">
+            <a:ln w="12700">
               <a:solidFill>
                 <a:schemeClr val="tx1"/>
               </a:solidFill>
               <a:headEnd w="sm" len="sm"/>
-              <a:tailEnd type="arrow" w="sm" len="sm"/>
+              <a:tailEnd type="triangle" w="med" len="med"/>
             </a:ln>
           </p:spPr>
           <p:style>
@@ -7252,12 +7335,12 @@
             <a:prstGeom prst="straightConnector1">
               <a:avLst/>
             </a:prstGeom>
-            <a:ln w="19050">
+            <a:ln w="12700">
               <a:solidFill>
                 <a:schemeClr val="tx1"/>
               </a:solidFill>
               <a:headEnd w="sm" len="sm"/>
-              <a:tailEnd type="arrow" w="sm" len="sm"/>
+              <a:tailEnd type="triangle" w="med" len="med"/>
             </a:ln>
           </p:spPr>
           <p:style>
@@ -7323,12 +7406,12 @@
           <a:prstGeom prst="straightConnector1">
             <a:avLst/>
           </a:prstGeom>
-          <a:ln w="19050">
+          <a:ln w="12700">
             <a:solidFill>
               <a:schemeClr val="tx1"/>
             </a:solidFill>
             <a:headEnd w="sm" len="sm"/>
-            <a:tailEnd type="arrow" w="sm" len="sm"/>
+            <a:tailEnd type="triangle" w="med" len="med"/>
           </a:ln>
         </p:spPr>
         <p:style>
@@ -7672,8 +7755,8 @@
         </p:nvSpPr>
         <p:spPr>
           <a:xfrm>
-            <a:off x="2927162" y="636761"/>
-            <a:ext cx="675873" cy="215444"/>
+            <a:off x="2896628" y="640984"/>
+            <a:ext cx="667519" cy="215444"/>
           </a:xfrm>
           <a:prstGeom prst="rect">
             <a:avLst/>
@@ -7893,12 +7976,12 @@
           <a:prstGeom prst="straightConnector1">
             <a:avLst/>
           </a:prstGeom>
-          <a:ln w="19050">
+          <a:ln w="12700">
             <a:solidFill>
               <a:schemeClr val="tx1"/>
             </a:solidFill>
             <a:headEnd w="sm" len="sm"/>
-            <a:tailEnd type="arrow" w="sm" len="sm"/>
+            <a:tailEnd type="triangle" w="med" len="med"/>
           </a:ln>
         </p:spPr>
         <p:style>
@@ -7987,12 +8070,12 @@
           <a:prstGeom prst="straightConnector1">
             <a:avLst/>
           </a:prstGeom>
-          <a:ln w="19050">
+          <a:ln w="12700">
             <a:solidFill>
               <a:schemeClr val="tx1"/>
             </a:solidFill>
             <a:headEnd w="sm" len="sm"/>
-            <a:tailEnd type="arrow" w="sm" len="sm"/>
+            <a:tailEnd type="triangle" w="med" len="med"/>
           </a:ln>
         </p:spPr>
         <p:style>
@@ -8024,12 +8107,12 @@
           <a:prstGeom prst="straightConnector1">
             <a:avLst/>
           </a:prstGeom>
-          <a:ln w="19050">
+          <a:ln w="12700">
             <a:solidFill>
               <a:schemeClr val="tx1"/>
             </a:solidFill>
             <a:headEnd w="sm" len="sm"/>
-            <a:tailEnd type="arrow" w="sm" len="sm"/>
+            <a:tailEnd type="triangle" w="med" len="med"/>
           </a:ln>
         </p:spPr>
         <p:style>
@@ -8049,39 +8132,6 @@
       </p:cxnSp>
       <p:sp>
         <p:nvSpPr>
-          <p:cNvPr id="90" name="TextBox 89"/>
-          <p:cNvSpPr txBox="1"/>
-          <p:nvPr/>
-        </p:nvSpPr>
-        <p:spPr>
-          <a:xfrm>
-            <a:off x="5868931" y="192625"/>
-            <a:ext cx="557489" cy="215444"/>
-          </a:xfrm>
-          <a:prstGeom prst="rect">
-            <a:avLst/>
-          </a:prstGeom>
-          <a:noFill/>
-        </p:spPr>
-        <p:txBody>
-          <a:bodyPr wrap="square" rtlCol="0">
-            <a:spAutoFit/>
-          </a:bodyPr>
-          <a:lstStyle/>
-          <a:p>
-            <a:pPr algn="ctr"/>
-            <a:r>
-              <a:rPr lang="en-US" sz="800" dirty="0" smtClean="0">
-                <a:latin typeface="Arial" pitchFamily="34" charset="0"/>
-                <a:cs typeface="Arial" pitchFamily="34" charset="0"/>
-              </a:rPr>
-              <a:t>filter</a:t>
-            </a:r>
-          </a:p>
-        </p:txBody>
-      </p:sp>
-      <p:sp>
-        <p:nvSpPr>
           <p:cNvPr id="91" name="TextBox 90"/>
           <p:cNvSpPr txBox="1"/>
           <p:nvPr/>
@@ -8131,7 +8181,7 @@
           <a:prstGeom prst="straightConnector1">
             <a:avLst/>
           </a:prstGeom>
-          <a:ln w="19050">
+          <a:ln w="12700">
             <a:solidFill>
               <a:schemeClr val="tx1"/>
             </a:solidFill>
@@ -8168,7 +8218,7 @@
           <a:prstGeom prst="straightConnector1">
             <a:avLst/>
           </a:prstGeom>
-          <a:ln w="19050">
+          <a:ln w="12700">
             <a:solidFill>
               <a:schemeClr val="tx1"/>
             </a:solidFill>
@@ -8232,18 +8282,18 @@
         </p:nvCxnSpPr>
         <p:spPr>
           <a:xfrm>
-            <a:off x="2774157" y="601579"/>
+            <a:off x="2773673" y="617295"/>
             <a:ext cx="790474" cy="0"/>
           </a:xfrm>
           <a:prstGeom prst="straightConnector1">
             <a:avLst/>
           </a:prstGeom>
-          <a:ln w="19050">
+          <a:ln w="12700">
             <a:solidFill>
               <a:schemeClr val="tx1"/>
             </a:solidFill>
             <a:headEnd w="sm" len="sm"/>
-            <a:tailEnd type="arrow" w="sm" len="sm"/>
+            <a:tailEnd type="triangle" w="med" len="med"/>
           </a:ln>
         </p:spPr>
         <p:style>
@@ -8269,7 +8319,7 @@
         </p:nvSpPr>
         <p:spPr>
           <a:xfrm>
-            <a:off x="2911746" y="211047"/>
+            <a:off x="2911746" y="192625"/>
             <a:ext cx="691290" cy="215444"/>
           </a:xfrm>
           <a:prstGeom prst="rect">
@@ -8327,7 +8377,7 @@
         </p:nvSpPr>
         <p:spPr>
           <a:xfrm>
-            <a:off x="2930948" y="409916"/>
+            <a:off x="2930948" y="408069"/>
             <a:ext cx="672088" cy="215444"/>
           </a:xfrm>
           <a:prstGeom prst="rect">
@@ -8391,12 +8441,12 @@
           <a:prstGeom prst="straightConnector1">
             <a:avLst/>
           </a:prstGeom>
-          <a:ln w="19050">
+          <a:ln w="12700">
             <a:solidFill>
               <a:schemeClr val="tx1"/>
             </a:solidFill>
             <a:headEnd w="sm" len="sm"/>
-            <a:tailEnd type="arrow" w="sm" len="sm"/>
+            <a:tailEnd type="triangle" w="med" len="med"/>
           </a:ln>
         </p:spPr>
         <p:style>
@@ -8461,7 +8511,7 @@
           <a:prstGeom prst="straightConnector1">
             <a:avLst/>
           </a:prstGeom>
-          <a:ln w="19050">
+          <a:ln w="12700">
             <a:solidFill>
               <a:schemeClr val="tx1"/>
             </a:solidFill>
@@ -8498,7 +8548,7 @@
           <a:prstGeom prst="straightConnector1">
             <a:avLst/>
           </a:prstGeom>
-          <a:ln w="19050">
+          <a:ln w="12700">
             <a:solidFill>
               <a:schemeClr val="tx1"/>
             </a:solidFill>
@@ -8535,12 +8585,12 @@
           <a:prstGeom prst="straightConnector1">
             <a:avLst/>
           </a:prstGeom>
-          <a:ln w="19050">
+          <a:ln w="12700">
             <a:solidFill>
               <a:schemeClr val="tx1"/>
             </a:solidFill>
             <a:headEnd w="sm" len="sm"/>
-            <a:tailEnd type="arrow" w="sm" len="sm"/>
+            <a:tailEnd type="triangle" w="med" len="med"/>
           </a:ln>
         </p:spPr>
         <p:style>
@@ -8731,12 +8781,12 @@
           <a:prstGeom prst="straightConnector1">
             <a:avLst/>
           </a:prstGeom>
-          <a:ln w="19050">
+          <a:ln w="12700">
             <a:solidFill>
               <a:schemeClr val="tx1"/>
             </a:solidFill>
             <a:headEnd w="sm" len="sm"/>
-            <a:tailEnd type="arrow" w="sm" len="sm"/>
+            <a:tailEnd type="triangle" w="med" len="med"/>
           </a:ln>
         </p:spPr>
         <p:style>
@@ -8768,12 +8818,12 @@
           <a:prstGeom prst="straightConnector1">
             <a:avLst/>
           </a:prstGeom>
-          <a:ln w="19050">
+          <a:ln w="12700">
             <a:solidFill>
               <a:schemeClr val="tx1"/>
             </a:solidFill>
             <a:headEnd w="sm" len="sm"/>
-            <a:tailEnd type="arrow" w="sm" len="sm"/>
+            <a:tailEnd type="triangle" w="med" len="med"/>
           </a:ln>
         </p:spPr>
         <p:style>
@@ -8805,12 +8855,12 @@
           <a:prstGeom prst="straightConnector1">
             <a:avLst/>
           </a:prstGeom>
-          <a:ln w="19050">
+          <a:ln w="12700">
             <a:solidFill>
               <a:schemeClr val="tx1"/>
             </a:solidFill>
             <a:headEnd w="sm" len="sm"/>
-            <a:tailEnd type="arrow" w="sm" len="sm"/>
+            <a:tailEnd type="triangle" w="med" len="med"/>
           </a:ln>
         </p:spPr>
         <p:style>
@@ -8828,56 +8878,6 @@
           </a:fontRef>
         </p:style>
       </p:cxnSp>
-      <p:sp>
-        <p:nvSpPr>
-          <p:cNvPr id="110" name="TextBox 109"/>
-          <p:cNvSpPr txBox="1"/>
-          <p:nvPr/>
-        </p:nvSpPr>
-        <p:spPr>
-          <a:xfrm>
-            <a:off x="133116" y="514304"/>
-            <a:ext cx="652886" cy="215444"/>
-          </a:xfrm>
-          <a:prstGeom prst="rect">
-            <a:avLst/>
-          </a:prstGeom>
-          <a:noFill/>
-        </p:spPr>
-        <p:txBody>
-          <a:bodyPr wrap="square" rtlCol="0">
-            <a:spAutoFit/>
-          </a:bodyPr>
-          <a:lstStyle/>
-          <a:p>
-            <a:r>
-              <a:rPr lang="en-US" sz="800" dirty="0" err="1">
-                <a:latin typeface="Arial" pitchFamily="34" charset="0"/>
-                <a:cs typeface="Arial" pitchFamily="34" charset="0"/>
-              </a:rPr>
-              <a:t>i</a:t>
-            </a:r>
-            <a:r>
-              <a:rPr lang="en-US" sz="800" dirty="0" err="1" smtClean="0">
-                <a:latin typeface="Arial" pitchFamily="34" charset="0"/>
-                <a:cs typeface="Arial" pitchFamily="34" charset="0"/>
-              </a:rPr>
-              <a:t>nst</a:t>
-            </a:r>
-            <a:r>
-              <a:rPr lang="en-US" sz="800" dirty="0" smtClean="0">
-                <a:latin typeface="Arial" pitchFamily="34" charset="0"/>
-                <a:cs typeface="Arial" pitchFamily="34" charset="0"/>
-              </a:rPr>
-              <a:t> type</a:t>
-            </a:r>
-            <a:endParaRPr lang="en-US" sz="800" dirty="0">
-              <a:latin typeface="Arial" pitchFamily="34" charset="0"/>
-              <a:cs typeface="Arial" pitchFamily="34" charset="0"/>
-            </a:endParaRPr>
-          </a:p>
-        </p:txBody>
-      </p:sp>
       <p:cxnSp>
         <p:nvCxnSpPr>
           <p:cNvPr id="111" name="Straight Arrow Connector 110"/>
@@ -8892,12 +8892,12 @@
           <a:prstGeom prst="straightConnector1">
             <a:avLst/>
           </a:prstGeom>
-          <a:ln w="19050">
+          <a:ln w="12700">
             <a:solidFill>
               <a:schemeClr val="tx1"/>
             </a:solidFill>
             <a:headEnd w="sm" len="sm"/>
-            <a:tailEnd type="arrow" w="sm" len="sm"/>
+            <a:tailEnd type="triangle" w="med" len="med"/>
           </a:ln>
         </p:spPr>
         <p:style>
@@ -8929,12 +8929,12 @@
           <a:prstGeom prst="straightConnector1">
             <a:avLst/>
           </a:prstGeom>
-          <a:ln w="19050">
+          <a:ln w="12700">
             <a:solidFill>
               <a:schemeClr val="tx1"/>
             </a:solidFill>
             <a:headEnd w="sm" len="sm"/>
-            <a:tailEnd type="arrow" w="sm" len="sm"/>
+            <a:tailEnd type="triangle" w="med" len="med"/>
           </a:ln>
         </p:spPr>
         <p:style>
@@ -8966,12 +8966,12 @@
           <a:prstGeom prst="straightConnector1">
             <a:avLst/>
           </a:prstGeom>
-          <a:ln w="19050">
+          <a:ln w="12700">
             <a:solidFill>
               <a:schemeClr val="tx1"/>
             </a:solidFill>
             <a:headEnd w="sm" len="sm"/>
-            <a:tailEnd type="arrow" w="sm" len="sm"/>
+            <a:tailEnd type="triangle" w="med" len="med"/>
           </a:ln>
         </p:spPr>
         <p:style>

</xml_diff>